<commit_message>
Few minor changes for oscillators
</commit_message>
<xml_diff>
--- a/figures/MMBS Figures.pptx
+++ b/figures/MMBS Figures.pptx
@@ -5,11 +5,12 @@
     <p:sldMasterId id="2147483648" r:id="rId1"/>
   </p:sldMasterIdLst>
   <p:notesMasterIdLst>
-    <p:notesMasterId r:id="rId4"/>
+    <p:notesMasterId r:id="rId5"/>
   </p:notesMasterIdLst>
   <p:sldIdLst>
     <p:sldId id="2644" r:id="rId2"/>
     <p:sldId id="2645" r:id="rId3"/>
+    <p:sldId id="2646" r:id="rId4"/>
   </p:sldIdLst>
   <p:sldSz cx="12192000" cy="6858000"/>
   <p:notesSz cx="6858000" cy="9144000"/>
@@ -198,7 +199,7 @@
           <a:p>
             <a:fld id="{B4B82680-7EFC-594A-AE6D-8C42E1797072}" type="datetimeFigureOut">
               <a:rPr lang="en-US" smtClean="0"/>
-              <a:t>8/6/20</a:t>
+              <a:t>8/17/20</a:t>
             </a:fld>
             <a:endParaRPr lang="en-US"/>
           </a:p>
@@ -661,6 +662,131 @@
 </p:notes>
 </file>
 
+<file path=ppt/notesSlides/notesSlide3.xml><?xml version="1.0" encoding="utf-8"?>
+<p:notes xmlns:a="http://schemas.openxmlformats.org/drawingml/2006/main" xmlns:r="http://schemas.openxmlformats.org/officeDocument/2006/relationships" xmlns:p="http://schemas.openxmlformats.org/presentationml/2006/main">
+  <p:cSld>
+    <p:spTree>
+      <p:nvGrpSpPr>
+        <p:cNvPr id="1" name=""/>
+        <p:cNvGrpSpPr/>
+        <p:nvPr/>
+      </p:nvGrpSpPr>
+      <p:grpSpPr>
+        <a:xfrm>
+          <a:off x="0" y="0"/>
+          <a:ext cx="0" cy="0"/>
+          <a:chOff x="0" y="0"/>
+          <a:chExt cx="0" cy="0"/>
+        </a:xfrm>
+      </p:grpSpPr>
+      <p:sp>
+        <p:nvSpPr>
+          <p:cNvPr id="2" name="Slide Image Placeholder 1"/>
+          <p:cNvSpPr>
+            <a:spLocks noGrp="1" noRot="1" noChangeAspect="1"/>
+          </p:cNvSpPr>
+          <p:nvPr>
+            <p:ph type="sldImg"/>
+          </p:nvPr>
+        </p:nvSpPr>
+        <p:spPr/>
+      </p:sp>
+      <p:sp>
+        <p:nvSpPr>
+          <p:cNvPr id="3" name="Notes Placeholder 2"/>
+          <p:cNvSpPr>
+            <a:spLocks noGrp="1"/>
+          </p:cNvSpPr>
+          <p:nvPr>
+            <p:ph type="body" idx="1"/>
+          </p:nvPr>
+        </p:nvSpPr>
+        <p:spPr/>
+        <p:txBody>
+          <a:bodyPr/>
+          <a:lstStyle/>
+          <a:p>
+            <a:pPr marL="0" marR="0" lvl="0" indent="0" algn="l" defTabSz="914400" rtl="0" eaLnBrk="1" fontAlgn="auto" latinLnBrk="0" hangingPunct="1">
+              <a:lnSpc>
+                <a:spcPct val="100000"/>
+              </a:lnSpc>
+              <a:spcBef>
+                <a:spcPts val="0"/>
+              </a:spcBef>
+              <a:spcAft>
+                <a:spcPts val="0"/>
+              </a:spcAft>
+              <a:buClrTx/>
+              <a:buSzTx/>
+              <a:buFontTx/>
+              <a:buNone/>
+              <a:tabLst/>
+              <a:defRPr/>
+            </a:pPr>
+            <a:r>
+              <a:rPr lang="en-US" dirty="0" err="1"/>
+              <a:t>repressilator</a:t>
+            </a:r>
+            <a:endParaRPr lang="en-US" dirty="0"/>
+          </a:p>
+          <a:p>
+            <a:pPr marL="0" marR="0" lvl="0" indent="0" algn="l" defTabSz="914400" rtl="0" eaLnBrk="1" fontAlgn="auto" latinLnBrk="0" hangingPunct="1">
+              <a:lnSpc>
+                <a:spcPct val="100000"/>
+              </a:lnSpc>
+              <a:spcBef>
+                <a:spcPts val="0"/>
+              </a:spcBef>
+              <a:spcAft>
+                <a:spcPts val="0"/>
+              </a:spcAft>
+              <a:buClrTx/>
+              <a:buSzTx/>
+              <a:buFontTx/>
+              <a:buNone/>
+              <a:tabLst/>
+              <a:defRPr/>
+            </a:pPr>
+            <a:endParaRPr lang="en-US" dirty="0"/>
+          </a:p>
+        </p:txBody>
+      </p:sp>
+      <p:sp>
+        <p:nvSpPr>
+          <p:cNvPr id="4" name="Slide Number Placeholder 3"/>
+          <p:cNvSpPr>
+            <a:spLocks noGrp="1"/>
+          </p:cNvSpPr>
+          <p:nvPr>
+            <p:ph type="sldNum" sz="quarter" idx="5"/>
+          </p:nvPr>
+        </p:nvSpPr>
+        <p:spPr/>
+        <p:txBody>
+          <a:bodyPr/>
+          <a:lstStyle/>
+          <a:p>
+            <a:fld id="{1FA7716F-88A2-8E4E-B694-34C10F2D9928}" type="slidenum">
+              <a:rPr lang="en-US" smtClean="0"/>
+              <a:t>3</a:t>
+            </a:fld>
+            <a:endParaRPr lang="en-US"/>
+          </a:p>
+        </p:txBody>
+      </p:sp>
+    </p:spTree>
+    <p:extLst>
+      <p:ext uri="{BB962C8B-B14F-4D97-AF65-F5344CB8AC3E}">
+        <p14:creationId xmlns:p14="http://schemas.microsoft.com/office/powerpoint/2010/main" val="2933506814"/>
+      </p:ext>
+    </p:extLst>
+  </p:cSld>
+  <p:clrMapOvr>
+    <a:masterClrMapping/>
+  </p:clrMapOvr>
+</p:notes>
+</file>
+
 <file path=ppt/slideLayouts/slideLayout1.xml><?xml version="1.0" encoding="utf-8"?>
 <p:sldLayout xmlns:a="http://schemas.openxmlformats.org/drawingml/2006/main" xmlns:r="http://schemas.openxmlformats.org/officeDocument/2006/relationships" xmlns:p="http://schemas.openxmlformats.org/presentationml/2006/main" type="title" preserve="1">
   <p:cSld name="Title Slide">
@@ -808,7 +934,7 @@
           <a:p>
             <a:fld id="{9EEB5D18-614A-1A43-9057-E06F7A7EDE83}" type="datetimeFigureOut">
               <a:rPr lang="en-US" smtClean="0"/>
-              <a:t>8/6/20</a:t>
+              <a:t>8/17/20</a:t>
             </a:fld>
             <a:endParaRPr lang="en-US"/>
           </a:p>
@@ -1006,7 +1132,7 @@
           <a:p>
             <a:fld id="{9EEB5D18-614A-1A43-9057-E06F7A7EDE83}" type="datetimeFigureOut">
               <a:rPr lang="en-US" smtClean="0"/>
-              <a:t>8/6/20</a:t>
+              <a:t>8/17/20</a:t>
             </a:fld>
             <a:endParaRPr lang="en-US"/>
           </a:p>
@@ -1214,7 +1340,7 @@
           <a:p>
             <a:fld id="{9EEB5D18-614A-1A43-9057-E06F7A7EDE83}" type="datetimeFigureOut">
               <a:rPr lang="en-US" smtClean="0"/>
-              <a:t>8/6/20</a:t>
+              <a:t>8/17/20</a:t>
             </a:fld>
             <a:endParaRPr lang="en-US"/>
           </a:p>
@@ -1412,7 +1538,7 @@
           <a:p>
             <a:fld id="{9EEB5D18-614A-1A43-9057-E06F7A7EDE83}" type="datetimeFigureOut">
               <a:rPr lang="en-US" smtClean="0"/>
-              <a:t>8/6/20</a:t>
+              <a:t>8/17/20</a:t>
             </a:fld>
             <a:endParaRPr lang="en-US"/>
           </a:p>
@@ -1687,7 +1813,7 @@
           <a:p>
             <a:fld id="{9EEB5D18-614A-1A43-9057-E06F7A7EDE83}" type="datetimeFigureOut">
               <a:rPr lang="en-US" smtClean="0"/>
-              <a:t>8/6/20</a:t>
+              <a:t>8/17/20</a:t>
             </a:fld>
             <a:endParaRPr lang="en-US"/>
           </a:p>
@@ -1952,7 +2078,7 @@
           <a:p>
             <a:fld id="{9EEB5D18-614A-1A43-9057-E06F7A7EDE83}" type="datetimeFigureOut">
               <a:rPr lang="en-US" smtClean="0"/>
-              <a:t>8/6/20</a:t>
+              <a:t>8/17/20</a:t>
             </a:fld>
             <a:endParaRPr lang="en-US"/>
           </a:p>
@@ -2364,7 +2490,7 @@
           <a:p>
             <a:fld id="{9EEB5D18-614A-1A43-9057-E06F7A7EDE83}" type="datetimeFigureOut">
               <a:rPr lang="en-US" smtClean="0"/>
-              <a:t>8/6/20</a:t>
+              <a:t>8/17/20</a:t>
             </a:fld>
             <a:endParaRPr lang="en-US"/>
           </a:p>
@@ -2505,7 +2631,7 @@
           <a:p>
             <a:fld id="{9EEB5D18-614A-1A43-9057-E06F7A7EDE83}" type="datetimeFigureOut">
               <a:rPr lang="en-US" smtClean="0"/>
-              <a:t>8/6/20</a:t>
+              <a:t>8/17/20</a:t>
             </a:fld>
             <a:endParaRPr lang="en-US"/>
           </a:p>
@@ -2618,7 +2744,7 @@
           <a:p>
             <a:fld id="{9EEB5D18-614A-1A43-9057-E06F7A7EDE83}" type="datetimeFigureOut">
               <a:rPr lang="en-US" smtClean="0"/>
-              <a:t>8/6/20</a:t>
+              <a:t>8/17/20</a:t>
             </a:fld>
             <a:endParaRPr lang="en-US"/>
           </a:p>
@@ -2929,7 +3055,7 @@
           <a:p>
             <a:fld id="{9EEB5D18-614A-1A43-9057-E06F7A7EDE83}" type="datetimeFigureOut">
               <a:rPr lang="en-US" smtClean="0"/>
-              <a:t>8/6/20</a:t>
+              <a:t>8/17/20</a:t>
             </a:fld>
             <a:endParaRPr lang="en-US"/>
           </a:p>
@@ -3217,7 +3343,7 @@
           <a:p>
             <a:fld id="{9EEB5D18-614A-1A43-9057-E06F7A7EDE83}" type="datetimeFigureOut">
               <a:rPr lang="en-US" smtClean="0"/>
-              <a:t>8/6/20</a:t>
+              <a:t>8/17/20</a:t>
             </a:fld>
             <a:endParaRPr lang="en-US"/>
           </a:p>
@@ -3458,7 +3584,7 @@
           <a:p>
             <a:fld id="{9EEB5D18-614A-1A43-9057-E06F7A7EDE83}" type="datetimeFigureOut">
               <a:rPr lang="en-US" smtClean="0"/>
-              <a:t>8/6/20</a:t>
+              <a:t>8/17/20</a:t>
             </a:fld>
             <a:endParaRPr lang="en-US"/>
           </a:p>
@@ -4641,6 +4767,447 @@
     <p:extLst>
       <p:ext uri="{BB962C8B-B14F-4D97-AF65-F5344CB8AC3E}">
         <p14:creationId xmlns:p14="http://schemas.microsoft.com/office/powerpoint/2010/main" val="3922417269"/>
+      </p:ext>
+    </p:extLst>
+  </p:cSld>
+  <p:clrMapOvr>
+    <a:masterClrMapping/>
+  </p:clrMapOvr>
+</p:sld>
+</file>
+
+<file path=ppt/slides/slide3.xml><?xml version="1.0" encoding="utf-8"?>
+<p:sld xmlns:a="http://schemas.openxmlformats.org/drawingml/2006/main" xmlns:r="http://schemas.openxmlformats.org/officeDocument/2006/relationships" xmlns:p="http://schemas.openxmlformats.org/presentationml/2006/main">
+  <p:cSld>
+    <p:spTree>
+      <p:nvGrpSpPr>
+        <p:cNvPr id="1" name=""/>
+        <p:cNvGrpSpPr/>
+        <p:nvPr/>
+      </p:nvGrpSpPr>
+      <p:grpSpPr>
+        <a:xfrm>
+          <a:off x="0" y="0"/>
+          <a:ext cx="0" cy="0"/>
+          <a:chOff x="0" y="0"/>
+          <a:chExt cx="0" cy="0"/>
+        </a:xfrm>
+      </p:grpSpPr>
+      <p:sp>
+        <p:nvSpPr>
+          <p:cNvPr id="5" name="Oval 14">
+            <a:extLst>
+              <a:ext uri="{FF2B5EF4-FFF2-40B4-BE49-F238E27FC236}">
+                <a16:creationId xmlns:a16="http://schemas.microsoft.com/office/drawing/2014/main" id="{F27F53A2-2D56-C947-9C09-1CE3075357DF}"/>
+              </a:ext>
+            </a:extLst>
+          </p:cNvPr>
+          <p:cNvSpPr>
+            <a:spLocks noChangeAspect="1"/>
+          </p:cNvSpPr>
+          <p:nvPr/>
+        </p:nvSpPr>
+        <p:spPr bwMode="auto">
+          <a:xfrm>
+            <a:off x="4766553" y="1935039"/>
+            <a:ext cx="365764" cy="365760"/>
+          </a:xfrm>
+          <a:prstGeom prst="ellipse">
+            <a:avLst/>
+          </a:prstGeom>
+          <a:solidFill>
+            <a:srgbClr val="D9D9D9"/>
+          </a:solidFill>
+          <a:ln w="19050" cmpd="sng">
+            <a:solidFill>
+              <a:schemeClr val="tx1">
+                <a:lumMod val="75000"/>
+                <a:lumOff val="25000"/>
+              </a:schemeClr>
+            </a:solidFill>
+            <a:round/>
+            <a:headEnd/>
+            <a:tailEnd/>
+          </a:ln>
+        </p:spPr>
+        <p:txBody>
+          <a:bodyPr anchor="ctr"/>
+          <a:lstStyle/>
+          <a:p>
+            <a:pPr algn="ctr"/>
+            <a:r>
+              <a:rPr lang="en-US" altLang="en-US" i="1" dirty="0">
+                <a:solidFill>
+                  <a:schemeClr val="tx1">
+                    <a:lumMod val="75000"/>
+                    <a:lumOff val="25000"/>
+                  </a:schemeClr>
+                </a:solidFill>
+                <a:latin typeface="Optima" panose="02000503060000020004" pitchFamily="2" charset="0"/>
+              </a:rPr>
+              <a:t>X</a:t>
+            </a:r>
+          </a:p>
+        </p:txBody>
+      </p:sp>
+      <p:cxnSp>
+        <p:nvCxnSpPr>
+          <p:cNvPr id="6" name="Straight Arrow Connector 30">
+            <a:extLst>
+              <a:ext uri="{FF2B5EF4-FFF2-40B4-BE49-F238E27FC236}">
+                <a16:creationId xmlns:a16="http://schemas.microsoft.com/office/drawing/2014/main" id="{D3290F87-73A4-C94B-8744-7F452F563DF2}"/>
+              </a:ext>
+            </a:extLst>
+          </p:cNvPr>
+          <p:cNvCxnSpPr>
+            <a:cxnSpLocks noChangeShapeType="1"/>
+          </p:cNvCxnSpPr>
+          <p:nvPr/>
+        </p:nvCxnSpPr>
+        <p:spPr bwMode="auto">
+          <a:xfrm>
+            <a:off x="5242663" y="2117919"/>
+            <a:ext cx="766252" cy="0"/>
+          </a:xfrm>
+          <a:prstGeom prst="straightConnector1">
+            <a:avLst/>
+          </a:prstGeom>
+          <a:noFill/>
+          <a:ln w="28575" cmpd="sng">
+            <a:solidFill>
+              <a:schemeClr val="tx1">
+                <a:lumMod val="75000"/>
+                <a:lumOff val="25000"/>
+              </a:schemeClr>
+            </a:solidFill>
+            <a:round/>
+            <a:headEnd/>
+            <a:tailEnd type="arrow" w="sm" len="sm"/>
+          </a:ln>
+        </p:spPr>
+      </p:cxnSp>
+      <p:sp>
+        <p:nvSpPr>
+          <p:cNvPr id="7" name="Oval 14">
+            <a:extLst>
+              <a:ext uri="{FF2B5EF4-FFF2-40B4-BE49-F238E27FC236}">
+                <a16:creationId xmlns:a16="http://schemas.microsoft.com/office/drawing/2014/main" id="{D0B49ADD-7CE0-B542-B825-66EAC3B5001F}"/>
+              </a:ext>
+            </a:extLst>
+          </p:cNvPr>
+          <p:cNvSpPr>
+            <a:spLocks noChangeAspect="1"/>
+          </p:cNvSpPr>
+          <p:nvPr/>
+        </p:nvSpPr>
+        <p:spPr bwMode="auto">
+          <a:xfrm>
+            <a:off x="6125088" y="1935039"/>
+            <a:ext cx="365764" cy="365760"/>
+          </a:xfrm>
+          <a:prstGeom prst="ellipse">
+            <a:avLst/>
+          </a:prstGeom>
+          <a:solidFill>
+            <a:srgbClr val="D9D9D9"/>
+          </a:solidFill>
+          <a:ln w="19050" cmpd="sng">
+            <a:solidFill>
+              <a:schemeClr val="tx1">
+                <a:lumMod val="75000"/>
+                <a:lumOff val="25000"/>
+              </a:schemeClr>
+            </a:solidFill>
+            <a:round/>
+            <a:headEnd/>
+            <a:tailEnd/>
+          </a:ln>
+        </p:spPr>
+        <p:txBody>
+          <a:bodyPr anchor="ctr"/>
+          <a:lstStyle/>
+          <a:p>
+            <a:pPr algn="ctr"/>
+            <a:r>
+              <a:rPr lang="en-US" altLang="en-US" i="1" dirty="0">
+                <a:solidFill>
+                  <a:schemeClr val="tx1">
+                    <a:lumMod val="75000"/>
+                    <a:lumOff val="25000"/>
+                  </a:schemeClr>
+                </a:solidFill>
+                <a:latin typeface="Optima" panose="02000503060000020004" pitchFamily="2" charset="0"/>
+              </a:rPr>
+              <a:t>Y</a:t>
+            </a:r>
+          </a:p>
+        </p:txBody>
+      </p:sp>
+      <p:sp>
+        <p:nvSpPr>
+          <p:cNvPr id="8" name="Oval 14">
+            <a:extLst>
+              <a:ext uri="{FF2B5EF4-FFF2-40B4-BE49-F238E27FC236}">
+                <a16:creationId xmlns:a16="http://schemas.microsoft.com/office/drawing/2014/main" id="{40413EC1-B377-C641-B971-C2A50693EDEC}"/>
+              </a:ext>
+            </a:extLst>
+          </p:cNvPr>
+          <p:cNvSpPr>
+            <a:spLocks noChangeAspect="1"/>
+          </p:cNvSpPr>
+          <p:nvPr/>
+        </p:nvSpPr>
+        <p:spPr bwMode="auto">
+          <a:xfrm>
+            <a:off x="5430542" y="3033651"/>
+            <a:ext cx="365764" cy="365760"/>
+          </a:xfrm>
+          <a:prstGeom prst="ellipse">
+            <a:avLst/>
+          </a:prstGeom>
+          <a:solidFill>
+            <a:srgbClr val="D9D9D9"/>
+          </a:solidFill>
+          <a:ln w="19050" cmpd="sng">
+            <a:solidFill>
+              <a:schemeClr val="tx1">
+                <a:lumMod val="75000"/>
+                <a:lumOff val="25000"/>
+              </a:schemeClr>
+            </a:solidFill>
+            <a:round/>
+            <a:headEnd/>
+            <a:tailEnd/>
+          </a:ln>
+        </p:spPr>
+        <p:txBody>
+          <a:bodyPr anchor="ctr"/>
+          <a:lstStyle/>
+          <a:p>
+            <a:pPr algn="ctr"/>
+            <a:r>
+              <a:rPr lang="en-US" altLang="en-US" i="1" dirty="0">
+                <a:solidFill>
+                  <a:schemeClr val="tx1">
+                    <a:lumMod val="75000"/>
+                    <a:lumOff val="25000"/>
+                  </a:schemeClr>
+                </a:solidFill>
+                <a:latin typeface="Optima" panose="02000503060000020004" pitchFamily="2" charset="0"/>
+              </a:rPr>
+              <a:t>Z</a:t>
+            </a:r>
+          </a:p>
+        </p:txBody>
+      </p:sp>
+      <p:sp>
+        <p:nvSpPr>
+          <p:cNvPr id="9" name="TextBox 8">
+            <a:extLst>
+              <a:ext uri="{FF2B5EF4-FFF2-40B4-BE49-F238E27FC236}">
+                <a16:creationId xmlns:a16="http://schemas.microsoft.com/office/drawing/2014/main" id="{3583851E-C1A3-2542-B433-2ED501265F1F}"/>
+              </a:ext>
+            </a:extLst>
+          </p:cNvPr>
+          <p:cNvSpPr txBox="1"/>
+          <p:nvPr/>
+        </p:nvSpPr>
+        <p:spPr>
+          <a:xfrm>
+            <a:off x="5425692" y="1682434"/>
+            <a:ext cx="370614" cy="461665"/>
+          </a:xfrm>
+          <a:prstGeom prst="rect">
+            <a:avLst/>
+          </a:prstGeom>
+          <a:noFill/>
+        </p:spPr>
+        <p:txBody>
+          <a:bodyPr wrap="none" rtlCol="0">
+            <a:spAutoFit/>
+          </a:bodyPr>
+          <a:lstStyle/>
+          <a:p>
+            <a:pPr algn="ctr" fontAlgn="base"/>
+            <a:r>
+              <a:rPr lang="en-US" sz="2400" b="1" dirty="0">
+                <a:solidFill>
+                  <a:schemeClr val="tx1">
+                    <a:lumMod val="75000"/>
+                    <a:lumOff val="25000"/>
+                  </a:schemeClr>
+                </a:solidFill>
+                <a:latin typeface="Optima" panose="02000503060000020004" pitchFamily="2" charset="0"/>
+              </a:rPr>
+              <a:t>−</a:t>
+            </a:r>
+          </a:p>
+        </p:txBody>
+      </p:sp>
+      <p:cxnSp>
+        <p:nvCxnSpPr>
+          <p:cNvPr id="11" name="Straight Arrow Connector 30">
+            <a:extLst>
+              <a:ext uri="{FF2B5EF4-FFF2-40B4-BE49-F238E27FC236}">
+                <a16:creationId xmlns:a16="http://schemas.microsoft.com/office/drawing/2014/main" id="{8FDAD1F3-25A4-CB47-AD7B-972FFECEEB37}"/>
+              </a:ext>
+            </a:extLst>
+          </p:cNvPr>
+          <p:cNvCxnSpPr>
+            <a:cxnSpLocks noChangeShapeType="1"/>
+          </p:cNvCxnSpPr>
+          <p:nvPr/>
+        </p:nvCxnSpPr>
+        <p:spPr bwMode="auto">
+          <a:xfrm flipH="1" flipV="1">
+            <a:off x="5051100" y="2361132"/>
+            <a:ext cx="383126" cy="610966"/>
+          </a:xfrm>
+          <a:prstGeom prst="straightConnector1">
+            <a:avLst/>
+          </a:prstGeom>
+          <a:noFill/>
+          <a:ln w="28575" cmpd="sng">
+            <a:solidFill>
+              <a:schemeClr val="tx1">
+                <a:lumMod val="75000"/>
+                <a:lumOff val="25000"/>
+              </a:schemeClr>
+            </a:solidFill>
+            <a:round/>
+            <a:headEnd/>
+            <a:tailEnd type="arrow" w="sm" len="sm"/>
+          </a:ln>
+        </p:spPr>
+      </p:cxnSp>
+      <p:cxnSp>
+        <p:nvCxnSpPr>
+          <p:cNvPr id="15" name="Straight Arrow Connector 30">
+            <a:extLst>
+              <a:ext uri="{FF2B5EF4-FFF2-40B4-BE49-F238E27FC236}">
+                <a16:creationId xmlns:a16="http://schemas.microsoft.com/office/drawing/2014/main" id="{724F1B7A-A9B3-AD42-9669-D55F5B684483}"/>
+              </a:ext>
+            </a:extLst>
+          </p:cNvPr>
+          <p:cNvCxnSpPr>
+            <a:cxnSpLocks noChangeShapeType="1"/>
+          </p:cNvCxnSpPr>
+          <p:nvPr/>
+        </p:nvCxnSpPr>
+        <p:spPr bwMode="auto">
+          <a:xfrm flipH="1">
+            <a:off x="5718775" y="2378432"/>
+            <a:ext cx="383126" cy="610966"/>
+          </a:xfrm>
+          <a:prstGeom prst="straightConnector1">
+            <a:avLst/>
+          </a:prstGeom>
+          <a:noFill/>
+          <a:ln w="28575" cmpd="sng">
+            <a:solidFill>
+              <a:schemeClr val="tx1">
+                <a:lumMod val="75000"/>
+                <a:lumOff val="25000"/>
+              </a:schemeClr>
+            </a:solidFill>
+            <a:round/>
+            <a:headEnd/>
+            <a:tailEnd type="arrow" w="sm" len="sm"/>
+          </a:ln>
+        </p:spPr>
+      </p:cxnSp>
+      <p:sp>
+        <p:nvSpPr>
+          <p:cNvPr id="16" name="TextBox 15">
+            <a:extLst>
+              <a:ext uri="{FF2B5EF4-FFF2-40B4-BE49-F238E27FC236}">
+                <a16:creationId xmlns:a16="http://schemas.microsoft.com/office/drawing/2014/main" id="{8A21052E-D837-8344-A1BD-33601AAA05EF}"/>
+              </a:ext>
+            </a:extLst>
+          </p:cNvPr>
+          <p:cNvSpPr txBox="1"/>
+          <p:nvPr/>
+        </p:nvSpPr>
+        <p:spPr>
+          <a:xfrm>
+            <a:off x="5910338" y="2499911"/>
+            <a:ext cx="370614" cy="461665"/>
+          </a:xfrm>
+          <a:prstGeom prst="rect">
+            <a:avLst/>
+          </a:prstGeom>
+          <a:noFill/>
+        </p:spPr>
+        <p:txBody>
+          <a:bodyPr wrap="none" rtlCol="0">
+            <a:spAutoFit/>
+          </a:bodyPr>
+          <a:lstStyle/>
+          <a:p>
+            <a:pPr algn="ctr" fontAlgn="base"/>
+            <a:r>
+              <a:rPr lang="en-US" sz="2400" b="1" dirty="0">
+                <a:solidFill>
+                  <a:schemeClr val="tx1">
+                    <a:lumMod val="75000"/>
+                    <a:lumOff val="25000"/>
+                  </a:schemeClr>
+                </a:solidFill>
+                <a:latin typeface="Optima" panose="02000503060000020004" pitchFamily="2" charset="0"/>
+              </a:rPr>
+              <a:t>−</a:t>
+            </a:r>
+          </a:p>
+        </p:txBody>
+      </p:sp>
+      <p:sp>
+        <p:nvSpPr>
+          <p:cNvPr id="17" name="TextBox 16">
+            <a:extLst>
+              <a:ext uri="{FF2B5EF4-FFF2-40B4-BE49-F238E27FC236}">
+                <a16:creationId xmlns:a16="http://schemas.microsoft.com/office/drawing/2014/main" id="{184F3DD9-AA3D-114A-A889-3FB8DCA475D2}"/>
+              </a:ext>
+            </a:extLst>
+          </p:cNvPr>
+          <p:cNvSpPr txBox="1"/>
+          <p:nvPr/>
+        </p:nvSpPr>
+        <p:spPr>
+          <a:xfrm>
+            <a:off x="4872049" y="2499911"/>
+            <a:ext cx="370614" cy="461665"/>
+          </a:xfrm>
+          <a:prstGeom prst="rect">
+            <a:avLst/>
+          </a:prstGeom>
+          <a:noFill/>
+        </p:spPr>
+        <p:txBody>
+          <a:bodyPr wrap="none" rtlCol="0">
+            <a:spAutoFit/>
+          </a:bodyPr>
+          <a:lstStyle/>
+          <a:p>
+            <a:pPr algn="ctr" fontAlgn="base"/>
+            <a:r>
+              <a:rPr lang="en-US" sz="2400" b="1" dirty="0">
+                <a:solidFill>
+                  <a:schemeClr val="tx1">
+                    <a:lumMod val="75000"/>
+                    <a:lumOff val="25000"/>
+                  </a:schemeClr>
+                </a:solidFill>
+                <a:latin typeface="Optima" panose="02000503060000020004" pitchFamily="2" charset="0"/>
+              </a:rPr>
+              <a:t>−</a:t>
+            </a:r>
+          </a:p>
+        </p:txBody>
+      </p:sp>
+    </p:spTree>
+    <p:extLst>
+      <p:ext uri="{BB962C8B-B14F-4D97-AF65-F5344CB8AC3E}">
+        <p14:creationId xmlns:p14="http://schemas.microsoft.com/office/powerpoint/2010/main" val="1676049976"/>
       </p:ext>
     </p:extLst>
   </p:cSld>

</xml_diff>

<commit_message>
Two time step figure
</commit_message>
<xml_diff>
--- a/figures/MMBS Figures.pptx
+++ b/figures/MMBS Figures.pptx
@@ -5,7 +5,7 @@
     <p:sldMasterId id="2147483648" r:id="rId1"/>
   </p:sldMasterIdLst>
   <p:notesMasterIdLst>
-    <p:notesMasterId r:id="rId7"/>
+    <p:notesMasterId r:id="rId8"/>
   </p:notesMasterIdLst>
   <p:sldIdLst>
     <p:sldId id="2644" r:id="rId2"/>
@@ -13,6 +13,7 @@
     <p:sldId id="2646" r:id="rId4"/>
     <p:sldId id="2647" r:id="rId5"/>
     <p:sldId id="2648" r:id="rId6"/>
+    <p:sldId id="2649" r:id="rId7"/>
   </p:sldIdLst>
   <p:sldSz cx="12192000" cy="6858000"/>
   <p:notesSz cx="6858000" cy="9144000"/>
@@ -956,6 +957,94 @@
     <p:extLst>
       <p:ext uri="{BB962C8B-B14F-4D97-AF65-F5344CB8AC3E}">
         <p14:creationId xmlns:p14="http://schemas.microsoft.com/office/powerpoint/2010/main" val="450055493"/>
+      </p:ext>
+    </p:extLst>
+  </p:cSld>
+  <p:clrMapOvr>
+    <a:masterClrMapping/>
+  </p:clrMapOvr>
+</p:notes>
+</file>
+
+<file path=ppt/notesSlides/notesSlide6.xml><?xml version="1.0" encoding="utf-8"?>
+<p:notes xmlns:a="http://schemas.openxmlformats.org/drawingml/2006/main" xmlns:r="http://schemas.openxmlformats.org/officeDocument/2006/relationships" xmlns:p="http://schemas.openxmlformats.org/presentationml/2006/main">
+  <p:cSld>
+    <p:spTree>
+      <p:nvGrpSpPr>
+        <p:cNvPr id="1" name=""/>
+        <p:cNvGrpSpPr/>
+        <p:nvPr/>
+      </p:nvGrpSpPr>
+      <p:grpSpPr>
+        <a:xfrm>
+          <a:off x="0" y="0"/>
+          <a:ext cx="0" cy="0"/>
+          <a:chOff x="0" y="0"/>
+          <a:chExt cx="0" cy="0"/>
+        </a:xfrm>
+      </p:grpSpPr>
+      <p:sp>
+        <p:nvSpPr>
+          <p:cNvPr id="2" name="Slide Image Placeholder 1"/>
+          <p:cNvSpPr>
+            <a:spLocks noGrp="1" noRot="1" noChangeAspect="1"/>
+          </p:cNvSpPr>
+          <p:nvPr>
+            <p:ph type="sldImg"/>
+          </p:nvPr>
+        </p:nvSpPr>
+        <p:spPr/>
+      </p:sp>
+      <p:sp>
+        <p:nvSpPr>
+          <p:cNvPr id="3" name="Notes Placeholder 2"/>
+          <p:cNvSpPr>
+            <a:spLocks noGrp="1"/>
+          </p:cNvSpPr>
+          <p:nvPr>
+            <p:ph type="body" idx="1"/>
+          </p:nvPr>
+        </p:nvSpPr>
+        <p:spPr/>
+        <p:txBody>
+          <a:bodyPr/>
+          <a:lstStyle/>
+          <a:p>
+            <a:r>
+              <a:rPr lang="en-US" dirty="0" err="1"/>
+              <a:t>A_concentration_two_time_steps_partial</a:t>
+            </a:r>
+            <a:endParaRPr lang="en-US" dirty="0"/>
+          </a:p>
+        </p:txBody>
+      </p:sp>
+      <p:sp>
+        <p:nvSpPr>
+          <p:cNvPr id="4" name="Slide Number Placeholder 3"/>
+          <p:cNvSpPr>
+            <a:spLocks noGrp="1"/>
+          </p:cNvSpPr>
+          <p:nvPr>
+            <p:ph type="sldNum" sz="quarter" idx="5"/>
+          </p:nvPr>
+        </p:nvSpPr>
+        <p:spPr/>
+        <p:txBody>
+          <a:bodyPr/>
+          <a:lstStyle/>
+          <a:p>
+            <a:fld id="{1FA7716F-88A2-8E4E-B694-34C10F2D9928}" type="slidenum">
+              <a:rPr lang="en-US" smtClean="0"/>
+              <a:t>6</a:t>
+            </a:fld>
+            <a:endParaRPr lang="en-US"/>
+          </a:p>
+        </p:txBody>
+      </p:sp>
+    </p:spTree>
+    <p:extLst>
+      <p:ext uri="{BB962C8B-B14F-4D97-AF65-F5344CB8AC3E}">
+        <p14:creationId xmlns:p14="http://schemas.microsoft.com/office/powerpoint/2010/main" val="883574035"/>
       </p:ext>
     </p:extLst>
   </p:cSld>
@@ -11113,6 +11202,2746 @@
 </p:sld>
 </file>
 
+<file path=ppt/slides/slide6.xml><?xml version="1.0" encoding="utf-8"?>
+<p:sld xmlns:a="http://schemas.openxmlformats.org/drawingml/2006/main" xmlns:r="http://schemas.openxmlformats.org/officeDocument/2006/relationships" xmlns:p="http://schemas.openxmlformats.org/presentationml/2006/main">
+  <p:cSld>
+    <p:spTree>
+      <p:nvGrpSpPr>
+        <p:cNvPr id="1" name=""/>
+        <p:cNvGrpSpPr/>
+        <p:nvPr/>
+      </p:nvGrpSpPr>
+      <p:grpSpPr>
+        <a:xfrm>
+          <a:off x="0" y="0"/>
+          <a:ext cx="0" cy="0"/>
+          <a:chOff x="0" y="0"/>
+          <a:chExt cx="0" cy="0"/>
+        </a:xfrm>
+      </p:grpSpPr>
+      <p:graphicFrame>
+        <p:nvGraphicFramePr>
+          <p:cNvPr id="4" name="Table 4">
+            <a:extLst>
+              <a:ext uri="{FF2B5EF4-FFF2-40B4-BE49-F238E27FC236}">
+                <a16:creationId xmlns:a16="http://schemas.microsoft.com/office/drawing/2014/main" id="{F991F809-7408-BF46-846B-D45336779E73}"/>
+              </a:ext>
+            </a:extLst>
+          </p:cNvPr>
+          <p:cNvGraphicFramePr>
+            <a:graphicFrameLocks noGrp="1"/>
+          </p:cNvGraphicFramePr>
+          <p:nvPr>
+            <p:extLst>
+              <p:ext uri="{D42A27DB-BD31-4B8C-83A1-F6EECF244321}">
+                <p14:modId xmlns:p14="http://schemas.microsoft.com/office/powerpoint/2010/main" val="24029564"/>
+              </p:ext>
+            </p:extLst>
+          </p:nvPr>
+        </p:nvGraphicFramePr>
+        <p:xfrm>
+          <a:off x="2032000" y="719666"/>
+          <a:ext cx="3657600" cy="3657600"/>
+        </p:xfrm>
+        <a:graphic>
+          <a:graphicData uri="http://schemas.openxmlformats.org/drawingml/2006/table">
+            <a:tbl>
+              <a:tblPr firstRow="1" bandRow="1">
+                <a:tableStyleId>{5C22544A-7EE6-4342-B048-85BDC9FD1C3A}</a:tableStyleId>
+              </a:tblPr>
+              <a:tblGrid>
+                <a:gridCol w="731520">
+                  <a:extLst>
+                    <a:ext uri="{9D8B030D-6E8A-4147-A177-3AD203B41FA5}">
+                      <a16:colId xmlns:a16="http://schemas.microsoft.com/office/drawing/2014/main" val="64487363"/>
+                    </a:ext>
+                  </a:extLst>
+                </a:gridCol>
+                <a:gridCol w="731520">
+                  <a:extLst>
+                    <a:ext uri="{9D8B030D-6E8A-4147-A177-3AD203B41FA5}">
+                      <a16:colId xmlns:a16="http://schemas.microsoft.com/office/drawing/2014/main" val="1494506360"/>
+                    </a:ext>
+                  </a:extLst>
+                </a:gridCol>
+                <a:gridCol w="731520">
+                  <a:extLst>
+                    <a:ext uri="{9D8B030D-6E8A-4147-A177-3AD203B41FA5}">
+                      <a16:colId xmlns:a16="http://schemas.microsoft.com/office/drawing/2014/main" val="1972404400"/>
+                    </a:ext>
+                  </a:extLst>
+                </a:gridCol>
+                <a:gridCol w="731520">
+                  <a:extLst>
+                    <a:ext uri="{9D8B030D-6E8A-4147-A177-3AD203B41FA5}">
+                      <a16:colId xmlns:a16="http://schemas.microsoft.com/office/drawing/2014/main" val="2274171207"/>
+                    </a:ext>
+                  </a:extLst>
+                </a:gridCol>
+                <a:gridCol w="731520">
+                  <a:extLst>
+                    <a:ext uri="{9D8B030D-6E8A-4147-A177-3AD203B41FA5}">
+                      <a16:colId xmlns:a16="http://schemas.microsoft.com/office/drawing/2014/main" val="1580668807"/>
+                    </a:ext>
+                  </a:extLst>
+                </a:gridCol>
+              </a:tblGrid>
+              <a:tr h="731520">
+                <a:tc>
+                  <a:txBody>
+                    <a:bodyPr/>
+                    <a:lstStyle/>
+                    <a:p>
+                      <a:pPr marL="0" marR="0" lvl="0" indent="0" algn="ctr" defTabSz="914400" rtl="0" eaLnBrk="1" fontAlgn="auto" latinLnBrk="0" hangingPunct="1">
+                        <a:lnSpc>
+                          <a:spcPct val="100000"/>
+                        </a:lnSpc>
+                        <a:spcBef>
+                          <a:spcPts val="0"/>
+                        </a:spcBef>
+                        <a:spcAft>
+                          <a:spcPts val="0"/>
+                        </a:spcAft>
+                        <a:buClrTx/>
+                        <a:buSzTx/>
+                        <a:buFontTx/>
+                        <a:buNone/>
+                        <a:tabLst/>
+                        <a:defRPr/>
+                      </a:pPr>
+                      <a:r>
+                        <a:rPr kumimoji="0" lang="en-US" sz="1800" b="0" i="0" u="none" strike="noStrike" kern="1200" cap="none" spc="0" normalizeH="0" baseline="0" noProof="0">
+                          <a:ln>
+                            <a:noFill/>
+                          </a:ln>
+                          <a:solidFill>
+                            <a:srgbClr val="000000">
+                              <a:lumMod val="75000"/>
+                              <a:lumOff val="25000"/>
+                            </a:srgbClr>
+                          </a:solidFill>
+                          <a:effectLst/>
+                          <a:uLnTx/>
+                          <a:uFillTx/>
+                          <a:latin typeface="Optima" panose="02000503060000020004" pitchFamily="2" charset="0"/>
+                          <a:ea typeface="+mn-ea"/>
+                          <a:cs typeface="+mn-cs"/>
+                        </a:rPr>
+                        <a:t>?</a:t>
+                      </a:r>
+                      <a:endParaRPr kumimoji="0" lang="en-US" sz="1800" b="0" i="0" u="none" strike="noStrike" kern="1200" cap="none" spc="0" normalizeH="0" baseline="0" noProof="0" dirty="0">
+                        <a:ln>
+                          <a:noFill/>
+                        </a:ln>
+                        <a:solidFill>
+                          <a:srgbClr val="000000">
+                            <a:lumMod val="75000"/>
+                            <a:lumOff val="25000"/>
+                          </a:srgbClr>
+                        </a:solidFill>
+                        <a:effectLst/>
+                        <a:uLnTx/>
+                        <a:uFillTx/>
+                        <a:latin typeface="Optima" panose="02000503060000020004" pitchFamily="2" charset="0"/>
+                        <a:ea typeface="+mn-ea"/>
+                        <a:cs typeface="+mn-cs"/>
+                      </a:endParaRPr>
+                    </a:p>
+                  </a:txBody>
+                  <a:tcPr anchor="ctr">
+                    <a:lnL w="12700" cap="flat" cmpd="sng" algn="ctr">
+                      <a:solidFill>
+                        <a:schemeClr val="tx1">
+                          <a:lumMod val="75000"/>
+                          <a:lumOff val="25000"/>
+                        </a:schemeClr>
+                      </a:solidFill>
+                      <a:prstDash val="solid"/>
+                      <a:round/>
+                      <a:headEnd type="none" w="med" len="med"/>
+                      <a:tailEnd type="none" w="med" len="med"/>
+                    </a:lnL>
+                    <a:lnR w="12700" cap="flat" cmpd="sng" algn="ctr">
+                      <a:solidFill>
+                        <a:schemeClr val="tx1">
+                          <a:lumMod val="75000"/>
+                          <a:lumOff val="25000"/>
+                        </a:schemeClr>
+                      </a:solidFill>
+                      <a:prstDash val="solid"/>
+                      <a:round/>
+                      <a:headEnd type="none" w="med" len="med"/>
+                      <a:tailEnd type="none" w="med" len="med"/>
+                    </a:lnR>
+                    <a:lnT w="12700" cap="flat" cmpd="sng" algn="ctr">
+                      <a:solidFill>
+                        <a:schemeClr val="tx1">
+                          <a:lumMod val="75000"/>
+                          <a:lumOff val="25000"/>
+                        </a:schemeClr>
+                      </a:solidFill>
+                      <a:prstDash val="solid"/>
+                      <a:round/>
+                      <a:headEnd type="none" w="med" len="med"/>
+                      <a:tailEnd type="none" w="med" len="med"/>
+                    </a:lnT>
+                    <a:lnB w="12700" cap="flat" cmpd="sng" algn="ctr">
+                      <a:solidFill>
+                        <a:schemeClr val="tx1">
+                          <a:lumMod val="75000"/>
+                          <a:lumOff val="25000"/>
+                        </a:schemeClr>
+                      </a:solidFill>
+                      <a:prstDash val="solid"/>
+                      <a:round/>
+                      <a:headEnd type="none" w="med" len="med"/>
+                      <a:tailEnd type="none" w="med" len="med"/>
+                    </a:lnB>
+                    <a:noFill/>
+                  </a:tcPr>
+                </a:tc>
+                <a:tc>
+                  <a:txBody>
+                    <a:bodyPr/>
+                    <a:lstStyle/>
+                    <a:p>
+                      <a:pPr marL="0" marR="0" lvl="0" indent="0" algn="ctr" defTabSz="914400" rtl="0" eaLnBrk="1" fontAlgn="auto" latinLnBrk="0" hangingPunct="1">
+                        <a:lnSpc>
+                          <a:spcPct val="100000"/>
+                        </a:lnSpc>
+                        <a:spcBef>
+                          <a:spcPts val="0"/>
+                        </a:spcBef>
+                        <a:spcAft>
+                          <a:spcPts val="0"/>
+                        </a:spcAft>
+                        <a:buClrTx/>
+                        <a:buSzTx/>
+                        <a:buFontTx/>
+                        <a:buNone/>
+                        <a:tabLst/>
+                        <a:defRPr/>
+                      </a:pPr>
+                      <a:r>
+                        <a:rPr kumimoji="0" lang="en-US" sz="1800" b="0" i="0" u="none" strike="noStrike" kern="1200" cap="none" spc="0" normalizeH="0" baseline="0" noProof="0">
+                          <a:ln>
+                            <a:noFill/>
+                          </a:ln>
+                          <a:solidFill>
+                            <a:srgbClr val="000000">
+                              <a:lumMod val="75000"/>
+                              <a:lumOff val="25000"/>
+                            </a:srgbClr>
+                          </a:solidFill>
+                          <a:effectLst/>
+                          <a:uLnTx/>
+                          <a:uFillTx/>
+                          <a:latin typeface="Optima" panose="02000503060000020004" pitchFamily="2" charset="0"/>
+                          <a:ea typeface="+mn-ea"/>
+                          <a:cs typeface="+mn-cs"/>
+                        </a:rPr>
+                        <a:t>?</a:t>
+                      </a:r>
+                      <a:endParaRPr kumimoji="0" lang="en-US" sz="1800" b="0" i="0" u="none" strike="noStrike" kern="1200" cap="none" spc="0" normalizeH="0" baseline="0" noProof="0" dirty="0">
+                        <a:ln>
+                          <a:noFill/>
+                        </a:ln>
+                        <a:solidFill>
+                          <a:srgbClr val="000000">
+                            <a:lumMod val="75000"/>
+                            <a:lumOff val="25000"/>
+                          </a:srgbClr>
+                        </a:solidFill>
+                        <a:effectLst/>
+                        <a:uLnTx/>
+                        <a:uFillTx/>
+                        <a:latin typeface="Optima" panose="02000503060000020004" pitchFamily="2" charset="0"/>
+                        <a:ea typeface="+mn-ea"/>
+                        <a:cs typeface="+mn-cs"/>
+                      </a:endParaRPr>
+                    </a:p>
+                  </a:txBody>
+                  <a:tcPr anchor="ctr">
+                    <a:lnL w="12700" cap="flat" cmpd="sng" algn="ctr">
+                      <a:solidFill>
+                        <a:schemeClr val="tx1">
+                          <a:lumMod val="75000"/>
+                          <a:lumOff val="25000"/>
+                        </a:schemeClr>
+                      </a:solidFill>
+                      <a:prstDash val="solid"/>
+                      <a:round/>
+                      <a:headEnd type="none" w="med" len="med"/>
+                      <a:tailEnd type="none" w="med" len="med"/>
+                    </a:lnL>
+                    <a:lnR w="12700" cap="flat" cmpd="sng" algn="ctr">
+                      <a:solidFill>
+                        <a:schemeClr val="tx1">
+                          <a:lumMod val="75000"/>
+                          <a:lumOff val="25000"/>
+                        </a:schemeClr>
+                      </a:solidFill>
+                      <a:prstDash val="solid"/>
+                      <a:round/>
+                      <a:headEnd type="none" w="med" len="med"/>
+                      <a:tailEnd type="none" w="med" len="med"/>
+                    </a:lnR>
+                    <a:lnT w="12700" cap="flat" cmpd="sng" algn="ctr">
+                      <a:solidFill>
+                        <a:schemeClr val="tx1">
+                          <a:lumMod val="75000"/>
+                          <a:lumOff val="25000"/>
+                        </a:schemeClr>
+                      </a:solidFill>
+                      <a:prstDash val="solid"/>
+                      <a:round/>
+                      <a:headEnd type="none" w="med" len="med"/>
+                      <a:tailEnd type="none" w="med" len="med"/>
+                    </a:lnT>
+                    <a:lnB w="12700" cap="flat" cmpd="sng" algn="ctr">
+                      <a:solidFill>
+                        <a:schemeClr val="tx1">
+                          <a:lumMod val="75000"/>
+                          <a:lumOff val="25000"/>
+                        </a:schemeClr>
+                      </a:solidFill>
+                      <a:prstDash val="solid"/>
+                      <a:round/>
+                      <a:headEnd type="none" w="med" len="med"/>
+                      <a:tailEnd type="none" w="med" len="med"/>
+                    </a:lnB>
+                    <a:noFill/>
+                  </a:tcPr>
+                </a:tc>
+                <a:tc>
+                  <a:txBody>
+                    <a:bodyPr/>
+                    <a:lstStyle/>
+                    <a:p>
+                      <a:pPr marL="0" marR="0" lvl="0" indent="0" algn="ctr" defTabSz="914400" rtl="0" eaLnBrk="1" fontAlgn="auto" latinLnBrk="0" hangingPunct="1">
+                        <a:lnSpc>
+                          <a:spcPct val="100000"/>
+                        </a:lnSpc>
+                        <a:spcBef>
+                          <a:spcPts val="0"/>
+                        </a:spcBef>
+                        <a:spcAft>
+                          <a:spcPts val="0"/>
+                        </a:spcAft>
+                        <a:buClrTx/>
+                        <a:buSzTx/>
+                        <a:buFontTx/>
+                        <a:buNone/>
+                        <a:tabLst/>
+                        <a:defRPr/>
+                      </a:pPr>
+                      <a:r>
+                        <a:rPr kumimoji="0" lang="en-US" sz="1800" b="0" i="0" u="none" strike="noStrike" kern="1200" cap="none" spc="0" normalizeH="0" baseline="0" noProof="0">
+                          <a:ln>
+                            <a:noFill/>
+                          </a:ln>
+                          <a:solidFill>
+                            <a:srgbClr val="000000">
+                              <a:lumMod val="75000"/>
+                              <a:lumOff val="25000"/>
+                            </a:srgbClr>
+                          </a:solidFill>
+                          <a:effectLst/>
+                          <a:uLnTx/>
+                          <a:uFillTx/>
+                          <a:latin typeface="Optima" panose="02000503060000020004" pitchFamily="2" charset="0"/>
+                          <a:ea typeface="+mn-ea"/>
+                          <a:cs typeface="+mn-cs"/>
+                        </a:rPr>
+                        <a:t>?</a:t>
+                      </a:r>
+                      <a:endParaRPr kumimoji="0" lang="en-US" sz="1800" b="0" i="0" u="none" strike="noStrike" kern="1200" cap="none" spc="0" normalizeH="0" baseline="0" noProof="0" dirty="0">
+                        <a:ln>
+                          <a:noFill/>
+                        </a:ln>
+                        <a:solidFill>
+                          <a:srgbClr val="000000">
+                            <a:lumMod val="75000"/>
+                            <a:lumOff val="25000"/>
+                          </a:srgbClr>
+                        </a:solidFill>
+                        <a:effectLst/>
+                        <a:uLnTx/>
+                        <a:uFillTx/>
+                        <a:latin typeface="Optima" panose="02000503060000020004" pitchFamily="2" charset="0"/>
+                        <a:ea typeface="+mn-ea"/>
+                        <a:cs typeface="+mn-cs"/>
+                      </a:endParaRPr>
+                    </a:p>
+                  </a:txBody>
+                  <a:tcPr anchor="ctr">
+                    <a:lnL w="12700" cap="flat" cmpd="sng" algn="ctr">
+                      <a:solidFill>
+                        <a:schemeClr val="tx1">
+                          <a:lumMod val="75000"/>
+                          <a:lumOff val="25000"/>
+                        </a:schemeClr>
+                      </a:solidFill>
+                      <a:prstDash val="solid"/>
+                      <a:round/>
+                      <a:headEnd type="none" w="med" len="med"/>
+                      <a:tailEnd type="none" w="med" len="med"/>
+                    </a:lnL>
+                    <a:lnR w="12700" cap="flat" cmpd="sng" algn="ctr">
+                      <a:solidFill>
+                        <a:schemeClr val="tx1">
+                          <a:lumMod val="75000"/>
+                          <a:lumOff val="25000"/>
+                        </a:schemeClr>
+                      </a:solidFill>
+                      <a:prstDash val="solid"/>
+                      <a:round/>
+                      <a:headEnd type="none" w="med" len="med"/>
+                      <a:tailEnd type="none" w="med" len="med"/>
+                    </a:lnR>
+                    <a:lnT w="12700" cap="flat" cmpd="sng" algn="ctr">
+                      <a:solidFill>
+                        <a:schemeClr val="tx1">
+                          <a:lumMod val="75000"/>
+                          <a:lumOff val="25000"/>
+                        </a:schemeClr>
+                      </a:solidFill>
+                      <a:prstDash val="solid"/>
+                      <a:round/>
+                      <a:headEnd type="none" w="med" len="med"/>
+                      <a:tailEnd type="none" w="med" len="med"/>
+                    </a:lnT>
+                    <a:lnB w="12700" cap="flat" cmpd="sng" algn="ctr">
+                      <a:solidFill>
+                        <a:schemeClr val="tx1">
+                          <a:lumMod val="75000"/>
+                          <a:lumOff val="25000"/>
+                        </a:schemeClr>
+                      </a:solidFill>
+                      <a:prstDash val="solid"/>
+                      <a:round/>
+                      <a:headEnd type="none" w="med" len="med"/>
+                      <a:tailEnd type="none" w="med" len="med"/>
+                    </a:lnB>
+                    <a:noFill/>
+                  </a:tcPr>
+                </a:tc>
+                <a:tc>
+                  <a:txBody>
+                    <a:bodyPr/>
+                    <a:lstStyle/>
+                    <a:p>
+                      <a:pPr marL="0" marR="0" lvl="0" indent="0" algn="ctr" defTabSz="914400" rtl="0" eaLnBrk="1" fontAlgn="auto" latinLnBrk="0" hangingPunct="1">
+                        <a:lnSpc>
+                          <a:spcPct val="100000"/>
+                        </a:lnSpc>
+                        <a:spcBef>
+                          <a:spcPts val="0"/>
+                        </a:spcBef>
+                        <a:spcAft>
+                          <a:spcPts val="0"/>
+                        </a:spcAft>
+                        <a:buClrTx/>
+                        <a:buSzTx/>
+                        <a:buFontTx/>
+                        <a:buNone/>
+                        <a:tabLst/>
+                        <a:defRPr/>
+                      </a:pPr>
+                      <a:r>
+                        <a:rPr kumimoji="0" lang="en-US" sz="1800" b="0" i="0" u="none" strike="noStrike" kern="1200" cap="none" spc="0" normalizeH="0" baseline="0" noProof="0">
+                          <a:ln>
+                            <a:noFill/>
+                          </a:ln>
+                          <a:solidFill>
+                            <a:srgbClr val="000000">
+                              <a:lumMod val="75000"/>
+                              <a:lumOff val="25000"/>
+                            </a:srgbClr>
+                          </a:solidFill>
+                          <a:effectLst/>
+                          <a:uLnTx/>
+                          <a:uFillTx/>
+                          <a:latin typeface="Optima" panose="02000503060000020004" pitchFamily="2" charset="0"/>
+                          <a:ea typeface="+mn-ea"/>
+                          <a:cs typeface="+mn-cs"/>
+                        </a:rPr>
+                        <a:t>?</a:t>
+                      </a:r>
+                      <a:endParaRPr kumimoji="0" lang="en-US" sz="1800" b="0" i="0" u="none" strike="noStrike" kern="1200" cap="none" spc="0" normalizeH="0" baseline="0" noProof="0" dirty="0">
+                        <a:ln>
+                          <a:noFill/>
+                        </a:ln>
+                        <a:solidFill>
+                          <a:srgbClr val="000000">
+                            <a:lumMod val="75000"/>
+                            <a:lumOff val="25000"/>
+                          </a:srgbClr>
+                        </a:solidFill>
+                        <a:effectLst/>
+                        <a:uLnTx/>
+                        <a:uFillTx/>
+                        <a:latin typeface="Optima" panose="02000503060000020004" pitchFamily="2" charset="0"/>
+                        <a:ea typeface="+mn-ea"/>
+                        <a:cs typeface="+mn-cs"/>
+                      </a:endParaRPr>
+                    </a:p>
+                  </a:txBody>
+                  <a:tcPr anchor="ctr">
+                    <a:lnL w="12700" cap="flat" cmpd="sng" algn="ctr">
+                      <a:solidFill>
+                        <a:schemeClr val="tx1">
+                          <a:lumMod val="75000"/>
+                          <a:lumOff val="25000"/>
+                        </a:schemeClr>
+                      </a:solidFill>
+                      <a:prstDash val="solid"/>
+                      <a:round/>
+                      <a:headEnd type="none" w="med" len="med"/>
+                      <a:tailEnd type="none" w="med" len="med"/>
+                    </a:lnL>
+                    <a:lnR w="12700" cap="flat" cmpd="sng" algn="ctr">
+                      <a:solidFill>
+                        <a:schemeClr val="tx1">
+                          <a:lumMod val="75000"/>
+                          <a:lumOff val="25000"/>
+                        </a:schemeClr>
+                      </a:solidFill>
+                      <a:prstDash val="solid"/>
+                      <a:round/>
+                      <a:headEnd type="none" w="med" len="med"/>
+                      <a:tailEnd type="none" w="med" len="med"/>
+                    </a:lnR>
+                    <a:lnT w="12700" cap="flat" cmpd="sng" algn="ctr">
+                      <a:solidFill>
+                        <a:schemeClr val="tx1">
+                          <a:lumMod val="75000"/>
+                          <a:lumOff val="25000"/>
+                        </a:schemeClr>
+                      </a:solidFill>
+                      <a:prstDash val="solid"/>
+                      <a:round/>
+                      <a:headEnd type="none" w="med" len="med"/>
+                      <a:tailEnd type="none" w="med" len="med"/>
+                    </a:lnT>
+                    <a:lnB w="12700" cap="flat" cmpd="sng" algn="ctr">
+                      <a:solidFill>
+                        <a:schemeClr val="tx1">
+                          <a:lumMod val="75000"/>
+                          <a:lumOff val="25000"/>
+                        </a:schemeClr>
+                      </a:solidFill>
+                      <a:prstDash val="solid"/>
+                      <a:round/>
+                      <a:headEnd type="none" w="med" len="med"/>
+                      <a:tailEnd type="none" w="med" len="med"/>
+                    </a:lnB>
+                    <a:noFill/>
+                  </a:tcPr>
+                </a:tc>
+                <a:tc>
+                  <a:txBody>
+                    <a:bodyPr/>
+                    <a:lstStyle/>
+                    <a:p>
+                      <a:pPr marL="0" marR="0" lvl="0" indent="0" algn="ctr" defTabSz="914400" rtl="0" eaLnBrk="1" fontAlgn="auto" latinLnBrk="0" hangingPunct="1">
+                        <a:lnSpc>
+                          <a:spcPct val="100000"/>
+                        </a:lnSpc>
+                        <a:spcBef>
+                          <a:spcPts val="0"/>
+                        </a:spcBef>
+                        <a:spcAft>
+                          <a:spcPts val="0"/>
+                        </a:spcAft>
+                        <a:buClrTx/>
+                        <a:buSzTx/>
+                        <a:buFontTx/>
+                        <a:buNone/>
+                        <a:tabLst/>
+                        <a:defRPr/>
+                      </a:pPr>
+                      <a:r>
+                        <a:rPr kumimoji="0" lang="en-US" sz="1800" b="0" i="0" u="none" strike="noStrike" kern="1200" cap="none" spc="0" normalizeH="0" baseline="0" noProof="0" dirty="0">
+                          <a:ln>
+                            <a:noFill/>
+                          </a:ln>
+                          <a:solidFill>
+                            <a:srgbClr val="000000">
+                              <a:lumMod val="75000"/>
+                              <a:lumOff val="25000"/>
+                            </a:srgbClr>
+                          </a:solidFill>
+                          <a:effectLst/>
+                          <a:uLnTx/>
+                          <a:uFillTx/>
+                          <a:latin typeface="Optima" panose="02000503060000020004" pitchFamily="2" charset="0"/>
+                          <a:ea typeface="+mn-ea"/>
+                          <a:cs typeface="+mn-cs"/>
+                        </a:rPr>
+                        <a:t>?</a:t>
+                      </a:r>
+                    </a:p>
+                  </a:txBody>
+                  <a:tcPr anchor="ctr">
+                    <a:lnL w="12700" cap="flat" cmpd="sng" algn="ctr">
+                      <a:solidFill>
+                        <a:schemeClr val="tx1">
+                          <a:lumMod val="75000"/>
+                          <a:lumOff val="25000"/>
+                        </a:schemeClr>
+                      </a:solidFill>
+                      <a:prstDash val="solid"/>
+                      <a:round/>
+                      <a:headEnd type="none" w="med" len="med"/>
+                      <a:tailEnd type="none" w="med" len="med"/>
+                    </a:lnL>
+                    <a:lnR w="12700" cap="flat" cmpd="sng" algn="ctr">
+                      <a:solidFill>
+                        <a:schemeClr val="tx1">
+                          <a:lumMod val="75000"/>
+                          <a:lumOff val="25000"/>
+                        </a:schemeClr>
+                      </a:solidFill>
+                      <a:prstDash val="solid"/>
+                      <a:round/>
+                      <a:headEnd type="none" w="med" len="med"/>
+                      <a:tailEnd type="none" w="med" len="med"/>
+                    </a:lnR>
+                    <a:lnT w="12700" cap="flat" cmpd="sng" algn="ctr">
+                      <a:solidFill>
+                        <a:schemeClr val="tx1">
+                          <a:lumMod val="75000"/>
+                          <a:lumOff val="25000"/>
+                        </a:schemeClr>
+                      </a:solidFill>
+                      <a:prstDash val="solid"/>
+                      <a:round/>
+                      <a:headEnd type="none" w="med" len="med"/>
+                      <a:tailEnd type="none" w="med" len="med"/>
+                    </a:lnT>
+                    <a:lnB w="12700" cap="flat" cmpd="sng" algn="ctr">
+                      <a:solidFill>
+                        <a:schemeClr val="tx1">
+                          <a:lumMod val="75000"/>
+                          <a:lumOff val="25000"/>
+                        </a:schemeClr>
+                      </a:solidFill>
+                      <a:prstDash val="solid"/>
+                      <a:round/>
+                      <a:headEnd type="none" w="med" len="med"/>
+                      <a:tailEnd type="none" w="med" len="med"/>
+                    </a:lnB>
+                    <a:noFill/>
+                  </a:tcPr>
+                </a:tc>
+                <a:extLst>
+                  <a:ext uri="{0D108BD9-81ED-4DB2-BD59-A6C34878D82A}">
+                    <a16:rowId xmlns:a16="http://schemas.microsoft.com/office/drawing/2014/main" val="1468387550"/>
+                  </a:ext>
+                </a:extLst>
+              </a:tr>
+              <a:tr h="731520">
+                <a:tc>
+                  <a:txBody>
+                    <a:bodyPr/>
+                    <a:lstStyle/>
+                    <a:p>
+                      <a:pPr marL="0" marR="0" lvl="0" indent="0" algn="ctr" defTabSz="914400" rtl="0" eaLnBrk="1" fontAlgn="auto" latinLnBrk="0" hangingPunct="1">
+                        <a:lnSpc>
+                          <a:spcPct val="100000"/>
+                        </a:lnSpc>
+                        <a:spcBef>
+                          <a:spcPts val="0"/>
+                        </a:spcBef>
+                        <a:spcAft>
+                          <a:spcPts val="0"/>
+                        </a:spcAft>
+                        <a:buClrTx/>
+                        <a:buSzTx/>
+                        <a:buFontTx/>
+                        <a:buNone/>
+                        <a:tabLst/>
+                        <a:defRPr/>
+                      </a:pPr>
+                      <a:r>
+                        <a:rPr kumimoji="0" lang="en-US" sz="1800" b="0" i="0" u="none" strike="noStrike" kern="1200" cap="none" spc="0" normalizeH="0" baseline="0" noProof="0">
+                          <a:ln>
+                            <a:noFill/>
+                          </a:ln>
+                          <a:solidFill>
+                            <a:srgbClr val="000000">
+                              <a:lumMod val="75000"/>
+                              <a:lumOff val="25000"/>
+                            </a:srgbClr>
+                          </a:solidFill>
+                          <a:effectLst/>
+                          <a:uLnTx/>
+                          <a:uFillTx/>
+                          <a:latin typeface="Optima" panose="02000503060000020004" pitchFamily="2" charset="0"/>
+                          <a:ea typeface="+mn-ea"/>
+                          <a:cs typeface="+mn-cs"/>
+                        </a:rPr>
+                        <a:t>?</a:t>
+                      </a:r>
+                      <a:endParaRPr kumimoji="0" lang="en-US" sz="1800" b="0" i="0" u="none" strike="noStrike" kern="1200" cap="none" spc="0" normalizeH="0" baseline="0" noProof="0" dirty="0">
+                        <a:ln>
+                          <a:noFill/>
+                        </a:ln>
+                        <a:solidFill>
+                          <a:srgbClr val="000000">
+                            <a:lumMod val="75000"/>
+                            <a:lumOff val="25000"/>
+                          </a:srgbClr>
+                        </a:solidFill>
+                        <a:effectLst/>
+                        <a:uLnTx/>
+                        <a:uFillTx/>
+                        <a:latin typeface="Optima" panose="02000503060000020004" pitchFamily="2" charset="0"/>
+                        <a:ea typeface="+mn-ea"/>
+                        <a:cs typeface="+mn-cs"/>
+                      </a:endParaRPr>
+                    </a:p>
+                  </a:txBody>
+                  <a:tcPr anchor="ctr">
+                    <a:lnL w="12700" cap="flat" cmpd="sng" algn="ctr">
+                      <a:solidFill>
+                        <a:schemeClr val="tx1">
+                          <a:lumMod val="75000"/>
+                          <a:lumOff val="25000"/>
+                        </a:schemeClr>
+                      </a:solidFill>
+                      <a:prstDash val="solid"/>
+                      <a:round/>
+                      <a:headEnd type="none" w="med" len="med"/>
+                      <a:tailEnd type="none" w="med" len="med"/>
+                    </a:lnL>
+                    <a:lnR w="12700" cap="flat" cmpd="sng" algn="ctr">
+                      <a:solidFill>
+                        <a:schemeClr val="tx1">
+                          <a:lumMod val="75000"/>
+                          <a:lumOff val="25000"/>
+                        </a:schemeClr>
+                      </a:solidFill>
+                      <a:prstDash val="solid"/>
+                      <a:round/>
+                      <a:headEnd type="none" w="med" len="med"/>
+                      <a:tailEnd type="none" w="med" len="med"/>
+                    </a:lnR>
+                    <a:lnT w="12700" cap="flat" cmpd="sng" algn="ctr">
+                      <a:solidFill>
+                        <a:schemeClr val="tx1">
+                          <a:lumMod val="75000"/>
+                          <a:lumOff val="25000"/>
+                        </a:schemeClr>
+                      </a:solidFill>
+                      <a:prstDash val="solid"/>
+                      <a:round/>
+                      <a:headEnd type="none" w="med" len="med"/>
+                      <a:tailEnd type="none" w="med" len="med"/>
+                    </a:lnT>
+                    <a:lnB w="12700" cap="flat" cmpd="sng" algn="ctr">
+                      <a:solidFill>
+                        <a:schemeClr val="tx1">
+                          <a:lumMod val="75000"/>
+                          <a:lumOff val="25000"/>
+                        </a:schemeClr>
+                      </a:solidFill>
+                      <a:prstDash val="solid"/>
+                      <a:round/>
+                      <a:headEnd type="none" w="med" len="med"/>
+                      <a:tailEnd type="none" w="med" len="med"/>
+                    </a:lnB>
+                    <a:noFill/>
+                  </a:tcPr>
+                </a:tc>
+                <a:tc>
+                  <a:txBody>
+                    <a:bodyPr/>
+                    <a:lstStyle/>
+                    <a:p>
+                      <a:pPr marL="0" marR="0" lvl="0" indent="0" algn="ctr" defTabSz="914400" rtl="0" eaLnBrk="1" fontAlgn="auto" latinLnBrk="0" hangingPunct="1">
+                        <a:lnSpc>
+                          <a:spcPct val="100000"/>
+                        </a:lnSpc>
+                        <a:spcBef>
+                          <a:spcPts val="0"/>
+                        </a:spcBef>
+                        <a:spcAft>
+                          <a:spcPts val="0"/>
+                        </a:spcAft>
+                        <a:buClrTx/>
+                        <a:buSzTx/>
+                        <a:buFontTx/>
+                        <a:buNone/>
+                        <a:tabLst/>
+                        <a:defRPr/>
+                      </a:pPr>
+                      <a:r>
+                        <a:rPr kumimoji="0" lang="en-US" sz="1800" b="0" i="0" u="none" strike="noStrike" kern="1200" cap="none" spc="0" normalizeH="0" baseline="0" noProof="0" dirty="0">
+                          <a:ln>
+                            <a:noFill/>
+                          </a:ln>
+                          <a:solidFill>
+                            <a:srgbClr val="000000">
+                              <a:lumMod val="75000"/>
+                              <a:lumOff val="25000"/>
+                            </a:srgbClr>
+                          </a:solidFill>
+                          <a:effectLst/>
+                          <a:uLnTx/>
+                          <a:uFillTx/>
+                          <a:latin typeface="Optima" panose="02000503060000020004" pitchFamily="2" charset="0"/>
+                          <a:ea typeface="+mn-ea"/>
+                          <a:cs typeface="+mn-cs"/>
+                        </a:rPr>
+                        <a:t>.08</a:t>
+                      </a:r>
+                    </a:p>
+                  </a:txBody>
+                  <a:tcPr anchor="ctr">
+                    <a:lnL w="12700" cap="flat" cmpd="sng" algn="ctr">
+                      <a:solidFill>
+                        <a:schemeClr val="tx1">
+                          <a:lumMod val="75000"/>
+                          <a:lumOff val="25000"/>
+                        </a:schemeClr>
+                      </a:solidFill>
+                      <a:prstDash val="solid"/>
+                      <a:round/>
+                      <a:headEnd type="none" w="med" len="med"/>
+                      <a:tailEnd type="none" w="med" len="med"/>
+                    </a:lnL>
+                    <a:lnR w="12700" cap="flat" cmpd="sng" algn="ctr">
+                      <a:solidFill>
+                        <a:schemeClr val="tx1">
+                          <a:lumMod val="75000"/>
+                          <a:lumOff val="25000"/>
+                        </a:schemeClr>
+                      </a:solidFill>
+                      <a:prstDash val="solid"/>
+                      <a:round/>
+                      <a:headEnd type="none" w="med" len="med"/>
+                      <a:tailEnd type="none" w="med" len="med"/>
+                    </a:lnR>
+                    <a:lnT w="12700" cap="flat" cmpd="sng" algn="ctr">
+                      <a:solidFill>
+                        <a:schemeClr val="tx1">
+                          <a:lumMod val="75000"/>
+                          <a:lumOff val="25000"/>
+                        </a:schemeClr>
+                      </a:solidFill>
+                      <a:prstDash val="solid"/>
+                      <a:round/>
+                      <a:headEnd type="none" w="med" len="med"/>
+                      <a:tailEnd type="none" w="med" len="med"/>
+                    </a:lnT>
+                    <a:lnB w="12700" cap="flat" cmpd="sng" algn="ctr">
+                      <a:solidFill>
+                        <a:schemeClr val="tx1">
+                          <a:lumMod val="75000"/>
+                          <a:lumOff val="25000"/>
+                        </a:schemeClr>
+                      </a:solidFill>
+                      <a:prstDash val="solid"/>
+                      <a:round/>
+                      <a:headEnd type="none" w="med" len="med"/>
+                      <a:tailEnd type="none" w="med" len="med"/>
+                    </a:lnB>
+                    <a:noFill/>
+                  </a:tcPr>
+                </a:tc>
+                <a:tc>
+                  <a:txBody>
+                    <a:bodyPr/>
+                    <a:lstStyle/>
+                    <a:p>
+                      <a:pPr marL="0" marR="0" lvl="0" indent="0" algn="ctr" defTabSz="914400" rtl="0" eaLnBrk="1" fontAlgn="auto" latinLnBrk="0" hangingPunct="1">
+                        <a:lnSpc>
+                          <a:spcPct val="100000"/>
+                        </a:lnSpc>
+                        <a:spcBef>
+                          <a:spcPts val="0"/>
+                        </a:spcBef>
+                        <a:spcAft>
+                          <a:spcPts val="0"/>
+                        </a:spcAft>
+                        <a:buClrTx/>
+                        <a:buSzTx/>
+                        <a:buFontTx/>
+                        <a:buNone/>
+                        <a:tabLst/>
+                        <a:defRPr/>
+                      </a:pPr>
+                      <a:r>
+                        <a:rPr kumimoji="0" lang="en-US" sz="1800" b="0" i="0" u="none" strike="noStrike" kern="1200" cap="none" spc="0" normalizeH="0" baseline="0" noProof="0" dirty="0">
+                          <a:ln>
+                            <a:noFill/>
+                          </a:ln>
+                          <a:solidFill>
+                            <a:srgbClr val="000000">
+                              <a:lumMod val="75000"/>
+                              <a:lumOff val="25000"/>
+                            </a:srgbClr>
+                          </a:solidFill>
+                          <a:effectLst/>
+                          <a:uLnTx/>
+                          <a:uFillTx/>
+                          <a:latin typeface="Optima" panose="02000503060000020004" pitchFamily="2" charset="0"/>
+                          <a:ea typeface="+mn-ea"/>
+                          <a:cs typeface="+mn-cs"/>
+                        </a:rPr>
+                        <a:t>.2</a:t>
+                      </a:r>
+                    </a:p>
+                  </a:txBody>
+                  <a:tcPr anchor="ctr">
+                    <a:lnL w="12700" cap="flat" cmpd="sng" algn="ctr">
+                      <a:solidFill>
+                        <a:schemeClr val="tx1">
+                          <a:lumMod val="75000"/>
+                          <a:lumOff val="25000"/>
+                        </a:schemeClr>
+                      </a:solidFill>
+                      <a:prstDash val="solid"/>
+                      <a:round/>
+                      <a:headEnd type="none" w="med" len="med"/>
+                      <a:tailEnd type="none" w="med" len="med"/>
+                    </a:lnL>
+                    <a:lnR w="12700" cap="flat" cmpd="sng" algn="ctr">
+                      <a:solidFill>
+                        <a:schemeClr val="tx1">
+                          <a:lumMod val="75000"/>
+                          <a:lumOff val="25000"/>
+                        </a:schemeClr>
+                      </a:solidFill>
+                      <a:prstDash val="solid"/>
+                      <a:round/>
+                      <a:headEnd type="none" w="med" len="med"/>
+                      <a:tailEnd type="none" w="med" len="med"/>
+                    </a:lnR>
+                    <a:lnT w="12700" cap="flat" cmpd="sng" algn="ctr">
+                      <a:solidFill>
+                        <a:schemeClr val="tx1">
+                          <a:lumMod val="75000"/>
+                          <a:lumOff val="25000"/>
+                        </a:schemeClr>
+                      </a:solidFill>
+                      <a:prstDash val="solid"/>
+                      <a:round/>
+                      <a:headEnd type="none" w="med" len="med"/>
+                      <a:tailEnd type="none" w="med" len="med"/>
+                    </a:lnT>
+                    <a:lnB w="12700" cap="flat" cmpd="sng" algn="ctr">
+                      <a:solidFill>
+                        <a:schemeClr val="tx1">
+                          <a:lumMod val="75000"/>
+                          <a:lumOff val="25000"/>
+                        </a:schemeClr>
+                      </a:solidFill>
+                      <a:prstDash val="solid"/>
+                      <a:round/>
+                      <a:headEnd type="none" w="med" len="med"/>
+                      <a:tailEnd type="none" w="med" len="med"/>
+                    </a:lnB>
+                    <a:noFill/>
+                  </a:tcPr>
+                </a:tc>
+                <a:tc>
+                  <a:txBody>
+                    <a:bodyPr/>
+                    <a:lstStyle/>
+                    <a:p>
+                      <a:pPr marL="0" marR="0" lvl="0" indent="0" algn="ctr" defTabSz="914400" rtl="0" eaLnBrk="1" fontAlgn="auto" latinLnBrk="0" hangingPunct="1">
+                        <a:lnSpc>
+                          <a:spcPct val="100000"/>
+                        </a:lnSpc>
+                        <a:spcBef>
+                          <a:spcPts val="0"/>
+                        </a:spcBef>
+                        <a:spcAft>
+                          <a:spcPts val="0"/>
+                        </a:spcAft>
+                        <a:buClrTx/>
+                        <a:buSzTx/>
+                        <a:buFontTx/>
+                        <a:buNone/>
+                        <a:tabLst/>
+                        <a:defRPr/>
+                      </a:pPr>
+                      <a:r>
+                        <a:rPr kumimoji="0" lang="en-US" sz="1800" b="0" i="0" u="none" strike="noStrike" kern="1200" cap="none" spc="0" normalizeH="0" baseline="0" noProof="0" dirty="0">
+                          <a:ln>
+                            <a:noFill/>
+                          </a:ln>
+                          <a:solidFill>
+                            <a:srgbClr val="000000">
+                              <a:lumMod val="75000"/>
+                              <a:lumOff val="25000"/>
+                            </a:srgbClr>
+                          </a:solidFill>
+                          <a:effectLst/>
+                          <a:uLnTx/>
+                          <a:uFillTx/>
+                          <a:latin typeface="Optima" panose="02000503060000020004" pitchFamily="2" charset="0"/>
+                          <a:ea typeface="+mn-ea"/>
+                          <a:cs typeface="+mn-cs"/>
+                        </a:rPr>
+                        <a:t>.08</a:t>
+                      </a:r>
+                    </a:p>
+                  </a:txBody>
+                  <a:tcPr anchor="ctr">
+                    <a:lnL w="12700" cap="flat" cmpd="sng" algn="ctr">
+                      <a:solidFill>
+                        <a:schemeClr val="tx1">
+                          <a:lumMod val="75000"/>
+                          <a:lumOff val="25000"/>
+                        </a:schemeClr>
+                      </a:solidFill>
+                      <a:prstDash val="solid"/>
+                      <a:round/>
+                      <a:headEnd type="none" w="med" len="med"/>
+                      <a:tailEnd type="none" w="med" len="med"/>
+                    </a:lnL>
+                    <a:lnR w="12700" cap="flat" cmpd="sng" algn="ctr">
+                      <a:solidFill>
+                        <a:schemeClr val="tx1">
+                          <a:lumMod val="75000"/>
+                          <a:lumOff val="25000"/>
+                        </a:schemeClr>
+                      </a:solidFill>
+                      <a:prstDash val="solid"/>
+                      <a:round/>
+                      <a:headEnd type="none" w="med" len="med"/>
+                      <a:tailEnd type="none" w="med" len="med"/>
+                    </a:lnR>
+                    <a:lnT w="12700" cap="flat" cmpd="sng" algn="ctr">
+                      <a:solidFill>
+                        <a:schemeClr val="tx1">
+                          <a:lumMod val="75000"/>
+                          <a:lumOff val="25000"/>
+                        </a:schemeClr>
+                      </a:solidFill>
+                      <a:prstDash val="solid"/>
+                      <a:round/>
+                      <a:headEnd type="none" w="med" len="med"/>
+                      <a:tailEnd type="none" w="med" len="med"/>
+                    </a:lnT>
+                    <a:lnB w="12700" cap="flat" cmpd="sng" algn="ctr">
+                      <a:solidFill>
+                        <a:schemeClr val="tx1">
+                          <a:lumMod val="75000"/>
+                          <a:lumOff val="25000"/>
+                        </a:schemeClr>
+                      </a:solidFill>
+                      <a:prstDash val="solid"/>
+                      <a:round/>
+                      <a:headEnd type="none" w="med" len="med"/>
+                      <a:tailEnd type="none" w="med" len="med"/>
+                    </a:lnB>
+                    <a:noFill/>
+                  </a:tcPr>
+                </a:tc>
+                <a:tc>
+                  <a:txBody>
+                    <a:bodyPr/>
+                    <a:lstStyle/>
+                    <a:p>
+                      <a:pPr marL="0" marR="0" lvl="0" indent="0" algn="ctr" defTabSz="914400" rtl="0" eaLnBrk="1" fontAlgn="auto" latinLnBrk="0" hangingPunct="1">
+                        <a:lnSpc>
+                          <a:spcPct val="100000"/>
+                        </a:lnSpc>
+                        <a:spcBef>
+                          <a:spcPts val="0"/>
+                        </a:spcBef>
+                        <a:spcAft>
+                          <a:spcPts val="0"/>
+                        </a:spcAft>
+                        <a:buClrTx/>
+                        <a:buSzTx/>
+                        <a:buFontTx/>
+                        <a:buNone/>
+                        <a:tabLst/>
+                        <a:defRPr/>
+                      </a:pPr>
+                      <a:r>
+                        <a:rPr kumimoji="0" lang="en-US" sz="1800" b="0" i="0" u="none" strike="noStrike" kern="1200" cap="none" spc="0" normalizeH="0" baseline="0" noProof="0">
+                          <a:ln>
+                            <a:noFill/>
+                          </a:ln>
+                          <a:solidFill>
+                            <a:srgbClr val="000000">
+                              <a:lumMod val="75000"/>
+                              <a:lumOff val="25000"/>
+                            </a:srgbClr>
+                          </a:solidFill>
+                          <a:effectLst/>
+                          <a:uLnTx/>
+                          <a:uFillTx/>
+                          <a:latin typeface="Optima" panose="02000503060000020004" pitchFamily="2" charset="0"/>
+                          <a:ea typeface="+mn-ea"/>
+                          <a:cs typeface="+mn-cs"/>
+                        </a:rPr>
+                        <a:t>?</a:t>
+                      </a:r>
+                      <a:endParaRPr kumimoji="0" lang="en-US" sz="1800" b="0" i="0" u="none" strike="noStrike" kern="1200" cap="none" spc="0" normalizeH="0" baseline="0" noProof="0" dirty="0">
+                        <a:ln>
+                          <a:noFill/>
+                        </a:ln>
+                        <a:solidFill>
+                          <a:srgbClr val="000000">
+                            <a:lumMod val="75000"/>
+                            <a:lumOff val="25000"/>
+                          </a:srgbClr>
+                        </a:solidFill>
+                        <a:effectLst/>
+                        <a:uLnTx/>
+                        <a:uFillTx/>
+                        <a:latin typeface="Optima" panose="02000503060000020004" pitchFamily="2" charset="0"/>
+                        <a:ea typeface="+mn-ea"/>
+                        <a:cs typeface="+mn-cs"/>
+                      </a:endParaRPr>
+                    </a:p>
+                  </a:txBody>
+                  <a:tcPr anchor="ctr">
+                    <a:lnL w="12700" cap="flat" cmpd="sng" algn="ctr">
+                      <a:solidFill>
+                        <a:schemeClr val="tx1">
+                          <a:lumMod val="75000"/>
+                          <a:lumOff val="25000"/>
+                        </a:schemeClr>
+                      </a:solidFill>
+                      <a:prstDash val="solid"/>
+                      <a:round/>
+                      <a:headEnd type="none" w="med" len="med"/>
+                      <a:tailEnd type="none" w="med" len="med"/>
+                    </a:lnL>
+                    <a:lnR w="12700" cap="flat" cmpd="sng" algn="ctr">
+                      <a:solidFill>
+                        <a:schemeClr val="tx1">
+                          <a:lumMod val="75000"/>
+                          <a:lumOff val="25000"/>
+                        </a:schemeClr>
+                      </a:solidFill>
+                      <a:prstDash val="solid"/>
+                      <a:round/>
+                      <a:headEnd type="none" w="med" len="med"/>
+                      <a:tailEnd type="none" w="med" len="med"/>
+                    </a:lnR>
+                    <a:lnT w="12700" cap="flat" cmpd="sng" algn="ctr">
+                      <a:solidFill>
+                        <a:schemeClr val="tx1">
+                          <a:lumMod val="75000"/>
+                          <a:lumOff val="25000"/>
+                        </a:schemeClr>
+                      </a:solidFill>
+                      <a:prstDash val="solid"/>
+                      <a:round/>
+                      <a:headEnd type="none" w="med" len="med"/>
+                      <a:tailEnd type="none" w="med" len="med"/>
+                    </a:lnT>
+                    <a:lnB w="12700" cap="flat" cmpd="sng" algn="ctr">
+                      <a:solidFill>
+                        <a:schemeClr val="tx1">
+                          <a:lumMod val="75000"/>
+                          <a:lumOff val="25000"/>
+                        </a:schemeClr>
+                      </a:solidFill>
+                      <a:prstDash val="solid"/>
+                      <a:round/>
+                      <a:headEnd type="none" w="med" len="med"/>
+                      <a:tailEnd type="none" w="med" len="med"/>
+                    </a:lnB>
+                    <a:noFill/>
+                  </a:tcPr>
+                </a:tc>
+                <a:extLst>
+                  <a:ext uri="{0D108BD9-81ED-4DB2-BD59-A6C34878D82A}">
+                    <a16:rowId xmlns:a16="http://schemas.microsoft.com/office/drawing/2014/main" val="689475947"/>
+                  </a:ext>
+                </a:extLst>
+              </a:tr>
+              <a:tr h="731520">
+                <a:tc>
+                  <a:txBody>
+                    <a:bodyPr/>
+                    <a:lstStyle/>
+                    <a:p>
+                      <a:pPr marL="0" marR="0" lvl="0" indent="0" algn="ctr" defTabSz="914400" rtl="0" eaLnBrk="1" fontAlgn="auto" latinLnBrk="0" hangingPunct="1">
+                        <a:lnSpc>
+                          <a:spcPct val="100000"/>
+                        </a:lnSpc>
+                        <a:spcBef>
+                          <a:spcPts val="0"/>
+                        </a:spcBef>
+                        <a:spcAft>
+                          <a:spcPts val="0"/>
+                        </a:spcAft>
+                        <a:buClrTx/>
+                        <a:buSzTx/>
+                        <a:buFontTx/>
+                        <a:buNone/>
+                        <a:tabLst/>
+                        <a:defRPr/>
+                      </a:pPr>
+                      <a:r>
+                        <a:rPr kumimoji="0" lang="en-US" sz="1800" b="0" i="0" u="none" strike="noStrike" kern="1200" cap="none" spc="0" normalizeH="0" baseline="0" noProof="0">
+                          <a:ln>
+                            <a:noFill/>
+                          </a:ln>
+                          <a:solidFill>
+                            <a:srgbClr val="000000">
+                              <a:lumMod val="75000"/>
+                              <a:lumOff val="25000"/>
+                            </a:srgbClr>
+                          </a:solidFill>
+                          <a:effectLst/>
+                          <a:uLnTx/>
+                          <a:uFillTx/>
+                          <a:latin typeface="Optima" panose="02000503060000020004" pitchFamily="2" charset="0"/>
+                          <a:ea typeface="+mn-ea"/>
+                          <a:cs typeface="+mn-cs"/>
+                        </a:rPr>
+                        <a:t>?</a:t>
+                      </a:r>
+                      <a:endParaRPr kumimoji="0" lang="en-US" sz="1800" b="0" i="0" u="none" strike="noStrike" kern="1200" cap="none" spc="0" normalizeH="0" baseline="0" noProof="0" dirty="0">
+                        <a:ln>
+                          <a:noFill/>
+                        </a:ln>
+                        <a:solidFill>
+                          <a:srgbClr val="000000">
+                            <a:lumMod val="75000"/>
+                            <a:lumOff val="25000"/>
+                          </a:srgbClr>
+                        </a:solidFill>
+                        <a:effectLst/>
+                        <a:uLnTx/>
+                        <a:uFillTx/>
+                        <a:latin typeface="Optima" panose="02000503060000020004" pitchFamily="2" charset="0"/>
+                        <a:ea typeface="+mn-ea"/>
+                        <a:cs typeface="+mn-cs"/>
+                      </a:endParaRPr>
+                    </a:p>
+                  </a:txBody>
+                  <a:tcPr anchor="ctr">
+                    <a:lnL w="12700" cap="flat" cmpd="sng" algn="ctr">
+                      <a:solidFill>
+                        <a:schemeClr val="tx1">
+                          <a:lumMod val="75000"/>
+                          <a:lumOff val="25000"/>
+                        </a:schemeClr>
+                      </a:solidFill>
+                      <a:prstDash val="solid"/>
+                      <a:round/>
+                      <a:headEnd type="none" w="med" len="med"/>
+                      <a:tailEnd type="none" w="med" len="med"/>
+                    </a:lnL>
+                    <a:lnR w="12700" cap="flat" cmpd="sng" algn="ctr">
+                      <a:solidFill>
+                        <a:schemeClr val="tx1">
+                          <a:lumMod val="75000"/>
+                          <a:lumOff val="25000"/>
+                        </a:schemeClr>
+                      </a:solidFill>
+                      <a:prstDash val="solid"/>
+                      <a:round/>
+                      <a:headEnd type="none" w="med" len="med"/>
+                      <a:tailEnd type="none" w="med" len="med"/>
+                    </a:lnR>
+                    <a:lnT w="12700" cap="flat" cmpd="sng" algn="ctr">
+                      <a:solidFill>
+                        <a:schemeClr val="tx1">
+                          <a:lumMod val="75000"/>
+                          <a:lumOff val="25000"/>
+                        </a:schemeClr>
+                      </a:solidFill>
+                      <a:prstDash val="solid"/>
+                      <a:round/>
+                      <a:headEnd type="none" w="med" len="med"/>
+                      <a:tailEnd type="none" w="med" len="med"/>
+                    </a:lnT>
+                    <a:lnB w="12700" cap="flat" cmpd="sng" algn="ctr">
+                      <a:solidFill>
+                        <a:schemeClr val="tx1">
+                          <a:lumMod val="75000"/>
+                          <a:lumOff val="25000"/>
+                        </a:schemeClr>
+                      </a:solidFill>
+                      <a:prstDash val="solid"/>
+                      <a:round/>
+                      <a:headEnd type="none" w="med" len="med"/>
+                      <a:tailEnd type="none" w="med" len="med"/>
+                    </a:lnB>
+                    <a:noFill/>
+                  </a:tcPr>
+                </a:tc>
+                <a:tc>
+                  <a:txBody>
+                    <a:bodyPr/>
+                    <a:lstStyle/>
+                    <a:p>
+                      <a:pPr marL="0" marR="0" lvl="0" indent="0" algn="ctr" defTabSz="914400" rtl="0" eaLnBrk="1" fontAlgn="auto" latinLnBrk="0" hangingPunct="1">
+                        <a:lnSpc>
+                          <a:spcPct val="100000"/>
+                        </a:lnSpc>
+                        <a:spcBef>
+                          <a:spcPts val="0"/>
+                        </a:spcBef>
+                        <a:spcAft>
+                          <a:spcPts val="0"/>
+                        </a:spcAft>
+                        <a:buClrTx/>
+                        <a:buSzTx/>
+                        <a:buFontTx/>
+                        <a:buNone/>
+                        <a:tabLst/>
+                        <a:defRPr/>
+                      </a:pPr>
+                      <a:r>
+                        <a:rPr kumimoji="0" lang="en-US" sz="1800" b="0" i="0" u="none" strike="noStrike" kern="1200" cap="none" spc="0" normalizeH="0" baseline="0" noProof="0" dirty="0">
+                          <a:ln>
+                            <a:noFill/>
+                          </a:ln>
+                          <a:solidFill>
+                            <a:srgbClr val="000000">
+                              <a:lumMod val="75000"/>
+                              <a:lumOff val="25000"/>
+                            </a:srgbClr>
+                          </a:solidFill>
+                          <a:effectLst/>
+                          <a:uLnTx/>
+                          <a:uFillTx/>
+                          <a:latin typeface="Optima" panose="02000503060000020004" pitchFamily="2" charset="0"/>
+                          <a:ea typeface="+mn-ea"/>
+                          <a:cs typeface="+mn-cs"/>
+                        </a:rPr>
+                        <a:t>.02</a:t>
+                      </a:r>
+                    </a:p>
+                  </a:txBody>
+                  <a:tcPr anchor="ctr">
+                    <a:lnL w="12700" cap="flat" cmpd="sng" algn="ctr">
+                      <a:solidFill>
+                        <a:schemeClr val="tx1">
+                          <a:lumMod val="75000"/>
+                          <a:lumOff val="25000"/>
+                        </a:schemeClr>
+                      </a:solidFill>
+                      <a:prstDash val="solid"/>
+                      <a:round/>
+                      <a:headEnd type="none" w="med" len="med"/>
+                      <a:tailEnd type="none" w="med" len="med"/>
+                    </a:lnL>
+                    <a:lnR w="12700" cap="flat" cmpd="sng" algn="ctr">
+                      <a:solidFill>
+                        <a:schemeClr val="tx1">
+                          <a:lumMod val="75000"/>
+                          <a:lumOff val="25000"/>
+                        </a:schemeClr>
+                      </a:solidFill>
+                      <a:prstDash val="solid"/>
+                      <a:round/>
+                      <a:headEnd type="none" w="med" len="med"/>
+                      <a:tailEnd type="none" w="med" len="med"/>
+                    </a:lnR>
+                    <a:lnT w="12700" cap="flat" cmpd="sng" algn="ctr">
+                      <a:solidFill>
+                        <a:schemeClr val="tx1">
+                          <a:lumMod val="75000"/>
+                          <a:lumOff val="25000"/>
+                        </a:schemeClr>
+                      </a:solidFill>
+                      <a:prstDash val="solid"/>
+                      <a:round/>
+                      <a:headEnd type="none" w="med" len="med"/>
+                      <a:tailEnd type="none" w="med" len="med"/>
+                    </a:lnT>
+                    <a:lnB w="12700" cap="flat" cmpd="sng" algn="ctr">
+                      <a:solidFill>
+                        <a:schemeClr val="tx1">
+                          <a:lumMod val="75000"/>
+                          <a:lumOff val="25000"/>
+                        </a:schemeClr>
+                      </a:solidFill>
+                      <a:prstDash val="solid"/>
+                      <a:round/>
+                      <a:headEnd type="none" w="med" len="med"/>
+                      <a:tailEnd type="none" w="med" len="med"/>
+                    </a:lnB>
+                    <a:noFill/>
+                  </a:tcPr>
+                </a:tc>
+                <a:tc>
+                  <a:txBody>
+                    <a:bodyPr/>
+                    <a:lstStyle/>
+                    <a:p>
+                      <a:pPr marL="0" marR="0" lvl="0" indent="0" algn="ctr" defTabSz="914400" rtl="0" eaLnBrk="1" fontAlgn="auto" latinLnBrk="0" hangingPunct="1">
+                        <a:lnSpc>
+                          <a:spcPct val="100000"/>
+                        </a:lnSpc>
+                        <a:spcBef>
+                          <a:spcPts val="0"/>
+                        </a:spcBef>
+                        <a:spcAft>
+                          <a:spcPts val="0"/>
+                        </a:spcAft>
+                        <a:buClrTx/>
+                        <a:buSzTx/>
+                        <a:buFontTx/>
+                        <a:buNone/>
+                        <a:tabLst/>
+                        <a:defRPr/>
+                      </a:pPr>
+                      <a:r>
+                        <a:rPr kumimoji="0" lang="en-US" sz="1800" b="0" i="0" u="none" strike="noStrike" kern="1200" cap="none" spc="0" normalizeH="0" baseline="0" noProof="0" dirty="0">
+                          <a:ln>
+                            <a:noFill/>
+                          </a:ln>
+                          <a:solidFill>
+                            <a:srgbClr val="000000">
+                              <a:lumMod val="75000"/>
+                              <a:lumOff val="25000"/>
+                            </a:srgbClr>
+                          </a:solidFill>
+                          <a:effectLst/>
+                          <a:uLnTx/>
+                          <a:uFillTx/>
+                          <a:latin typeface="Optima" panose="02000503060000020004" pitchFamily="2" charset="0"/>
+                          <a:ea typeface="+mn-ea"/>
+                          <a:cs typeface="+mn-cs"/>
+                        </a:rPr>
+                        <a:t>.17</a:t>
+                      </a:r>
+                    </a:p>
+                  </a:txBody>
+                  <a:tcPr anchor="ctr">
+                    <a:lnL w="12700" cap="flat" cmpd="sng" algn="ctr">
+                      <a:solidFill>
+                        <a:schemeClr val="tx1">
+                          <a:lumMod val="75000"/>
+                          <a:lumOff val="25000"/>
+                        </a:schemeClr>
+                      </a:solidFill>
+                      <a:prstDash val="solid"/>
+                      <a:round/>
+                      <a:headEnd type="none" w="med" len="med"/>
+                      <a:tailEnd type="none" w="med" len="med"/>
+                    </a:lnL>
+                    <a:lnR w="12700" cap="flat" cmpd="sng" algn="ctr">
+                      <a:solidFill>
+                        <a:schemeClr val="tx1">
+                          <a:lumMod val="75000"/>
+                          <a:lumOff val="25000"/>
+                        </a:schemeClr>
+                      </a:solidFill>
+                      <a:prstDash val="solid"/>
+                      <a:round/>
+                      <a:headEnd type="none" w="med" len="med"/>
+                      <a:tailEnd type="none" w="med" len="med"/>
+                    </a:lnR>
+                    <a:lnT w="12700" cap="flat" cmpd="sng" algn="ctr">
+                      <a:solidFill>
+                        <a:schemeClr val="tx1">
+                          <a:lumMod val="75000"/>
+                          <a:lumOff val="25000"/>
+                        </a:schemeClr>
+                      </a:solidFill>
+                      <a:prstDash val="solid"/>
+                      <a:round/>
+                      <a:headEnd type="none" w="med" len="med"/>
+                      <a:tailEnd type="none" w="med" len="med"/>
+                    </a:lnT>
+                    <a:lnB w="12700" cap="flat" cmpd="sng" algn="ctr">
+                      <a:solidFill>
+                        <a:schemeClr val="tx1">
+                          <a:lumMod val="75000"/>
+                          <a:lumOff val="25000"/>
+                        </a:schemeClr>
+                      </a:solidFill>
+                      <a:prstDash val="solid"/>
+                      <a:round/>
+                      <a:headEnd type="none" w="med" len="med"/>
+                      <a:tailEnd type="none" w="med" len="med"/>
+                    </a:lnB>
+                    <a:noFill/>
+                  </a:tcPr>
+                </a:tc>
+                <a:tc>
+                  <a:txBody>
+                    <a:bodyPr/>
+                    <a:lstStyle/>
+                    <a:p>
+                      <a:pPr marL="0" marR="0" lvl="0" indent="0" algn="ctr" defTabSz="914400" rtl="0" eaLnBrk="1" fontAlgn="auto" latinLnBrk="0" hangingPunct="1">
+                        <a:lnSpc>
+                          <a:spcPct val="100000"/>
+                        </a:lnSpc>
+                        <a:spcBef>
+                          <a:spcPts val="0"/>
+                        </a:spcBef>
+                        <a:spcAft>
+                          <a:spcPts val="0"/>
+                        </a:spcAft>
+                        <a:buClrTx/>
+                        <a:buSzTx/>
+                        <a:buFontTx/>
+                        <a:buNone/>
+                        <a:tabLst/>
+                        <a:defRPr/>
+                      </a:pPr>
+                      <a:r>
+                        <a:rPr kumimoji="0" lang="en-US" sz="1800" b="0" i="0" u="none" strike="noStrike" kern="1200" cap="none" spc="0" normalizeH="0" baseline="0" noProof="0" dirty="0">
+                          <a:ln>
+                            <a:noFill/>
+                          </a:ln>
+                          <a:solidFill>
+                            <a:srgbClr val="000000">
+                              <a:lumMod val="75000"/>
+                              <a:lumOff val="25000"/>
+                            </a:srgbClr>
+                          </a:solidFill>
+                          <a:effectLst/>
+                          <a:uLnTx/>
+                          <a:uFillTx/>
+                          <a:latin typeface="Optima" panose="02000503060000020004" pitchFamily="2" charset="0"/>
+                          <a:ea typeface="+mn-ea"/>
+                          <a:cs typeface="+mn-cs"/>
+                        </a:rPr>
+                        <a:t>.02</a:t>
+                      </a:r>
+                    </a:p>
+                  </a:txBody>
+                  <a:tcPr anchor="ctr">
+                    <a:lnL w="12700" cap="flat" cmpd="sng" algn="ctr">
+                      <a:solidFill>
+                        <a:schemeClr val="tx1">
+                          <a:lumMod val="75000"/>
+                          <a:lumOff val="25000"/>
+                        </a:schemeClr>
+                      </a:solidFill>
+                      <a:prstDash val="solid"/>
+                      <a:round/>
+                      <a:headEnd type="none" w="med" len="med"/>
+                      <a:tailEnd type="none" w="med" len="med"/>
+                    </a:lnL>
+                    <a:lnR w="12700" cap="flat" cmpd="sng" algn="ctr">
+                      <a:solidFill>
+                        <a:schemeClr val="tx1">
+                          <a:lumMod val="75000"/>
+                          <a:lumOff val="25000"/>
+                        </a:schemeClr>
+                      </a:solidFill>
+                      <a:prstDash val="solid"/>
+                      <a:round/>
+                      <a:headEnd type="none" w="med" len="med"/>
+                      <a:tailEnd type="none" w="med" len="med"/>
+                    </a:lnR>
+                    <a:lnT w="12700" cap="flat" cmpd="sng" algn="ctr">
+                      <a:solidFill>
+                        <a:schemeClr val="tx1">
+                          <a:lumMod val="75000"/>
+                          <a:lumOff val="25000"/>
+                        </a:schemeClr>
+                      </a:solidFill>
+                      <a:prstDash val="solid"/>
+                      <a:round/>
+                      <a:headEnd type="none" w="med" len="med"/>
+                      <a:tailEnd type="none" w="med" len="med"/>
+                    </a:lnT>
+                    <a:lnB w="12700" cap="flat" cmpd="sng" algn="ctr">
+                      <a:solidFill>
+                        <a:schemeClr val="tx1">
+                          <a:lumMod val="75000"/>
+                          <a:lumOff val="25000"/>
+                        </a:schemeClr>
+                      </a:solidFill>
+                      <a:prstDash val="solid"/>
+                      <a:round/>
+                      <a:headEnd type="none" w="med" len="med"/>
+                      <a:tailEnd type="none" w="med" len="med"/>
+                    </a:lnB>
+                    <a:noFill/>
+                  </a:tcPr>
+                </a:tc>
+                <a:tc>
+                  <a:txBody>
+                    <a:bodyPr/>
+                    <a:lstStyle/>
+                    <a:p>
+                      <a:pPr marL="0" marR="0" lvl="0" indent="0" algn="ctr" defTabSz="914400" rtl="0" eaLnBrk="1" fontAlgn="auto" latinLnBrk="0" hangingPunct="1">
+                        <a:lnSpc>
+                          <a:spcPct val="100000"/>
+                        </a:lnSpc>
+                        <a:spcBef>
+                          <a:spcPts val="0"/>
+                        </a:spcBef>
+                        <a:spcAft>
+                          <a:spcPts val="0"/>
+                        </a:spcAft>
+                        <a:buClrTx/>
+                        <a:buSzTx/>
+                        <a:buFontTx/>
+                        <a:buNone/>
+                        <a:tabLst/>
+                        <a:defRPr/>
+                      </a:pPr>
+                      <a:r>
+                        <a:rPr kumimoji="0" lang="en-US" sz="1800" b="0" i="0" u="none" strike="noStrike" kern="1200" cap="none" spc="0" normalizeH="0" baseline="0" noProof="0">
+                          <a:ln>
+                            <a:noFill/>
+                          </a:ln>
+                          <a:solidFill>
+                            <a:srgbClr val="000000">
+                              <a:lumMod val="75000"/>
+                              <a:lumOff val="25000"/>
+                            </a:srgbClr>
+                          </a:solidFill>
+                          <a:effectLst/>
+                          <a:uLnTx/>
+                          <a:uFillTx/>
+                          <a:latin typeface="Optima" panose="02000503060000020004" pitchFamily="2" charset="0"/>
+                          <a:ea typeface="+mn-ea"/>
+                          <a:cs typeface="+mn-cs"/>
+                        </a:rPr>
+                        <a:t>?</a:t>
+                      </a:r>
+                      <a:endParaRPr kumimoji="0" lang="en-US" sz="1800" b="0" i="0" u="none" strike="noStrike" kern="1200" cap="none" spc="0" normalizeH="0" baseline="0" noProof="0" dirty="0">
+                        <a:ln>
+                          <a:noFill/>
+                        </a:ln>
+                        <a:solidFill>
+                          <a:srgbClr val="000000">
+                            <a:lumMod val="75000"/>
+                            <a:lumOff val="25000"/>
+                          </a:srgbClr>
+                        </a:solidFill>
+                        <a:effectLst/>
+                        <a:uLnTx/>
+                        <a:uFillTx/>
+                        <a:latin typeface="Optima" panose="02000503060000020004" pitchFamily="2" charset="0"/>
+                        <a:ea typeface="+mn-ea"/>
+                        <a:cs typeface="+mn-cs"/>
+                      </a:endParaRPr>
+                    </a:p>
+                  </a:txBody>
+                  <a:tcPr anchor="ctr">
+                    <a:lnL w="12700" cap="flat" cmpd="sng" algn="ctr">
+                      <a:solidFill>
+                        <a:schemeClr val="tx1">
+                          <a:lumMod val="75000"/>
+                          <a:lumOff val="25000"/>
+                        </a:schemeClr>
+                      </a:solidFill>
+                      <a:prstDash val="solid"/>
+                      <a:round/>
+                      <a:headEnd type="none" w="med" len="med"/>
+                      <a:tailEnd type="none" w="med" len="med"/>
+                    </a:lnL>
+                    <a:lnR w="12700" cap="flat" cmpd="sng" algn="ctr">
+                      <a:solidFill>
+                        <a:schemeClr val="tx1">
+                          <a:lumMod val="75000"/>
+                          <a:lumOff val="25000"/>
+                        </a:schemeClr>
+                      </a:solidFill>
+                      <a:prstDash val="solid"/>
+                      <a:round/>
+                      <a:headEnd type="none" w="med" len="med"/>
+                      <a:tailEnd type="none" w="med" len="med"/>
+                    </a:lnR>
+                    <a:lnT w="12700" cap="flat" cmpd="sng" algn="ctr">
+                      <a:solidFill>
+                        <a:schemeClr val="tx1">
+                          <a:lumMod val="75000"/>
+                          <a:lumOff val="25000"/>
+                        </a:schemeClr>
+                      </a:solidFill>
+                      <a:prstDash val="solid"/>
+                      <a:round/>
+                      <a:headEnd type="none" w="med" len="med"/>
+                      <a:tailEnd type="none" w="med" len="med"/>
+                    </a:lnT>
+                    <a:lnB w="12700" cap="flat" cmpd="sng" algn="ctr">
+                      <a:solidFill>
+                        <a:schemeClr val="tx1">
+                          <a:lumMod val="75000"/>
+                          <a:lumOff val="25000"/>
+                        </a:schemeClr>
+                      </a:solidFill>
+                      <a:prstDash val="solid"/>
+                      <a:round/>
+                      <a:headEnd type="none" w="med" len="med"/>
+                      <a:tailEnd type="none" w="med" len="med"/>
+                    </a:lnB>
+                    <a:noFill/>
+                  </a:tcPr>
+                </a:tc>
+                <a:extLst>
+                  <a:ext uri="{0D108BD9-81ED-4DB2-BD59-A6C34878D82A}">
+                    <a16:rowId xmlns:a16="http://schemas.microsoft.com/office/drawing/2014/main" val="4161892362"/>
+                  </a:ext>
+                </a:extLst>
+              </a:tr>
+              <a:tr h="731520">
+                <a:tc>
+                  <a:txBody>
+                    <a:bodyPr/>
+                    <a:lstStyle/>
+                    <a:p>
+                      <a:pPr marL="0" marR="0" lvl="0" indent="0" algn="ctr" defTabSz="914400" rtl="0" eaLnBrk="1" fontAlgn="auto" latinLnBrk="0" hangingPunct="1">
+                        <a:lnSpc>
+                          <a:spcPct val="100000"/>
+                        </a:lnSpc>
+                        <a:spcBef>
+                          <a:spcPts val="0"/>
+                        </a:spcBef>
+                        <a:spcAft>
+                          <a:spcPts val="0"/>
+                        </a:spcAft>
+                        <a:buClrTx/>
+                        <a:buSzTx/>
+                        <a:buFontTx/>
+                        <a:buNone/>
+                        <a:tabLst/>
+                        <a:defRPr/>
+                      </a:pPr>
+                      <a:r>
+                        <a:rPr kumimoji="0" lang="en-US" sz="1800" b="0" i="0" u="none" strike="noStrike" kern="1200" cap="none" spc="0" normalizeH="0" baseline="0" noProof="0">
+                          <a:ln>
+                            <a:noFill/>
+                          </a:ln>
+                          <a:solidFill>
+                            <a:srgbClr val="000000">
+                              <a:lumMod val="75000"/>
+                              <a:lumOff val="25000"/>
+                            </a:srgbClr>
+                          </a:solidFill>
+                          <a:effectLst/>
+                          <a:uLnTx/>
+                          <a:uFillTx/>
+                          <a:latin typeface="Optima" panose="02000503060000020004" pitchFamily="2" charset="0"/>
+                          <a:ea typeface="+mn-ea"/>
+                          <a:cs typeface="+mn-cs"/>
+                        </a:rPr>
+                        <a:t>?</a:t>
+                      </a:r>
+                      <a:endParaRPr kumimoji="0" lang="en-US" sz="1800" b="0" i="0" u="none" strike="noStrike" kern="1200" cap="none" spc="0" normalizeH="0" baseline="0" noProof="0" dirty="0">
+                        <a:ln>
+                          <a:noFill/>
+                        </a:ln>
+                        <a:solidFill>
+                          <a:srgbClr val="000000">
+                            <a:lumMod val="75000"/>
+                            <a:lumOff val="25000"/>
+                          </a:srgbClr>
+                        </a:solidFill>
+                        <a:effectLst/>
+                        <a:uLnTx/>
+                        <a:uFillTx/>
+                        <a:latin typeface="Optima" panose="02000503060000020004" pitchFamily="2" charset="0"/>
+                        <a:ea typeface="+mn-ea"/>
+                        <a:cs typeface="+mn-cs"/>
+                      </a:endParaRPr>
+                    </a:p>
+                  </a:txBody>
+                  <a:tcPr anchor="ctr">
+                    <a:lnL w="12700" cap="flat" cmpd="sng" algn="ctr">
+                      <a:solidFill>
+                        <a:schemeClr val="tx1">
+                          <a:lumMod val="75000"/>
+                          <a:lumOff val="25000"/>
+                        </a:schemeClr>
+                      </a:solidFill>
+                      <a:prstDash val="solid"/>
+                      <a:round/>
+                      <a:headEnd type="none" w="med" len="med"/>
+                      <a:tailEnd type="none" w="med" len="med"/>
+                    </a:lnL>
+                    <a:lnR w="12700" cap="flat" cmpd="sng" algn="ctr">
+                      <a:solidFill>
+                        <a:schemeClr val="tx1">
+                          <a:lumMod val="75000"/>
+                          <a:lumOff val="25000"/>
+                        </a:schemeClr>
+                      </a:solidFill>
+                      <a:prstDash val="solid"/>
+                      <a:round/>
+                      <a:headEnd type="none" w="med" len="med"/>
+                      <a:tailEnd type="none" w="med" len="med"/>
+                    </a:lnR>
+                    <a:lnT w="12700" cap="flat" cmpd="sng" algn="ctr">
+                      <a:solidFill>
+                        <a:schemeClr val="tx1">
+                          <a:lumMod val="75000"/>
+                          <a:lumOff val="25000"/>
+                        </a:schemeClr>
+                      </a:solidFill>
+                      <a:prstDash val="solid"/>
+                      <a:round/>
+                      <a:headEnd type="none" w="med" len="med"/>
+                      <a:tailEnd type="none" w="med" len="med"/>
+                    </a:lnT>
+                    <a:lnB w="12700" cap="flat" cmpd="sng" algn="ctr">
+                      <a:solidFill>
+                        <a:schemeClr val="tx1">
+                          <a:lumMod val="75000"/>
+                          <a:lumOff val="25000"/>
+                        </a:schemeClr>
+                      </a:solidFill>
+                      <a:prstDash val="solid"/>
+                      <a:round/>
+                      <a:headEnd type="none" w="med" len="med"/>
+                      <a:tailEnd type="none" w="med" len="med"/>
+                    </a:lnB>
+                    <a:noFill/>
+                  </a:tcPr>
+                </a:tc>
+                <a:tc>
+                  <a:txBody>
+                    <a:bodyPr/>
+                    <a:lstStyle/>
+                    <a:p>
+                      <a:pPr marL="0" marR="0" lvl="0" indent="0" algn="ctr" defTabSz="914400" rtl="0" eaLnBrk="1" fontAlgn="auto" latinLnBrk="0" hangingPunct="1">
+                        <a:lnSpc>
+                          <a:spcPct val="100000"/>
+                        </a:lnSpc>
+                        <a:spcBef>
+                          <a:spcPts val="0"/>
+                        </a:spcBef>
+                        <a:spcAft>
+                          <a:spcPts val="0"/>
+                        </a:spcAft>
+                        <a:buClrTx/>
+                        <a:buSzTx/>
+                        <a:buFontTx/>
+                        <a:buNone/>
+                        <a:tabLst/>
+                        <a:defRPr/>
+                      </a:pPr>
+                      <a:r>
+                        <a:rPr kumimoji="0" lang="en-US" sz="1800" b="0" i="0" u="none" strike="noStrike" kern="1200" cap="none" spc="0" normalizeH="0" baseline="0" noProof="0" dirty="0">
+                          <a:ln>
+                            <a:noFill/>
+                          </a:ln>
+                          <a:solidFill>
+                            <a:srgbClr val="000000">
+                              <a:lumMod val="75000"/>
+                              <a:lumOff val="25000"/>
+                            </a:srgbClr>
+                          </a:solidFill>
+                          <a:effectLst/>
+                          <a:uLnTx/>
+                          <a:uFillTx/>
+                          <a:latin typeface="Optima" panose="02000503060000020004" pitchFamily="2" charset="0"/>
+                          <a:ea typeface="+mn-ea"/>
+                          <a:cs typeface="+mn-cs"/>
+                        </a:rPr>
+                        <a:t>.08</a:t>
+                      </a:r>
+                    </a:p>
+                  </a:txBody>
+                  <a:tcPr anchor="ctr">
+                    <a:lnL w="12700" cap="flat" cmpd="sng" algn="ctr">
+                      <a:solidFill>
+                        <a:schemeClr val="tx1">
+                          <a:lumMod val="75000"/>
+                          <a:lumOff val="25000"/>
+                        </a:schemeClr>
+                      </a:solidFill>
+                      <a:prstDash val="solid"/>
+                      <a:round/>
+                      <a:headEnd type="none" w="med" len="med"/>
+                      <a:tailEnd type="none" w="med" len="med"/>
+                    </a:lnL>
+                    <a:lnR w="12700" cap="flat" cmpd="sng" algn="ctr">
+                      <a:solidFill>
+                        <a:schemeClr val="tx1">
+                          <a:lumMod val="75000"/>
+                          <a:lumOff val="25000"/>
+                        </a:schemeClr>
+                      </a:solidFill>
+                      <a:prstDash val="solid"/>
+                      <a:round/>
+                      <a:headEnd type="none" w="med" len="med"/>
+                      <a:tailEnd type="none" w="med" len="med"/>
+                    </a:lnR>
+                    <a:lnT w="12700" cap="flat" cmpd="sng" algn="ctr">
+                      <a:solidFill>
+                        <a:schemeClr val="tx1">
+                          <a:lumMod val="75000"/>
+                          <a:lumOff val="25000"/>
+                        </a:schemeClr>
+                      </a:solidFill>
+                      <a:prstDash val="solid"/>
+                      <a:round/>
+                      <a:headEnd type="none" w="med" len="med"/>
+                      <a:tailEnd type="none" w="med" len="med"/>
+                    </a:lnT>
+                    <a:lnB w="12700" cap="flat" cmpd="sng" algn="ctr">
+                      <a:solidFill>
+                        <a:schemeClr val="tx1">
+                          <a:lumMod val="75000"/>
+                          <a:lumOff val="25000"/>
+                        </a:schemeClr>
+                      </a:solidFill>
+                      <a:prstDash val="solid"/>
+                      <a:round/>
+                      <a:headEnd type="none" w="med" len="med"/>
+                      <a:tailEnd type="none" w="med" len="med"/>
+                    </a:lnB>
+                    <a:noFill/>
+                  </a:tcPr>
+                </a:tc>
+                <a:tc>
+                  <a:txBody>
+                    <a:bodyPr/>
+                    <a:lstStyle/>
+                    <a:p>
+                      <a:pPr marL="0" marR="0" lvl="0" indent="0" algn="ctr" defTabSz="914400" rtl="0" eaLnBrk="1" fontAlgn="auto" latinLnBrk="0" hangingPunct="1">
+                        <a:lnSpc>
+                          <a:spcPct val="100000"/>
+                        </a:lnSpc>
+                        <a:spcBef>
+                          <a:spcPts val="0"/>
+                        </a:spcBef>
+                        <a:spcAft>
+                          <a:spcPts val="0"/>
+                        </a:spcAft>
+                        <a:buClrTx/>
+                        <a:buSzTx/>
+                        <a:buFontTx/>
+                        <a:buNone/>
+                        <a:tabLst/>
+                        <a:defRPr/>
+                      </a:pPr>
+                      <a:r>
+                        <a:rPr kumimoji="0" lang="en-US" sz="1800" b="0" i="0" u="none" strike="noStrike" kern="1200" cap="none" spc="0" normalizeH="0" baseline="0" noProof="0" dirty="0">
+                          <a:ln>
+                            <a:noFill/>
+                          </a:ln>
+                          <a:solidFill>
+                            <a:srgbClr val="000000">
+                              <a:lumMod val="75000"/>
+                              <a:lumOff val="25000"/>
+                            </a:srgbClr>
+                          </a:solidFill>
+                          <a:effectLst/>
+                          <a:uLnTx/>
+                          <a:uFillTx/>
+                          <a:latin typeface="Optima" panose="02000503060000020004" pitchFamily="2" charset="0"/>
+                          <a:ea typeface="+mn-ea"/>
+                          <a:cs typeface="+mn-cs"/>
+                        </a:rPr>
+                        <a:t>.02</a:t>
+                      </a:r>
+                    </a:p>
+                  </a:txBody>
+                  <a:tcPr anchor="ctr">
+                    <a:lnL w="12700" cap="flat" cmpd="sng" algn="ctr">
+                      <a:solidFill>
+                        <a:schemeClr val="tx1">
+                          <a:lumMod val="75000"/>
+                          <a:lumOff val="25000"/>
+                        </a:schemeClr>
+                      </a:solidFill>
+                      <a:prstDash val="solid"/>
+                      <a:round/>
+                      <a:headEnd type="none" w="med" len="med"/>
+                      <a:tailEnd type="none" w="med" len="med"/>
+                    </a:lnL>
+                    <a:lnR w="12700" cap="flat" cmpd="sng" algn="ctr">
+                      <a:solidFill>
+                        <a:schemeClr val="tx1">
+                          <a:lumMod val="75000"/>
+                          <a:lumOff val="25000"/>
+                        </a:schemeClr>
+                      </a:solidFill>
+                      <a:prstDash val="solid"/>
+                      <a:round/>
+                      <a:headEnd type="none" w="med" len="med"/>
+                      <a:tailEnd type="none" w="med" len="med"/>
+                    </a:lnR>
+                    <a:lnT w="12700" cap="flat" cmpd="sng" algn="ctr">
+                      <a:solidFill>
+                        <a:schemeClr val="tx1">
+                          <a:lumMod val="75000"/>
+                          <a:lumOff val="25000"/>
+                        </a:schemeClr>
+                      </a:solidFill>
+                      <a:prstDash val="solid"/>
+                      <a:round/>
+                      <a:headEnd type="none" w="med" len="med"/>
+                      <a:tailEnd type="none" w="med" len="med"/>
+                    </a:lnT>
+                    <a:lnB w="12700" cap="flat" cmpd="sng" algn="ctr">
+                      <a:solidFill>
+                        <a:schemeClr val="tx1">
+                          <a:lumMod val="75000"/>
+                          <a:lumOff val="25000"/>
+                        </a:schemeClr>
+                      </a:solidFill>
+                      <a:prstDash val="solid"/>
+                      <a:round/>
+                      <a:headEnd type="none" w="med" len="med"/>
+                      <a:tailEnd type="none" w="med" len="med"/>
+                    </a:lnB>
+                    <a:noFill/>
+                  </a:tcPr>
+                </a:tc>
+                <a:tc>
+                  <a:txBody>
+                    <a:bodyPr/>
+                    <a:lstStyle/>
+                    <a:p>
+                      <a:pPr marL="0" marR="0" lvl="0" indent="0" algn="ctr" defTabSz="914400" rtl="0" eaLnBrk="1" fontAlgn="auto" latinLnBrk="0" hangingPunct="1">
+                        <a:lnSpc>
+                          <a:spcPct val="100000"/>
+                        </a:lnSpc>
+                        <a:spcBef>
+                          <a:spcPts val="0"/>
+                        </a:spcBef>
+                        <a:spcAft>
+                          <a:spcPts val="0"/>
+                        </a:spcAft>
+                        <a:buClrTx/>
+                        <a:buSzTx/>
+                        <a:buFontTx/>
+                        <a:buNone/>
+                        <a:tabLst/>
+                        <a:defRPr/>
+                      </a:pPr>
+                      <a:r>
+                        <a:rPr kumimoji="0" lang="en-US" sz="1800" b="0" i="0" u="none" strike="noStrike" kern="1200" cap="none" spc="0" normalizeH="0" baseline="0" noProof="0" dirty="0">
+                          <a:ln>
+                            <a:noFill/>
+                          </a:ln>
+                          <a:solidFill>
+                            <a:srgbClr val="000000">
+                              <a:lumMod val="75000"/>
+                              <a:lumOff val="25000"/>
+                            </a:srgbClr>
+                          </a:solidFill>
+                          <a:effectLst/>
+                          <a:uLnTx/>
+                          <a:uFillTx/>
+                          <a:latin typeface="Optima" panose="02000503060000020004" pitchFamily="2" charset="0"/>
+                          <a:ea typeface="+mn-ea"/>
+                          <a:cs typeface="+mn-cs"/>
+                        </a:rPr>
+                        <a:t>.08</a:t>
+                      </a:r>
+                    </a:p>
+                  </a:txBody>
+                  <a:tcPr anchor="ctr">
+                    <a:lnL w="12700" cap="flat" cmpd="sng" algn="ctr">
+                      <a:solidFill>
+                        <a:schemeClr val="tx1">
+                          <a:lumMod val="75000"/>
+                          <a:lumOff val="25000"/>
+                        </a:schemeClr>
+                      </a:solidFill>
+                      <a:prstDash val="solid"/>
+                      <a:round/>
+                      <a:headEnd type="none" w="med" len="med"/>
+                      <a:tailEnd type="none" w="med" len="med"/>
+                    </a:lnL>
+                    <a:lnR w="12700" cap="flat" cmpd="sng" algn="ctr">
+                      <a:solidFill>
+                        <a:schemeClr val="tx1">
+                          <a:lumMod val="75000"/>
+                          <a:lumOff val="25000"/>
+                        </a:schemeClr>
+                      </a:solidFill>
+                      <a:prstDash val="solid"/>
+                      <a:round/>
+                      <a:headEnd type="none" w="med" len="med"/>
+                      <a:tailEnd type="none" w="med" len="med"/>
+                    </a:lnR>
+                    <a:lnT w="12700" cap="flat" cmpd="sng" algn="ctr">
+                      <a:solidFill>
+                        <a:schemeClr val="tx1">
+                          <a:lumMod val="75000"/>
+                          <a:lumOff val="25000"/>
+                        </a:schemeClr>
+                      </a:solidFill>
+                      <a:prstDash val="solid"/>
+                      <a:round/>
+                      <a:headEnd type="none" w="med" len="med"/>
+                      <a:tailEnd type="none" w="med" len="med"/>
+                    </a:lnT>
+                    <a:lnB w="12700" cap="flat" cmpd="sng" algn="ctr">
+                      <a:solidFill>
+                        <a:schemeClr val="tx1">
+                          <a:lumMod val="75000"/>
+                          <a:lumOff val="25000"/>
+                        </a:schemeClr>
+                      </a:solidFill>
+                      <a:prstDash val="solid"/>
+                      <a:round/>
+                      <a:headEnd type="none" w="med" len="med"/>
+                      <a:tailEnd type="none" w="med" len="med"/>
+                    </a:lnB>
+                    <a:noFill/>
+                  </a:tcPr>
+                </a:tc>
+                <a:tc>
+                  <a:txBody>
+                    <a:bodyPr/>
+                    <a:lstStyle/>
+                    <a:p>
+                      <a:pPr marL="0" marR="0" lvl="0" indent="0" algn="ctr" defTabSz="914400" rtl="0" eaLnBrk="1" fontAlgn="auto" latinLnBrk="0" hangingPunct="1">
+                        <a:lnSpc>
+                          <a:spcPct val="100000"/>
+                        </a:lnSpc>
+                        <a:spcBef>
+                          <a:spcPts val="0"/>
+                        </a:spcBef>
+                        <a:spcAft>
+                          <a:spcPts val="0"/>
+                        </a:spcAft>
+                        <a:buClrTx/>
+                        <a:buSzTx/>
+                        <a:buFontTx/>
+                        <a:buNone/>
+                        <a:tabLst/>
+                        <a:defRPr/>
+                      </a:pPr>
+                      <a:r>
+                        <a:rPr kumimoji="0" lang="en-US" sz="1800" b="0" i="0" u="none" strike="noStrike" kern="1200" cap="none" spc="0" normalizeH="0" baseline="0" noProof="0">
+                          <a:ln>
+                            <a:noFill/>
+                          </a:ln>
+                          <a:solidFill>
+                            <a:srgbClr val="000000">
+                              <a:lumMod val="75000"/>
+                              <a:lumOff val="25000"/>
+                            </a:srgbClr>
+                          </a:solidFill>
+                          <a:effectLst/>
+                          <a:uLnTx/>
+                          <a:uFillTx/>
+                          <a:latin typeface="Optima" panose="02000503060000020004" pitchFamily="2" charset="0"/>
+                          <a:ea typeface="+mn-ea"/>
+                          <a:cs typeface="+mn-cs"/>
+                        </a:rPr>
+                        <a:t>?</a:t>
+                      </a:r>
+                      <a:endParaRPr kumimoji="0" lang="en-US" sz="1800" b="0" i="0" u="none" strike="noStrike" kern="1200" cap="none" spc="0" normalizeH="0" baseline="0" noProof="0" dirty="0">
+                        <a:ln>
+                          <a:noFill/>
+                        </a:ln>
+                        <a:solidFill>
+                          <a:srgbClr val="000000">
+                            <a:lumMod val="75000"/>
+                            <a:lumOff val="25000"/>
+                          </a:srgbClr>
+                        </a:solidFill>
+                        <a:effectLst/>
+                        <a:uLnTx/>
+                        <a:uFillTx/>
+                        <a:latin typeface="Optima" panose="02000503060000020004" pitchFamily="2" charset="0"/>
+                        <a:ea typeface="+mn-ea"/>
+                        <a:cs typeface="+mn-cs"/>
+                      </a:endParaRPr>
+                    </a:p>
+                  </a:txBody>
+                  <a:tcPr anchor="ctr">
+                    <a:lnL w="12700" cap="flat" cmpd="sng" algn="ctr">
+                      <a:solidFill>
+                        <a:schemeClr val="tx1">
+                          <a:lumMod val="75000"/>
+                          <a:lumOff val="25000"/>
+                        </a:schemeClr>
+                      </a:solidFill>
+                      <a:prstDash val="solid"/>
+                      <a:round/>
+                      <a:headEnd type="none" w="med" len="med"/>
+                      <a:tailEnd type="none" w="med" len="med"/>
+                    </a:lnL>
+                    <a:lnR w="12700" cap="flat" cmpd="sng" algn="ctr">
+                      <a:solidFill>
+                        <a:schemeClr val="tx1">
+                          <a:lumMod val="75000"/>
+                          <a:lumOff val="25000"/>
+                        </a:schemeClr>
+                      </a:solidFill>
+                      <a:prstDash val="solid"/>
+                      <a:round/>
+                      <a:headEnd type="none" w="med" len="med"/>
+                      <a:tailEnd type="none" w="med" len="med"/>
+                    </a:lnR>
+                    <a:lnT w="12700" cap="flat" cmpd="sng" algn="ctr">
+                      <a:solidFill>
+                        <a:schemeClr val="tx1">
+                          <a:lumMod val="75000"/>
+                          <a:lumOff val="25000"/>
+                        </a:schemeClr>
+                      </a:solidFill>
+                      <a:prstDash val="solid"/>
+                      <a:round/>
+                      <a:headEnd type="none" w="med" len="med"/>
+                      <a:tailEnd type="none" w="med" len="med"/>
+                    </a:lnT>
+                    <a:lnB w="12700" cap="flat" cmpd="sng" algn="ctr">
+                      <a:solidFill>
+                        <a:schemeClr val="tx1">
+                          <a:lumMod val="75000"/>
+                          <a:lumOff val="25000"/>
+                        </a:schemeClr>
+                      </a:solidFill>
+                      <a:prstDash val="solid"/>
+                      <a:round/>
+                      <a:headEnd type="none" w="med" len="med"/>
+                      <a:tailEnd type="none" w="med" len="med"/>
+                    </a:lnB>
+                    <a:noFill/>
+                  </a:tcPr>
+                </a:tc>
+                <a:extLst>
+                  <a:ext uri="{0D108BD9-81ED-4DB2-BD59-A6C34878D82A}">
+                    <a16:rowId xmlns:a16="http://schemas.microsoft.com/office/drawing/2014/main" val="1662239566"/>
+                  </a:ext>
+                </a:extLst>
+              </a:tr>
+              <a:tr h="731520">
+                <a:tc>
+                  <a:txBody>
+                    <a:bodyPr/>
+                    <a:lstStyle/>
+                    <a:p>
+                      <a:pPr marL="0" marR="0" lvl="0" indent="0" algn="ctr" defTabSz="914400" rtl="0" eaLnBrk="1" fontAlgn="auto" latinLnBrk="0" hangingPunct="1">
+                        <a:lnSpc>
+                          <a:spcPct val="100000"/>
+                        </a:lnSpc>
+                        <a:spcBef>
+                          <a:spcPts val="0"/>
+                        </a:spcBef>
+                        <a:spcAft>
+                          <a:spcPts val="0"/>
+                        </a:spcAft>
+                        <a:buClrTx/>
+                        <a:buSzTx/>
+                        <a:buFontTx/>
+                        <a:buNone/>
+                        <a:tabLst/>
+                        <a:defRPr/>
+                      </a:pPr>
+                      <a:r>
+                        <a:rPr kumimoji="0" lang="en-US" sz="1800" b="0" i="0" u="none" strike="noStrike" kern="1200" cap="none" spc="0" normalizeH="0" baseline="0" noProof="0" dirty="0">
+                          <a:ln>
+                            <a:noFill/>
+                          </a:ln>
+                          <a:solidFill>
+                            <a:srgbClr val="000000">
+                              <a:lumMod val="75000"/>
+                              <a:lumOff val="25000"/>
+                            </a:srgbClr>
+                          </a:solidFill>
+                          <a:effectLst/>
+                          <a:uLnTx/>
+                          <a:uFillTx/>
+                          <a:latin typeface="Optima" panose="02000503060000020004" pitchFamily="2" charset="0"/>
+                          <a:ea typeface="+mn-ea"/>
+                          <a:cs typeface="+mn-cs"/>
+                        </a:rPr>
+                        <a:t>?</a:t>
+                      </a:r>
+                    </a:p>
+                  </a:txBody>
+                  <a:tcPr anchor="ctr">
+                    <a:lnL w="12700" cap="flat" cmpd="sng" algn="ctr">
+                      <a:solidFill>
+                        <a:schemeClr val="tx1">
+                          <a:lumMod val="75000"/>
+                          <a:lumOff val="25000"/>
+                        </a:schemeClr>
+                      </a:solidFill>
+                      <a:prstDash val="solid"/>
+                      <a:round/>
+                      <a:headEnd type="none" w="med" len="med"/>
+                      <a:tailEnd type="none" w="med" len="med"/>
+                    </a:lnL>
+                    <a:lnR w="12700" cap="flat" cmpd="sng" algn="ctr">
+                      <a:solidFill>
+                        <a:schemeClr val="tx1">
+                          <a:lumMod val="75000"/>
+                          <a:lumOff val="25000"/>
+                        </a:schemeClr>
+                      </a:solidFill>
+                      <a:prstDash val="solid"/>
+                      <a:round/>
+                      <a:headEnd type="none" w="med" len="med"/>
+                      <a:tailEnd type="none" w="med" len="med"/>
+                    </a:lnR>
+                    <a:lnT w="12700" cap="flat" cmpd="sng" algn="ctr">
+                      <a:solidFill>
+                        <a:schemeClr val="tx1">
+                          <a:lumMod val="75000"/>
+                          <a:lumOff val="25000"/>
+                        </a:schemeClr>
+                      </a:solidFill>
+                      <a:prstDash val="solid"/>
+                      <a:round/>
+                      <a:headEnd type="none" w="med" len="med"/>
+                      <a:tailEnd type="none" w="med" len="med"/>
+                    </a:lnT>
+                    <a:lnB w="12700" cap="flat" cmpd="sng" algn="ctr">
+                      <a:solidFill>
+                        <a:schemeClr val="tx1">
+                          <a:lumMod val="75000"/>
+                          <a:lumOff val="25000"/>
+                        </a:schemeClr>
+                      </a:solidFill>
+                      <a:prstDash val="solid"/>
+                      <a:round/>
+                      <a:headEnd type="none" w="med" len="med"/>
+                      <a:tailEnd type="none" w="med" len="med"/>
+                    </a:lnB>
+                    <a:noFill/>
+                  </a:tcPr>
+                </a:tc>
+                <a:tc>
+                  <a:txBody>
+                    <a:bodyPr/>
+                    <a:lstStyle/>
+                    <a:p>
+                      <a:pPr marL="0" marR="0" lvl="0" indent="0" algn="ctr" defTabSz="914400" rtl="0" eaLnBrk="1" fontAlgn="auto" latinLnBrk="0" hangingPunct="1">
+                        <a:lnSpc>
+                          <a:spcPct val="100000"/>
+                        </a:lnSpc>
+                        <a:spcBef>
+                          <a:spcPts val="0"/>
+                        </a:spcBef>
+                        <a:spcAft>
+                          <a:spcPts val="0"/>
+                        </a:spcAft>
+                        <a:buClrTx/>
+                        <a:buSzTx/>
+                        <a:buFontTx/>
+                        <a:buNone/>
+                        <a:tabLst/>
+                        <a:defRPr/>
+                      </a:pPr>
+                      <a:r>
+                        <a:rPr kumimoji="0" lang="en-US" sz="1800" b="0" i="0" u="none" strike="noStrike" kern="1200" cap="none" spc="0" normalizeH="0" baseline="0" noProof="0">
+                          <a:ln>
+                            <a:noFill/>
+                          </a:ln>
+                          <a:solidFill>
+                            <a:srgbClr val="000000">
+                              <a:lumMod val="75000"/>
+                              <a:lumOff val="25000"/>
+                            </a:srgbClr>
+                          </a:solidFill>
+                          <a:effectLst/>
+                          <a:uLnTx/>
+                          <a:uFillTx/>
+                          <a:latin typeface="Optima" panose="02000503060000020004" pitchFamily="2" charset="0"/>
+                          <a:ea typeface="+mn-ea"/>
+                          <a:cs typeface="+mn-cs"/>
+                        </a:rPr>
+                        <a:t>?</a:t>
+                      </a:r>
+                      <a:endParaRPr kumimoji="0" lang="en-US" sz="1800" b="0" i="0" u="none" strike="noStrike" kern="1200" cap="none" spc="0" normalizeH="0" baseline="0" noProof="0" dirty="0">
+                        <a:ln>
+                          <a:noFill/>
+                        </a:ln>
+                        <a:solidFill>
+                          <a:srgbClr val="000000">
+                            <a:lumMod val="75000"/>
+                            <a:lumOff val="25000"/>
+                          </a:srgbClr>
+                        </a:solidFill>
+                        <a:effectLst/>
+                        <a:uLnTx/>
+                        <a:uFillTx/>
+                        <a:latin typeface="Optima" panose="02000503060000020004" pitchFamily="2" charset="0"/>
+                        <a:ea typeface="+mn-ea"/>
+                        <a:cs typeface="+mn-cs"/>
+                      </a:endParaRPr>
+                    </a:p>
+                  </a:txBody>
+                  <a:tcPr anchor="ctr">
+                    <a:lnL w="12700" cap="flat" cmpd="sng" algn="ctr">
+                      <a:solidFill>
+                        <a:schemeClr val="tx1">
+                          <a:lumMod val="75000"/>
+                          <a:lumOff val="25000"/>
+                        </a:schemeClr>
+                      </a:solidFill>
+                      <a:prstDash val="solid"/>
+                      <a:round/>
+                      <a:headEnd type="none" w="med" len="med"/>
+                      <a:tailEnd type="none" w="med" len="med"/>
+                    </a:lnL>
+                    <a:lnR w="12700" cap="flat" cmpd="sng" algn="ctr">
+                      <a:solidFill>
+                        <a:schemeClr val="tx1">
+                          <a:lumMod val="75000"/>
+                          <a:lumOff val="25000"/>
+                        </a:schemeClr>
+                      </a:solidFill>
+                      <a:prstDash val="solid"/>
+                      <a:round/>
+                      <a:headEnd type="none" w="med" len="med"/>
+                      <a:tailEnd type="none" w="med" len="med"/>
+                    </a:lnR>
+                    <a:lnT w="12700" cap="flat" cmpd="sng" algn="ctr">
+                      <a:solidFill>
+                        <a:schemeClr val="tx1">
+                          <a:lumMod val="75000"/>
+                          <a:lumOff val="25000"/>
+                        </a:schemeClr>
+                      </a:solidFill>
+                      <a:prstDash val="solid"/>
+                      <a:round/>
+                      <a:headEnd type="none" w="med" len="med"/>
+                      <a:tailEnd type="none" w="med" len="med"/>
+                    </a:lnT>
+                    <a:lnB w="12700" cap="flat" cmpd="sng" algn="ctr">
+                      <a:solidFill>
+                        <a:schemeClr val="tx1">
+                          <a:lumMod val="75000"/>
+                          <a:lumOff val="25000"/>
+                        </a:schemeClr>
+                      </a:solidFill>
+                      <a:prstDash val="solid"/>
+                      <a:round/>
+                      <a:headEnd type="none" w="med" len="med"/>
+                      <a:tailEnd type="none" w="med" len="med"/>
+                    </a:lnB>
+                    <a:noFill/>
+                  </a:tcPr>
+                </a:tc>
+                <a:tc>
+                  <a:txBody>
+                    <a:bodyPr/>
+                    <a:lstStyle/>
+                    <a:p>
+                      <a:pPr marL="0" marR="0" lvl="0" indent="0" algn="ctr" defTabSz="914400" rtl="0" eaLnBrk="1" fontAlgn="auto" latinLnBrk="0" hangingPunct="1">
+                        <a:lnSpc>
+                          <a:spcPct val="100000"/>
+                        </a:lnSpc>
+                        <a:spcBef>
+                          <a:spcPts val="0"/>
+                        </a:spcBef>
+                        <a:spcAft>
+                          <a:spcPts val="0"/>
+                        </a:spcAft>
+                        <a:buClrTx/>
+                        <a:buSzTx/>
+                        <a:buFontTx/>
+                        <a:buNone/>
+                        <a:tabLst/>
+                        <a:defRPr/>
+                      </a:pPr>
+                      <a:r>
+                        <a:rPr kumimoji="0" lang="en-US" sz="1800" b="0" i="0" u="none" strike="noStrike" kern="1200" cap="none" spc="0" normalizeH="0" baseline="0" noProof="0">
+                          <a:ln>
+                            <a:noFill/>
+                          </a:ln>
+                          <a:solidFill>
+                            <a:srgbClr val="000000">
+                              <a:lumMod val="75000"/>
+                              <a:lumOff val="25000"/>
+                            </a:srgbClr>
+                          </a:solidFill>
+                          <a:effectLst/>
+                          <a:uLnTx/>
+                          <a:uFillTx/>
+                          <a:latin typeface="Optima" panose="02000503060000020004" pitchFamily="2" charset="0"/>
+                          <a:ea typeface="+mn-ea"/>
+                          <a:cs typeface="+mn-cs"/>
+                        </a:rPr>
+                        <a:t>?</a:t>
+                      </a:r>
+                      <a:endParaRPr kumimoji="0" lang="en-US" sz="1800" b="0" i="0" u="none" strike="noStrike" kern="1200" cap="none" spc="0" normalizeH="0" baseline="0" noProof="0" dirty="0">
+                        <a:ln>
+                          <a:noFill/>
+                        </a:ln>
+                        <a:solidFill>
+                          <a:srgbClr val="000000">
+                            <a:lumMod val="75000"/>
+                            <a:lumOff val="25000"/>
+                          </a:srgbClr>
+                        </a:solidFill>
+                        <a:effectLst/>
+                        <a:uLnTx/>
+                        <a:uFillTx/>
+                        <a:latin typeface="Optima" panose="02000503060000020004" pitchFamily="2" charset="0"/>
+                        <a:ea typeface="+mn-ea"/>
+                        <a:cs typeface="+mn-cs"/>
+                      </a:endParaRPr>
+                    </a:p>
+                  </a:txBody>
+                  <a:tcPr anchor="ctr">
+                    <a:lnL w="12700" cap="flat" cmpd="sng" algn="ctr">
+                      <a:solidFill>
+                        <a:schemeClr val="tx1">
+                          <a:lumMod val="75000"/>
+                          <a:lumOff val="25000"/>
+                        </a:schemeClr>
+                      </a:solidFill>
+                      <a:prstDash val="solid"/>
+                      <a:round/>
+                      <a:headEnd type="none" w="med" len="med"/>
+                      <a:tailEnd type="none" w="med" len="med"/>
+                    </a:lnL>
+                    <a:lnR w="12700" cap="flat" cmpd="sng" algn="ctr">
+                      <a:solidFill>
+                        <a:schemeClr val="tx1">
+                          <a:lumMod val="75000"/>
+                          <a:lumOff val="25000"/>
+                        </a:schemeClr>
+                      </a:solidFill>
+                      <a:prstDash val="solid"/>
+                      <a:round/>
+                      <a:headEnd type="none" w="med" len="med"/>
+                      <a:tailEnd type="none" w="med" len="med"/>
+                    </a:lnR>
+                    <a:lnT w="12700" cap="flat" cmpd="sng" algn="ctr">
+                      <a:solidFill>
+                        <a:schemeClr val="tx1">
+                          <a:lumMod val="75000"/>
+                          <a:lumOff val="25000"/>
+                        </a:schemeClr>
+                      </a:solidFill>
+                      <a:prstDash val="solid"/>
+                      <a:round/>
+                      <a:headEnd type="none" w="med" len="med"/>
+                      <a:tailEnd type="none" w="med" len="med"/>
+                    </a:lnT>
+                    <a:lnB w="12700" cap="flat" cmpd="sng" algn="ctr">
+                      <a:solidFill>
+                        <a:schemeClr val="tx1">
+                          <a:lumMod val="75000"/>
+                          <a:lumOff val="25000"/>
+                        </a:schemeClr>
+                      </a:solidFill>
+                      <a:prstDash val="solid"/>
+                      <a:round/>
+                      <a:headEnd type="none" w="med" len="med"/>
+                      <a:tailEnd type="none" w="med" len="med"/>
+                    </a:lnB>
+                    <a:noFill/>
+                  </a:tcPr>
+                </a:tc>
+                <a:tc>
+                  <a:txBody>
+                    <a:bodyPr/>
+                    <a:lstStyle/>
+                    <a:p>
+                      <a:pPr marL="0" marR="0" lvl="0" indent="0" algn="ctr" defTabSz="914400" rtl="0" eaLnBrk="1" fontAlgn="auto" latinLnBrk="0" hangingPunct="1">
+                        <a:lnSpc>
+                          <a:spcPct val="100000"/>
+                        </a:lnSpc>
+                        <a:spcBef>
+                          <a:spcPts val="0"/>
+                        </a:spcBef>
+                        <a:spcAft>
+                          <a:spcPts val="0"/>
+                        </a:spcAft>
+                        <a:buClrTx/>
+                        <a:buSzTx/>
+                        <a:buFontTx/>
+                        <a:buNone/>
+                        <a:tabLst/>
+                        <a:defRPr/>
+                      </a:pPr>
+                      <a:r>
+                        <a:rPr kumimoji="0" lang="en-US" sz="1800" b="0" i="0" u="none" strike="noStrike" kern="1200" cap="none" spc="0" normalizeH="0" baseline="0" noProof="0" dirty="0">
+                          <a:ln>
+                            <a:noFill/>
+                          </a:ln>
+                          <a:solidFill>
+                            <a:srgbClr val="000000">
+                              <a:lumMod val="75000"/>
+                              <a:lumOff val="25000"/>
+                            </a:srgbClr>
+                          </a:solidFill>
+                          <a:effectLst/>
+                          <a:uLnTx/>
+                          <a:uFillTx/>
+                          <a:latin typeface="Optima" panose="02000503060000020004" pitchFamily="2" charset="0"/>
+                          <a:ea typeface="+mn-ea"/>
+                          <a:cs typeface="+mn-cs"/>
+                        </a:rPr>
+                        <a:t>?</a:t>
+                      </a:r>
+                    </a:p>
+                  </a:txBody>
+                  <a:tcPr anchor="ctr">
+                    <a:lnL w="12700" cap="flat" cmpd="sng" algn="ctr">
+                      <a:solidFill>
+                        <a:schemeClr val="tx1">
+                          <a:lumMod val="75000"/>
+                          <a:lumOff val="25000"/>
+                        </a:schemeClr>
+                      </a:solidFill>
+                      <a:prstDash val="solid"/>
+                      <a:round/>
+                      <a:headEnd type="none" w="med" len="med"/>
+                      <a:tailEnd type="none" w="med" len="med"/>
+                    </a:lnL>
+                    <a:lnR w="12700" cap="flat" cmpd="sng" algn="ctr">
+                      <a:solidFill>
+                        <a:schemeClr val="tx1">
+                          <a:lumMod val="75000"/>
+                          <a:lumOff val="25000"/>
+                        </a:schemeClr>
+                      </a:solidFill>
+                      <a:prstDash val="solid"/>
+                      <a:round/>
+                      <a:headEnd type="none" w="med" len="med"/>
+                      <a:tailEnd type="none" w="med" len="med"/>
+                    </a:lnR>
+                    <a:lnT w="12700" cap="flat" cmpd="sng" algn="ctr">
+                      <a:solidFill>
+                        <a:schemeClr val="tx1">
+                          <a:lumMod val="75000"/>
+                          <a:lumOff val="25000"/>
+                        </a:schemeClr>
+                      </a:solidFill>
+                      <a:prstDash val="solid"/>
+                      <a:round/>
+                      <a:headEnd type="none" w="med" len="med"/>
+                      <a:tailEnd type="none" w="med" len="med"/>
+                    </a:lnT>
+                    <a:lnB w="12700" cap="flat" cmpd="sng" algn="ctr">
+                      <a:solidFill>
+                        <a:schemeClr val="tx1">
+                          <a:lumMod val="75000"/>
+                          <a:lumOff val="25000"/>
+                        </a:schemeClr>
+                      </a:solidFill>
+                      <a:prstDash val="solid"/>
+                      <a:round/>
+                      <a:headEnd type="none" w="med" len="med"/>
+                      <a:tailEnd type="none" w="med" len="med"/>
+                    </a:lnB>
+                    <a:noFill/>
+                  </a:tcPr>
+                </a:tc>
+                <a:tc>
+                  <a:txBody>
+                    <a:bodyPr/>
+                    <a:lstStyle/>
+                    <a:p>
+                      <a:pPr marL="0" marR="0" lvl="0" indent="0" algn="ctr" defTabSz="914400" rtl="0" eaLnBrk="1" fontAlgn="auto" latinLnBrk="0" hangingPunct="1">
+                        <a:lnSpc>
+                          <a:spcPct val="100000"/>
+                        </a:lnSpc>
+                        <a:spcBef>
+                          <a:spcPts val="0"/>
+                        </a:spcBef>
+                        <a:spcAft>
+                          <a:spcPts val="0"/>
+                        </a:spcAft>
+                        <a:buClrTx/>
+                        <a:buSzTx/>
+                        <a:buFontTx/>
+                        <a:buNone/>
+                        <a:tabLst/>
+                        <a:defRPr/>
+                      </a:pPr>
+                      <a:r>
+                        <a:rPr kumimoji="0" lang="en-US" sz="1800" b="0" i="0" u="none" strike="noStrike" kern="1200" cap="none" spc="0" normalizeH="0" baseline="0" noProof="0" dirty="0">
+                          <a:ln>
+                            <a:noFill/>
+                          </a:ln>
+                          <a:solidFill>
+                            <a:srgbClr val="000000">
+                              <a:lumMod val="75000"/>
+                              <a:lumOff val="25000"/>
+                            </a:srgbClr>
+                          </a:solidFill>
+                          <a:effectLst/>
+                          <a:uLnTx/>
+                          <a:uFillTx/>
+                          <a:latin typeface="Optima" panose="02000503060000020004" pitchFamily="2" charset="0"/>
+                          <a:ea typeface="+mn-ea"/>
+                          <a:cs typeface="+mn-cs"/>
+                        </a:rPr>
+                        <a:t>?</a:t>
+                      </a:r>
+                    </a:p>
+                  </a:txBody>
+                  <a:tcPr anchor="ctr">
+                    <a:lnL w="12700" cap="flat" cmpd="sng" algn="ctr">
+                      <a:solidFill>
+                        <a:schemeClr val="tx1">
+                          <a:lumMod val="75000"/>
+                          <a:lumOff val="25000"/>
+                        </a:schemeClr>
+                      </a:solidFill>
+                      <a:prstDash val="solid"/>
+                      <a:round/>
+                      <a:headEnd type="none" w="med" len="med"/>
+                      <a:tailEnd type="none" w="med" len="med"/>
+                    </a:lnL>
+                    <a:lnR w="12700" cap="flat" cmpd="sng" algn="ctr">
+                      <a:solidFill>
+                        <a:schemeClr val="tx1">
+                          <a:lumMod val="75000"/>
+                          <a:lumOff val="25000"/>
+                        </a:schemeClr>
+                      </a:solidFill>
+                      <a:prstDash val="solid"/>
+                      <a:round/>
+                      <a:headEnd type="none" w="med" len="med"/>
+                      <a:tailEnd type="none" w="med" len="med"/>
+                    </a:lnR>
+                    <a:lnT w="12700" cap="flat" cmpd="sng" algn="ctr">
+                      <a:solidFill>
+                        <a:schemeClr val="tx1">
+                          <a:lumMod val="75000"/>
+                          <a:lumOff val="25000"/>
+                        </a:schemeClr>
+                      </a:solidFill>
+                      <a:prstDash val="solid"/>
+                      <a:round/>
+                      <a:headEnd type="none" w="med" len="med"/>
+                      <a:tailEnd type="none" w="med" len="med"/>
+                    </a:lnT>
+                    <a:lnB w="12700" cap="flat" cmpd="sng" algn="ctr">
+                      <a:solidFill>
+                        <a:schemeClr val="tx1">
+                          <a:lumMod val="75000"/>
+                          <a:lumOff val="25000"/>
+                        </a:schemeClr>
+                      </a:solidFill>
+                      <a:prstDash val="solid"/>
+                      <a:round/>
+                      <a:headEnd type="none" w="med" len="med"/>
+                      <a:tailEnd type="none" w="med" len="med"/>
+                    </a:lnB>
+                    <a:noFill/>
+                  </a:tcPr>
+                </a:tc>
+                <a:extLst>
+                  <a:ext uri="{0D108BD9-81ED-4DB2-BD59-A6C34878D82A}">
+                    <a16:rowId xmlns:a16="http://schemas.microsoft.com/office/drawing/2014/main" val="4189107174"/>
+                  </a:ext>
+                </a:extLst>
+              </a:tr>
+            </a:tbl>
+          </a:graphicData>
+        </a:graphic>
+      </p:graphicFrame>
+    </p:spTree>
+    <p:extLst>
+      <p:ext uri="{BB962C8B-B14F-4D97-AF65-F5344CB8AC3E}">
+        <p14:creationId xmlns:p14="http://schemas.microsoft.com/office/powerpoint/2010/main" val="1632844143"/>
+      </p:ext>
+    </p:extLst>
+  </p:cSld>
+  <p:clrMapOvr>
+    <a:masterClrMapping/>
+  </p:clrMapOvr>
+</p:sld>
+</file>
+
 <file path=ppt/theme/theme1.xml><?xml version="1.0" encoding="utf-8"?>
 <a:theme xmlns:a="http://schemas.openxmlformats.org/drawingml/2006/main" name="Office Theme">
   <a:themeElements>

</xml_diff>

<commit_message>
Typo and adding more figures
</commit_message>
<xml_diff>
--- a/figures/MMBS Figures.pptx
+++ b/figures/MMBS Figures.pptx
@@ -1101,15 +1101,7 @@
           <a:p>
             <a:r>
               <a:rPr lang="en-US" dirty="0" err="1"/>
-              <a:t>A_concentration_two_time_</a:t>
-            </a:r>
-            <a:r>
-              <a:rPr lang="en-US" err="1"/>
-              <a:t>steps</a:t>
-            </a:r>
-            <a:r>
-              <a:rPr lang="en-US"/>
-              <a:t>_complete</a:t>
+              <a:t>A_concentration_two_time_steps_complete</a:t>
             </a:r>
             <a:endParaRPr lang="en-US" dirty="0"/>
           </a:p>
@@ -11331,7 +11323,7 @@
           <p:nvPr>
             <p:extLst>
               <p:ext uri="{D42A27DB-BD31-4B8C-83A1-F6EECF244321}">
-                <p14:modId xmlns:p14="http://schemas.microsoft.com/office/powerpoint/2010/main" val="2825691573"/>
+                <p14:modId xmlns:p14="http://schemas.microsoft.com/office/powerpoint/2010/main" val="3192238990"/>
               </p:ext>
             </p:extLst>
           </p:nvPr>
@@ -12188,7 +12180,7 @@
                           <a:ea typeface="+mn-ea"/>
                           <a:cs typeface="+mn-cs"/>
                         </a:rPr>
-                        <a:t>.02</a:t>
+                        <a:t>.04</a:t>
                       </a:r>
                     </a:p>
                   </a:txBody>
@@ -12613,7 +12605,7 @@
                           <a:ea typeface="+mn-ea"/>
                           <a:cs typeface="+mn-cs"/>
                         </a:rPr>
-                        <a:t>.02</a:t>
+                        <a:t>.04</a:t>
                       </a:r>
                     </a:p>
                   </a:txBody>
@@ -12805,7 +12797,7 @@
                           <a:ea typeface="+mn-ea"/>
                           <a:cs typeface="+mn-cs"/>
                         </a:rPr>
-                        <a:t>.02</a:t>
+                        <a:t>.04</a:t>
                       </a:r>
                     </a:p>
                   </a:txBody>
@@ -13230,7 +13222,7 @@
                           <a:ea typeface="+mn-ea"/>
                           <a:cs typeface="+mn-cs"/>
                         </a:rPr>
-                        <a:t>.02</a:t>
+                        <a:t>.04</a:t>
                       </a:r>
                     </a:p>
                   </a:txBody>
@@ -13621,7 +13613,7 @@
                         <a:defRPr/>
                       </a:pPr>
                       <a:r>
-                        <a:rPr kumimoji="0" lang="en-US" sz="1800" b="0" i="0" u="none" strike="noStrike" kern="1200" cap="none" spc="0" normalizeH="0" baseline="0" noProof="0">
+                        <a:rPr kumimoji="0" lang="en-US" sz="1800" b="0" i="0" u="none" strike="noStrike" kern="1200" cap="none" spc="0" normalizeH="0" baseline="0" noProof="0" dirty="0">
                           <a:ln>
                             <a:noFill/>
                           </a:ln>
@@ -13640,23 +13632,6 @@
                         </a:rPr>
                         <a:t>?</a:t>
                       </a:r>
-                      <a:endParaRPr kumimoji="0" lang="en-US" sz="1800" b="0" i="0" u="none" strike="noStrike" kern="1200" cap="none" spc="0" normalizeH="0" baseline="0" noProof="0" dirty="0">
-                        <a:ln>
-                          <a:noFill/>
-                        </a:ln>
-                        <a:solidFill>
-                          <a:srgbClr val="000000">
-                            <a:lumMod val="75000"/>
-                            <a:lumOff val="25000"/>
-                          </a:srgbClr>
-                        </a:solidFill>
-                        <a:effectLst/>
-                        <a:uLnTx/>
-                        <a:uFillTx/>
-                        <a:latin typeface="Optima" panose="02000503060000020004" pitchFamily="2" charset="0"/>
-                        <a:ea typeface="+mn-ea"/>
-                        <a:cs typeface="+mn-cs"/>
-                      </a:endParaRPr>
                     </a:p>
                   </a:txBody>
                   <a:tcPr anchor="ctr">
@@ -14068,7 +14043,13 @@
           <p:cNvGraphicFramePr>
             <a:graphicFrameLocks noGrp="1"/>
           </p:cNvGraphicFramePr>
-          <p:nvPr/>
+          <p:nvPr>
+            <p:extLst>
+              <p:ext uri="{D42A27DB-BD31-4B8C-83A1-F6EECF244321}">
+                <p14:modId xmlns:p14="http://schemas.microsoft.com/office/powerpoint/2010/main" val="2381282155"/>
+              </p:ext>
+            </p:extLst>
+          </p:nvPr>
         </p:nvGraphicFramePr>
         <p:xfrm>
           <a:off x="2032000" y="719666"/>
@@ -14141,7 +14122,7 @@
                         <a:defRPr/>
                       </a:pPr>
                       <a:r>
-                        <a:rPr kumimoji="0" lang="en-US" sz="1800" b="0" i="0" u="none" strike="noStrike" kern="1200" cap="none" spc="0" normalizeH="0" baseline="0" noProof="0">
+                        <a:rPr kumimoji="0" lang="en-US" sz="1800" b="0" i="0" u="none" strike="noStrike" kern="1200" cap="none" spc="0" normalizeH="0" baseline="0" noProof="0" dirty="0">
                           <a:ln>
                             <a:noFill/>
                           </a:ln>
@@ -14158,367 +14139,11 @@
                           <a:ea typeface="+mn-ea"/>
                           <a:cs typeface="+mn-cs"/>
                         </a:rPr>
-                        <a:t>?</a:t>
+                        <a:t>.0025</a:t>
                       </a:r>
-                      <a:endParaRPr kumimoji="0" lang="en-US" sz="1800" b="0" i="0" u="none" strike="noStrike" kern="1200" cap="none" spc="0" normalizeH="0" baseline="0" noProof="0" dirty="0">
-                        <a:ln>
-                          <a:noFill/>
-                        </a:ln>
-                        <a:solidFill>
-                          <a:srgbClr val="000000">
-                            <a:lumMod val="75000"/>
-                            <a:lumOff val="25000"/>
-                          </a:srgbClr>
-                        </a:solidFill>
-                        <a:effectLst/>
-                        <a:uLnTx/>
-                        <a:uFillTx/>
-                        <a:latin typeface="Optima" panose="02000503060000020004" pitchFamily="2" charset="0"/>
-                        <a:ea typeface="+mn-ea"/>
-                        <a:cs typeface="+mn-cs"/>
-                      </a:endParaRPr>
                     </a:p>
                   </a:txBody>
-                  <a:tcPr anchor="ctr">
-                    <a:lnL w="12700" cap="flat" cmpd="sng" algn="ctr">
-                      <a:solidFill>
-                        <a:schemeClr val="tx1">
-                          <a:lumMod val="75000"/>
-                          <a:lumOff val="25000"/>
-                        </a:schemeClr>
-                      </a:solidFill>
-                      <a:prstDash val="solid"/>
-                      <a:round/>
-                      <a:headEnd type="none" w="med" len="med"/>
-                      <a:tailEnd type="none" w="med" len="med"/>
-                    </a:lnL>
-                    <a:lnR w="12700" cap="flat" cmpd="sng" algn="ctr">
-                      <a:solidFill>
-                        <a:schemeClr val="tx1">
-                          <a:lumMod val="75000"/>
-                          <a:lumOff val="25000"/>
-                        </a:schemeClr>
-                      </a:solidFill>
-                      <a:prstDash val="solid"/>
-                      <a:round/>
-                      <a:headEnd type="none" w="med" len="med"/>
-                      <a:tailEnd type="none" w="med" len="med"/>
-                    </a:lnR>
-                    <a:lnT w="12700" cap="flat" cmpd="sng" algn="ctr">
-                      <a:solidFill>
-                        <a:schemeClr val="tx1">
-                          <a:lumMod val="75000"/>
-                          <a:lumOff val="25000"/>
-                        </a:schemeClr>
-                      </a:solidFill>
-                      <a:prstDash val="solid"/>
-                      <a:round/>
-                      <a:headEnd type="none" w="med" len="med"/>
-                      <a:tailEnd type="none" w="med" len="med"/>
-                    </a:lnT>
-                    <a:lnB w="12700" cap="flat" cmpd="sng" algn="ctr">
-                      <a:solidFill>
-                        <a:schemeClr val="tx1">
-                          <a:lumMod val="75000"/>
-                          <a:lumOff val="25000"/>
-                        </a:schemeClr>
-                      </a:solidFill>
-                      <a:prstDash val="solid"/>
-                      <a:round/>
-                      <a:headEnd type="none" w="med" len="med"/>
-                      <a:tailEnd type="none" w="med" len="med"/>
-                    </a:lnB>
-                    <a:noFill/>
-                  </a:tcPr>
-                </a:tc>
-                <a:tc>
-                  <a:txBody>
-                    <a:bodyPr/>
-                    <a:lstStyle/>
-                    <a:p>
-                      <a:pPr marL="0" marR="0" lvl="0" indent="0" algn="ctr" defTabSz="914400" rtl="0" eaLnBrk="1" fontAlgn="auto" latinLnBrk="0" hangingPunct="1">
-                        <a:lnSpc>
-                          <a:spcPct val="100000"/>
-                        </a:lnSpc>
-                        <a:spcBef>
-                          <a:spcPts val="0"/>
-                        </a:spcBef>
-                        <a:spcAft>
-                          <a:spcPts val="0"/>
-                        </a:spcAft>
-                        <a:buClrTx/>
-                        <a:buSzTx/>
-                        <a:buFontTx/>
-                        <a:buNone/>
-                        <a:tabLst/>
-                        <a:defRPr/>
-                      </a:pPr>
-                      <a:r>
-                        <a:rPr kumimoji="0" lang="en-US" sz="1800" b="0" i="0" u="none" strike="noStrike" kern="1200" cap="none" spc="0" normalizeH="0" baseline="0" noProof="0">
-                          <a:ln>
-                            <a:noFill/>
-                          </a:ln>
-                          <a:solidFill>
-                            <a:srgbClr val="000000">
-                              <a:lumMod val="75000"/>
-                              <a:lumOff val="25000"/>
-                            </a:srgbClr>
-                          </a:solidFill>
-                          <a:effectLst/>
-                          <a:uLnTx/>
-                          <a:uFillTx/>
-                          <a:latin typeface="Optima" panose="02000503060000020004" pitchFamily="2" charset="0"/>
-                          <a:ea typeface="+mn-ea"/>
-                          <a:cs typeface="+mn-cs"/>
-                        </a:rPr>
-                        <a:t>?</a:t>
-                      </a:r>
-                      <a:endParaRPr kumimoji="0" lang="en-US" sz="1800" b="0" i="0" u="none" strike="noStrike" kern="1200" cap="none" spc="0" normalizeH="0" baseline="0" noProof="0" dirty="0">
-                        <a:ln>
-                          <a:noFill/>
-                        </a:ln>
-                        <a:solidFill>
-                          <a:srgbClr val="000000">
-                            <a:lumMod val="75000"/>
-                            <a:lumOff val="25000"/>
-                          </a:srgbClr>
-                        </a:solidFill>
-                        <a:effectLst/>
-                        <a:uLnTx/>
-                        <a:uFillTx/>
-                        <a:latin typeface="Optima" panose="02000503060000020004" pitchFamily="2" charset="0"/>
-                        <a:ea typeface="+mn-ea"/>
-                        <a:cs typeface="+mn-cs"/>
-                      </a:endParaRPr>
-                    </a:p>
-                  </a:txBody>
-                  <a:tcPr anchor="ctr">
-                    <a:lnL w="12700" cap="flat" cmpd="sng" algn="ctr">
-                      <a:solidFill>
-                        <a:schemeClr val="tx1">
-                          <a:lumMod val="75000"/>
-                          <a:lumOff val="25000"/>
-                        </a:schemeClr>
-                      </a:solidFill>
-                      <a:prstDash val="solid"/>
-                      <a:round/>
-                      <a:headEnd type="none" w="med" len="med"/>
-                      <a:tailEnd type="none" w="med" len="med"/>
-                    </a:lnL>
-                    <a:lnR w="12700" cap="flat" cmpd="sng" algn="ctr">
-                      <a:solidFill>
-                        <a:schemeClr val="tx1">
-                          <a:lumMod val="75000"/>
-                          <a:lumOff val="25000"/>
-                        </a:schemeClr>
-                      </a:solidFill>
-                      <a:prstDash val="solid"/>
-                      <a:round/>
-                      <a:headEnd type="none" w="med" len="med"/>
-                      <a:tailEnd type="none" w="med" len="med"/>
-                    </a:lnR>
-                    <a:lnT w="12700" cap="flat" cmpd="sng" algn="ctr">
-                      <a:solidFill>
-                        <a:schemeClr val="tx1">
-                          <a:lumMod val="75000"/>
-                          <a:lumOff val="25000"/>
-                        </a:schemeClr>
-                      </a:solidFill>
-                      <a:prstDash val="solid"/>
-                      <a:round/>
-                      <a:headEnd type="none" w="med" len="med"/>
-                      <a:tailEnd type="none" w="med" len="med"/>
-                    </a:lnT>
-                    <a:lnB w="12700" cap="flat" cmpd="sng" algn="ctr">
-                      <a:solidFill>
-                        <a:schemeClr val="tx1">
-                          <a:lumMod val="75000"/>
-                          <a:lumOff val="25000"/>
-                        </a:schemeClr>
-                      </a:solidFill>
-                      <a:prstDash val="solid"/>
-                      <a:round/>
-                      <a:headEnd type="none" w="med" len="med"/>
-                      <a:tailEnd type="none" w="med" len="med"/>
-                    </a:lnB>
-                    <a:noFill/>
-                  </a:tcPr>
-                </a:tc>
-                <a:tc>
-                  <a:txBody>
-                    <a:bodyPr/>
-                    <a:lstStyle/>
-                    <a:p>
-                      <a:pPr marL="0" marR="0" lvl="0" indent="0" algn="ctr" defTabSz="914400" rtl="0" eaLnBrk="1" fontAlgn="auto" latinLnBrk="0" hangingPunct="1">
-                        <a:lnSpc>
-                          <a:spcPct val="100000"/>
-                        </a:lnSpc>
-                        <a:spcBef>
-                          <a:spcPts val="0"/>
-                        </a:spcBef>
-                        <a:spcAft>
-                          <a:spcPts val="0"/>
-                        </a:spcAft>
-                        <a:buClrTx/>
-                        <a:buSzTx/>
-                        <a:buFontTx/>
-                        <a:buNone/>
-                        <a:tabLst/>
-                        <a:defRPr/>
-                      </a:pPr>
-                      <a:r>
-                        <a:rPr kumimoji="0" lang="en-US" sz="1800" b="0" i="0" u="none" strike="noStrike" kern="1200" cap="none" spc="0" normalizeH="0" baseline="0" noProof="0">
-                          <a:ln>
-                            <a:noFill/>
-                          </a:ln>
-                          <a:solidFill>
-                            <a:srgbClr val="000000">
-                              <a:lumMod val="75000"/>
-                              <a:lumOff val="25000"/>
-                            </a:srgbClr>
-                          </a:solidFill>
-                          <a:effectLst/>
-                          <a:uLnTx/>
-                          <a:uFillTx/>
-                          <a:latin typeface="Optima" panose="02000503060000020004" pitchFamily="2" charset="0"/>
-                          <a:ea typeface="+mn-ea"/>
-                          <a:cs typeface="+mn-cs"/>
-                        </a:rPr>
-                        <a:t>?</a:t>
-                      </a:r>
-                      <a:endParaRPr kumimoji="0" lang="en-US" sz="1800" b="0" i="0" u="none" strike="noStrike" kern="1200" cap="none" spc="0" normalizeH="0" baseline="0" noProof="0" dirty="0">
-                        <a:ln>
-                          <a:noFill/>
-                        </a:ln>
-                        <a:solidFill>
-                          <a:srgbClr val="000000">
-                            <a:lumMod val="75000"/>
-                            <a:lumOff val="25000"/>
-                          </a:srgbClr>
-                        </a:solidFill>
-                        <a:effectLst/>
-                        <a:uLnTx/>
-                        <a:uFillTx/>
-                        <a:latin typeface="Optima" panose="02000503060000020004" pitchFamily="2" charset="0"/>
-                        <a:ea typeface="+mn-ea"/>
-                        <a:cs typeface="+mn-cs"/>
-                      </a:endParaRPr>
-                    </a:p>
-                  </a:txBody>
-                  <a:tcPr anchor="ctr">
-                    <a:lnL w="12700" cap="flat" cmpd="sng" algn="ctr">
-                      <a:solidFill>
-                        <a:schemeClr val="tx1">
-                          <a:lumMod val="75000"/>
-                          <a:lumOff val="25000"/>
-                        </a:schemeClr>
-                      </a:solidFill>
-                      <a:prstDash val="solid"/>
-                      <a:round/>
-                      <a:headEnd type="none" w="med" len="med"/>
-                      <a:tailEnd type="none" w="med" len="med"/>
-                    </a:lnL>
-                    <a:lnR w="12700" cap="flat" cmpd="sng" algn="ctr">
-                      <a:solidFill>
-                        <a:schemeClr val="tx1">
-                          <a:lumMod val="75000"/>
-                          <a:lumOff val="25000"/>
-                        </a:schemeClr>
-                      </a:solidFill>
-                      <a:prstDash val="solid"/>
-                      <a:round/>
-                      <a:headEnd type="none" w="med" len="med"/>
-                      <a:tailEnd type="none" w="med" len="med"/>
-                    </a:lnR>
-                    <a:lnT w="12700" cap="flat" cmpd="sng" algn="ctr">
-                      <a:solidFill>
-                        <a:schemeClr val="tx1">
-                          <a:lumMod val="75000"/>
-                          <a:lumOff val="25000"/>
-                        </a:schemeClr>
-                      </a:solidFill>
-                      <a:prstDash val="solid"/>
-                      <a:round/>
-                      <a:headEnd type="none" w="med" len="med"/>
-                      <a:tailEnd type="none" w="med" len="med"/>
-                    </a:lnT>
-                    <a:lnB w="12700" cap="flat" cmpd="sng" algn="ctr">
-                      <a:solidFill>
-                        <a:schemeClr val="tx1">
-                          <a:lumMod val="75000"/>
-                          <a:lumOff val="25000"/>
-                        </a:schemeClr>
-                      </a:solidFill>
-                      <a:prstDash val="solid"/>
-                      <a:round/>
-                      <a:headEnd type="none" w="med" len="med"/>
-                      <a:tailEnd type="none" w="med" len="med"/>
-                    </a:lnB>
-                    <a:noFill/>
-                  </a:tcPr>
-                </a:tc>
-                <a:tc>
-                  <a:txBody>
-                    <a:bodyPr/>
-                    <a:lstStyle/>
-                    <a:p>
-                      <a:pPr marL="0" marR="0" lvl="0" indent="0" algn="ctr" defTabSz="914400" rtl="0" eaLnBrk="1" fontAlgn="auto" latinLnBrk="0" hangingPunct="1">
-                        <a:lnSpc>
-                          <a:spcPct val="100000"/>
-                        </a:lnSpc>
-                        <a:spcBef>
-                          <a:spcPts val="0"/>
-                        </a:spcBef>
-                        <a:spcAft>
-                          <a:spcPts val="0"/>
-                        </a:spcAft>
-                        <a:buClrTx/>
-                        <a:buSzTx/>
-                        <a:buFontTx/>
-                        <a:buNone/>
-                        <a:tabLst/>
-                        <a:defRPr/>
-                      </a:pPr>
-                      <a:r>
-                        <a:rPr kumimoji="0" lang="en-US" sz="1800" b="0" i="0" u="none" strike="noStrike" kern="1200" cap="none" spc="0" normalizeH="0" baseline="0" noProof="0">
-                          <a:ln>
-                            <a:noFill/>
-                          </a:ln>
-                          <a:solidFill>
-                            <a:srgbClr val="000000">
-                              <a:lumMod val="75000"/>
-                              <a:lumOff val="25000"/>
-                            </a:srgbClr>
-                          </a:solidFill>
-                          <a:effectLst/>
-                          <a:uLnTx/>
-                          <a:uFillTx/>
-                          <a:latin typeface="Optima" panose="02000503060000020004" pitchFamily="2" charset="0"/>
-                          <a:ea typeface="+mn-ea"/>
-                          <a:cs typeface="+mn-cs"/>
-                        </a:rPr>
-                        <a:t>?</a:t>
-                      </a:r>
-                      <a:endParaRPr kumimoji="0" lang="en-US" sz="1800" b="0" i="0" u="none" strike="noStrike" kern="1200" cap="none" spc="0" normalizeH="0" baseline="0" noProof="0" dirty="0">
-                        <a:ln>
-                          <a:noFill/>
-                        </a:ln>
-                        <a:solidFill>
-                          <a:srgbClr val="000000">
-                            <a:lumMod val="75000"/>
-                            <a:lumOff val="25000"/>
-                          </a:srgbClr>
-                        </a:solidFill>
-                        <a:effectLst/>
-                        <a:uLnTx/>
-                        <a:uFillTx/>
-                        <a:latin typeface="Optima" panose="02000503060000020004" pitchFamily="2" charset="0"/>
-                        <a:ea typeface="+mn-ea"/>
-                        <a:cs typeface="+mn-cs"/>
-                      </a:endParaRPr>
-                    </a:p>
-                  </a:txBody>
-                  <a:tcPr anchor="ctr">
+                  <a:tcPr marL="0" marR="0" marT="0" marB="0" anchor="ctr">
                     <a:lnL w="12700" cap="flat" cmpd="sng" algn="ctr">
                       <a:solidFill>
                         <a:schemeClr val="tx1">
@@ -14610,11 +14235,299 @@
                           <a:ea typeface="+mn-ea"/>
                           <a:cs typeface="+mn-cs"/>
                         </a:rPr>
-                        <a:t>?</a:t>
+                        <a:t>.02</a:t>
                       </a:r>
                     </a:p>
                   </a:txBody>
-                  <a:tcPr anchor="ctr">
+                  <a:tcPr marL="0" marR="0" marT="0" marB="0" anchor="ctr">
+                    <a:lnL w="12700" cap="flat" cmpd="sng" algn="ctr">
+                      <a:solidFill>
+                        <a:schemeClr val="tx1">
+                          <a:lumMod val="75000"/>
+                          <a:lumOff val="25000"/>
+                        </a:schemeClr>
+                      </a:solidFill>
+                      <a:prstDash val="solid"/>
+                      <a:round/>
+                      <a:headEnd type="none" w="med" len="med"/>
+                      <a:tailEnd type="none" w="med" len="med"/>
+                    </a:lnL>
+                    <a:lnR w="12700" cap="flat" cmpd="sng" algn="ctr">
+                      <a:solidFill>
+                        <a:schemeClr val="tx1">
+                          <a:lumMod val="75000"/>
+                          <a:lumOff val="25000"/>
+                        </a:schemeClr>
+                      </a:solidFill>
+                      <a:prstDash val="solid"/>
+                      <a:round/>
+                      <a:headEnd type="none" w="med" len="med"/>
+                      <a:tailEnd type="none" w="med" len="med"/>
+                    </a:lnR>
+                    <a:lnT w="12700" cap="flat" cmpd="sng" algn="ctr">
+                      <a:solidFill>
+                        <a:schemeClr val="tx1">
+                          <a:lumMod val="75000"/>
+                          <a:lumOff val="25000"/>
+                        </a:schemeClr>
+                      </a:solidFill>
+                      <a:prstDash val="solid"/>
+                      <a:round/>
+                      <a:headEnd type="none" w="med" len="med"/>
+                      <a:tailEnd type="none" w="med" len="med"/>
+                    </a:lnT>
+                    <a:lnB w="12700" cap="flat" cmpd="sng" algn="ctr">
+                      <a:solidFill>
+                        <a:schemeClr val="tx1">
+                          <a:lumMod val="75000"/>
+                          <a:lumOff val="25000"/>
+                        </a:schemeClr>
+                      </a:solidFill>
+                      <a:prstDash val="solid"/>
+                      <a:round/>
+                      <a:headEnd type="none" w="med" len="med"/>
+                      <a:tailEnd type="none" w="med" len="med"/>
+                    </a:lnB>
+                    <a:noFill/>
+                  </a:tcPr>
+                </a:tc>
+                <a:tc>
+                  <a:txBody>
+                    <a:bodyPr/>
+                    <a:lstStyle/>
+                    <a:p>
+                      <a:pPr marL="0" marR="0" lvl="0" indent="0" algn="ctr" defTabSz="914400" rtl="0" eaLnBrk="1" fontAlgn="auto" latinLnBrk="0" hangingPunct="1">
+                        <a:lnSpc>
+                          <a:spcPct val="100000"/>
+                        </a:lnSpc>
+                        <a:spcBef>
+                          <a:spcPts val="0"/>
+                        </a:spcBef>
+                        <a:spcAft>
+                          <a:spcPts val="0"/>
+                        </a:spcAft>
+                        <a:buClrTx/>
+                        <a:buSzTx/>
+                        <a:buFontTx/>
+                        <a:buNone/>
+                        <a:tabLst/>
+                        <a:defRPr/>
+                      </a:pPr>
+                      <a:r>
+                        <a:rPr kumimoji="0" lang="en-US" sz="1800" b="0" i="0" u="none" strike="noStrike" kern="1200" cap="none" spc="0" normalizeH="0" baseline="0" noProof="0" dirty="0">
+                          <a:ln>
+                            <a:noFill/>
+                          </a:ln>
+                          <a:solidFill>
+                            <a:srgbClr val="000000">
+                              <a:lumMod val="75000"/>
+                              <a:lumOff val="25000"/>
+                            </a:srgbClr>
+                          </a:solidFill>
+                          <a:effectLst/>
+                          <a:uLnTx/>
+                          <a:uFillTx/>
+                          <a:latin typeface="Optima" panose="02000503060000020004" pitchFamily="2" charset="0"/>
+                          <a:ea typeface="+mn-ea"/>
+                          <a:cs typeface="+mn-cs"/>
+                        </a:rPr>
+                        <a:t>.045</a:t>
+                      </a:r>
+                    </a:p>
+                  </a:txBody>
+                  <a:tcPr marL="0" marR="0" marT="0" marB="0" anchor="ctr">
+                    <a:lnL w="12700" cap="flat" cmpd="sng" algn="ctr">
+                      <a:solidFill>
+                        <a:schemeClr val="tx1">
+                          <a:lumMod val="75000"/>
+                          <a:lumOff val="25000"/>
+                        </a:schemeClr>
+                      </a:solidFill>
+                      <a:prstDash val="solid"/>
+                      <a:round/>
+                      <a:headEnd type="none" w="med" len="med"/>
+                      <a:tailEnd type="none" w="med" len="med"/>
+                    </a:lnL>
+                    <a:lnR w="12700" cap="flat" cmpd="sng" algn="ctr">
+                      <a:solidFill>
+                        <a:schemeClr val="tx1">
+                          <a:lumMod val="75000"/>
+                          <a:lumOff val="25000"/>
+                        </a:schemeClr>
+                      </a:solidFill>
+                      <a:prstDash val="solid"/>
+                      <a:round/>
+                      <a:headEnd type="none" w="med" len="med"/>
+                      <a:tailEnd type="none" w="med" len="med"/>
+                    </a:lnR>
+                    <a:lnT w="12700" cap="flat" cmpd="sng" algn="ctr">
+                      <a:solidFill>
+                        <a:schemeClr val="tx1">
+                          <a:lumMod val="75000"/>
+                          <a:lumOff val="25000"/>
+                        </a:schemeClr>
+                      </a:solidFill>
+                      <a:prstDash val="solid"/>
+                      <a:round/>
+                      <a:headEnd type="none" w="med" len="med"/>
+                      <a:tailEnd type="none" w="med" len="med"/>
+                    </a:lnT>
+                    <a:lnB w="12700" cap="flat" cmpd="sng" algn="ctr">
+                      <a:solidFill>
+                        <a:schemeClr val="tx1">
+                          <a:lumMod val="75000"/>
+                          <a:lumOff val="25000"/>
+                        </a:schemeClr>
+                      </a:solidFill>
+                      <a:prstDash val="solid"/>
+                      <a:round/>
+                      <a:headEnd type="none" w="med" len="med"/>
+                      <a:tailEnd type="none" w="med" len="med"/>
+                    </a:lnB>
+                    <a:noFill/>
+                  </a:tcPr>
+                </a:tc>
+                <a:tc>
+                  <a:txBody>
+                    <a:bodyPr/>
+                    <a:lstStyle/>
+                    <a:p>
+                      <a:pPr marL="0" marR="0" lvl="0" indent="0" algn="ctr" defTabSz="914400" rtl="0" eaLnBrk="1" fontAlgn="auto" latinLnBrk="0" hangingPunct="1">
+                        <a:lnSpc>
+                          <a:spcPct val="100000"/>
+                        </a:lnSpc>
+                        <a:spcBef>
+                          <a:spcPts val="0"/>
+                        </a:spcBef>
+                        <a:spcAft>
+                          <a:spcPts val="0"/>
+                        </a:spcAft>
+                        <a:buClrTx/>
+                        <a:buSzTx/>
+                        <a:buFontTx/>
+                        <a:buNone/>
+                        <a:tabLst/>
+                        <a:defRPr/>
+                      </a:pPr>
+                      <a:r>
+                        <a:rPr kumimoji="0" lang="en-US" sz="1800" b="0" i="0" u="none" strike="noStrike" kern="1200" cap="none" spc="0" normalizeH="0" baseline="0" noProof="0" dirty="0">
+                          <a:ln>
+                            <a:noFill/>
+                          </a:ln>
+                          <a:solidFill>
+                            <a:srgbClr val="000000">
+                              <a:lumMod val="75000"/>
+                              <a:lumOff val="25000"/>
+                            </a:srgbClr>
+                          </a:solidFill>
+                          <a:effectLst/>
+                          <a:uLnTx/>
+                          <a:uFillTx/>
+                          <a:latin typeface="Optima" panose="02000503060000020004" pitchFamily="2" charset="0"/>
+                          <a:ea typeface="+mn-ea"/>
+                          <a:cs typeface="+mn-cs"/>
+                        </a:rPr>
+                        <a:t>.02</a:t>
+                      </a:r>
+                    </a:p>
+                  </a:txBody>
+                  <a:tcPr marL="0" marR="0" marT="0" marB="0" anchor="ctr">
+                    <a:lnL w="12700" cap="flat" cmpd="sng" algn="ctr">
+                      <a:solidFill>
+                        <a:schemeClr val="tx1">
+                          <a:lumMod val="75000"/>
+                          <a:lumOff val="25000"/>
+                        </a:schemeClr>
+                      </a:solidFill>
+                      <a:prstDash val="solid"/>
+                      <a:round/>
+                      <a:headEnd type="none" w="med" len="med"/>
+                      <a:tailEnd type="none" w="med" len="med"/>
+                    </a:lnL>
+                    <a:lnR w="12700" cap="flat" cmpd="sng" algn="ctr">
+                      <a:solidFill>
+                        <a:schemeClr val="tx1">
+                          <a:lumMod val="75000"/>
+                          <a:lumOff val="25000"/>
+                        </a:schemeClr>
+                      </a:solidFill>
+                      <a:prstDash val="solid"/>
+                      <a:round/>
+                      <a:headEnd type="none" w="med" len="med"/>
+                      <a:tailEnd type="none" w="med" len="med"/>
+                    </a:lnR>
+                    <a:lnT w="12700" cap="flat" cmpd="sng" algn="ctr">
+                      <a:solidFill>
+                        <a:schemeClr val="tx1">
+                          <a:lumMod val="75000"/>
+                          <a:lumOff val="25000"/>
+                        </a:schemeClr>
+                      </a:solidFill>
+                      <a:prstDash val="solid"/>
+                      <a:round/>
+                      <a:headEnd type="none" w="med" len="med"/>
+                      <a:tailEnd type="none" w="med" len="med"/>
+                    </a:lnT>
+                    <a:lnB w="12700" cap="flat" cmpd="sng" algn="ctr">
+                      <a:solidFill>
+                        <a:schemeClr val="tx1">
+                          <a:lumMod val="75000"/>
+                          <a:lumOff val="25000"/>
+                        </a:schemeClr>
+                      </a:solidFill>
+                      <a:prstDash val="solid"/>
+                      <a:round/>
+                      <a:headEnd type="none" w="med" len="med"/>
+                      <a:tailEnd type="none" w="med" len="med"/>
+                    </a:lnB>
+                    <a:noFill/>
+                  </a:tcPr>
+                </a:tc>
+                <a:tc>
+                  <a:txBody>
+                    <a:bodyPr/>
+                    <a:lstStyle/>
+                    <a:p>
+                      <a:pPr marL="0" marR="0" lvl="0" indent="0" algn="ctr" defTabSz="914400" rtl="0" eaLnBrk="1" fontAlgn="auto" latinLnBrk="0" hangingPunct="1">
+                        <a:lnSpc>
+                          <a:spcPct val="100000"/>
+                        </a:lnSpc>
+                        <a:spcBef>
+                          <a:spcPts val="0"/>
+                        </a:spcBef>
+                        <a:spcAft>
+                          <a:spcPts val="0"/>
+                        </a:spcAft>
+                        <a:buClrTx/>
+                        <a:buSzTx/>
+                        <a:buFontTx/>
+                        <a:buNone/>
+                        <a:tabLst/>
+                        <a:defRPr/>
+                      </a:pPr>
+                      <a:r>
+                        <a:rPr kumimoji="0" lang="en-US" sz="1800" b="0" i="0" u="none" strike="noStrike" kern="1200" cap="none" spc="0" normalizeH="0" baseline="0" noProof="0" dirty="0">
+                          <a:ln>
+                            <a:noFill/>
+                          </a:ln>
+                          <a:solidFill>
+                            <a:srgbClr val="000000">
+                              <a:lumMod val="75000"/>
+                              <a:lumOff val="25000"/>
+                            </a:srgbClr>
+                          </a:solidFill>
+                          <a:effectLst/>
+                          <a:uLnTx/>
+                          <a:uFillTx/>
+                          <a:latin typeface="Optima" panose="02000503060000020004" pitchFamily="2" charset="0"/>
+                          <a:ea typeface="+mn-ea"/>
+                          <a:cs typeface="+mn-cs"/>
+                        </a:rPr>
+                        <a:t>.0025</a:t>
+                      </a:r>
+                    </a:p>
+                  </a:txBody>
+                  <a:tcPr marL="0" marR="0" marT="0" marB="0" anchor="ctr">
                     <a:lnL w="12700" cap="flat" cmpd="sng" algn="ctr">
                       <a:solidFill>
                         <a:schemeClr val="tx1">
@@ -14696,7 +14609,7 @@
                         <a:defRPr/>
                       </a:pPr>
                       <a:r>
-                        <a:rPr kumimoji="0" lang="en-US" sz="1800" b="0" i="0" u="none" strike="noStrike" kern="1200" cap="none" spc="0" normalizeH="0" baseline="0" noProof="0">
+                        <a:rPr kumimoji="0" lang="en-US" sz="1800" b="0" i="0" u="none" strike="noStrike" kern="1200" cap="none" spc="0" normalizeH="0" baseline="0" noProof="0" dirty="0">
                           <a:ln>
                             <a:noFill/>
                           </a:ln>
@@ -14713,28 +14626,11 @@
                           <a:ea typeface="+mn-ea"/>
                           <a:cs typeface="+mn-cs"/>
                         </a:rPr>
-                        <a:t>?</a:t>
+                        <a:t>.02</a:t>
                       </a:r>
-                      <a:endParaRPr kumimoji="0" lang="en-US" sz="1800" b="0" i="0" u="none" strike="noStrike" kern="1200" cap="none" spc="0" normalizeH="0" baseline="0" noProof="0" dirty="0">
-                        <a:ln>
-                          <a:noFill/>
-                        </a:ln>
-                        <a:solidFill>
-                          <a:srgbClr val="000000">
-                            <a:lumMod val="75000"/>
-                            <a:lumOff val="25000"/>
-                          </a:srgbClr>
-                        </a:solidFill>
-                        <a:effectLst/>
-                        <a:uLnTx/>
-                        <a:uFillTx/>
-                        <a:latin typeface="Optima" panose="02000503060000020004" pitchFamily="2" charset="0"/>
-                        <a:ea typeface="+mn-ea"/>
-                        <a:cs typeface="+mn-cs"/>
-                      </a:endParaRPr>
                     </a:p>
                   </a:txBody>
-                  <a:tcPr anchor="ctr">
+                  <a:tcPr marL="0" marR="0" marT="0" marB="0" anchor="ctr">
                     <a:lnL w="12700" cap="flat" cmpd="sng" algn="ctr">
                       <a:solidFill>
                         <a:schemeClr val="tx1">
@@ -14922,7 +14818,7 @@
                           <a:ea typeface="+mn-ea"/>
                           <a:cs typeface="+mn-cs"/>
                         </a:rPr>
-                        <a:t>.02</a:t>
+                        <a:t>.04</a:t>
                       </a:r>
                     </a:p>
                   </a:txBody>
@@ -15097,7 +14993,7 @@
                         <a:defRPr/>
                       </a:pPr>
                       <a:r>
-                        <a:rPr kumimoji="0" lang="en-US" sz="1800" b="0" i="0" u="none" strike="noStrike" kern="1200" cap="none" spc="0" normalizeH="0" baseline="0" noProof="0">
+                        <a:rPr kumimoji="0" lang="en-US" sz="1800" b="0" i="0" u="none" strike="noStrike" kern="1200" cap="none" spc="0" normalizeH="0" baseline="0" noProof="0" dirty="0">
                           <a:ln>
                             <a:noFill/>
                           </a:ln>
@@ -15114,28 +15010,11 @@
                           <a:ea typeface="+mn-ea"/>
                           <a:cs typeface="+mn-cs"/>
                         </a:rPr>
-                        <a:t>?</a:t>
+                        <a:t>.02</a:t>
                       </a:r>
-                      <a:endParaRPr kumimoji="0" lang="en-US" sz="1800" b="0" i="0" u="none" strike="noStrike" kern="1200" cap="none" spc="0" normalizeH="0" baseline="0" noProof="0" dirty="0">
-                        <a:ln>
-                          <a:noFill/>
-                        </a:ln>
-                        <a:solidFill>
-                          <a:srgbClr val="000000">
-                            <a:lumMod val="75000"/>
-                            <a:lumOff val="25000"/>
-                          </a:srgbClr>
-                        </a:solidFill>
-                        <a:effectLst/>
-                        <a:uLnTx/>
-                        <a:uFillTx/>
-                        <a:latin typeface="Optima" panose="02000503060000020004" pitchFamily="2" charset="0"/>
-                        <a:ea typeface="+mn-ea"/>
-                        <a:cs typeface="+mn-cs"/>
-                      </a:endParaRPr>
                     </a:p>
                   </a:txBody>
-                  <a:tcPr anchor="ctr">
+                  <a:tcPr marL="0" marR="0" marT="0" marB="0" anchor="ctr">
                     <a:lnL w="12700" cap="flat" cmpd="sng" algn="ctr">
                       <a:solidFill>
                         <a:schemeClr val="tx1">
@@ -15194,119 +15073,6 @@
                 </a:extLst>
               </a:tr>
               <a:tr h="731520">
-                <a:tc>
-                  <a:txBody>
-                    <a:bodyPr/>
-                    <a:lstStyle/>
-                    <a:p>
-                      <a:pPr marL="0" marR="0" lvl="0" indent="0" algn="ctr" defTabSz="914400" rtl="0" eaLnBrk="1" fontAlgn="auto" latinLnBrk="0" hangingPunct="1">
-                        <a:lnSpc>
-                          <a:spcPct val="100000"/>
-                        </a:lnSpc>
-                        <a:spcBef>
-                          <a:spcPts val="0"/>
-                        </a:spcBef>
-                        <a:spcAft>
-                          <a:spcPts val="0"/>
-                        </a:spcAft>
-                        <a:buClrTx/>
-                        <a:buSzTx/>
-                        <a:buFontTx/>
-                        <a:buNone/>
-                        <a:tabLst/>
-                        <a:defRPr/>
-                      </a:pPr>
-                      <a:r>
-                        <a:rPr kumimoji="0" lang="en-US" sz="1800" b="0" i="0" u="none" strike="noStrike" kern="1200" cap="none" spc="0" normalizeH="0" baseline="0" noProof="0">
-                          <a:ln>
-                            <a:noFill/>
-                          </a:ln>
-                          <a:solidFill>
-                            <a:srgbClr val="000000">
-                              <a:lumMod val="75000"/>
-                              <a:lumOff val="25000"/>
-                            </a:srgbClr>
-                          </a:solidFill>
-                          <a:effectLst/>
-                          <a:uLnTx/>
-                          <a:uFillTx/>
-                          <a:latin typeface="Optima" panose="02000503060000020004" pitchFamily="2" charset="0"/>
-                          <a:ea typeface="+mn-ea"/>
-                          <a:cs typeface="+mn-cs"/>
-                        </a:rPr>
-                        <a:t>?</a:t>
-                      </a:r>
-                      <a:endParaRPr kumimoji="0" lang="en-US" sz="1800" b="0" i="0" u="none" strike="noStrike" kern="1200" cap="none" spc="0" normalizeH="0" baseline="0" noProof="0" dirty="0">
-                        <a:ln>
-                          <a:noFill/>
-                        </a:ln>
-                        <a:solidFill>
-                          <a:srgbClr val="000000">
-                            <a:lumMod val="75000"/>
-                            <a:lumOff val="25000"/>
-                          </a:srgbClr>
-                        </a:solidFill>
-                        <a:effectLst/>
-                        <a:uLnTx/>
-                        <a:uFillTx/>
-                        <a:latin typeface="Optima" panose="02000503060000020004" pitchFamily="2" charset="0"/>
-                        <a:ea typeface="+mn-ea"/>
-                        <a:cs typeface="+mn-cs"/>
-                      </a:endParaRPr>
-                    </a:p>
-                  </a:txBody>
-                  <a:tcPr anchor="ctr">
-                    <a:lnL w="12700" cap="flat" cmpd="sng" algn="ctr">
-                      <a:solidFill>
-                        <a:schemeClr val="tx1">
-                          <a:lumMod val="75000"/>
-                          <a:lumOff val="25000"/>
-                        </a:schemeClr>
-                      </a:solidFill>
-                      <a:prstDash val="solid"/>
-                      <a:round/>
-                      <a:headEnd type="none" w="med" len="med"/>
-                      <a:tailEnd type="none" w="med" len="med"/>
-                    </a:lnL>
-                    <a:lnR w="12700" cap="flat" cmpd="sng" algn="ctr">
-                      <a:solidFill>
-                        <a:schemeClr val="tx1">
-                          <a:lumMod val="75000"/>
-                          <a:lumOff val="25000"/>
-                        </a:schemeClr>
-                      </a:solidFill>
-                      <a:prstDash val="solid"/>
-                      <a:round/>
-                      <a:headEnd type="none" w="med" len="med"/>
-                      <a:tailEnd type="none" w="med" len="med"/>
-                    </a:lnR>
-                    <a:lnT w="12700" cap="flat" cmpd="sng" algn="ctr">
-                      <a:solidFill>
-                        <a:schemeClr val="tx1">
-                          <a:lumMod val="75000"/>
-                          <a:lumOff val="25000"/>
-                        </a:schemeClr>
-                      </a:solidFill>
-                      <a:prstDash val="solid"/>
-                      <a:round/>
-                      <a:headEnd type="none" w="med" len="med"/>
-                      <a:tailEnd type="none" w="med" len="med"/>
-                    </a:lnT>
-                    <a:lnB w="12700" cap="flat" cmpd="sng" algn="ctr">
-                      <a:solidFill>
-                        <a:schemeClr val="tx1">
-                          <a:lumMod val="75000"/>
-                          <a:lumOff val="25000"/>
-                        </a:schemeClr>
-                      </a:solidFill>
-                      <a:prstDash val="solid"/>
-                      <a:round/>
-                      <a:headEnd type="none" w="med" len="med"/>
-                      <a:tailEnd type="none" w="med" len="med"/>
-                    </a:lnB>
-                    <a:noFill/>
-                  </a:tcPr>
-                </a:tc>
                 <a:tc>
                   <a:txBody>
                     <a:bodyPr/>
@@ -15347,7 +15113,103 @@
                           <a:ea typeface="+mn-ea"/>
                           <a:cs typeface="+mn-cs"/>
                         </a:rPr>
-                        <a:t>.02</a:t>
+                        <a:t>.045</a:t>
+                      </a:r>
+                    </a:p>
+                  </a:txBody>
+                  <a:tcPr marL="0" marR="0" marT="0" marB="0" anchor="ctr">
+                    <a:lnL w="12700" cap="flat" cmpd="sng" algn="ctr">
+                      <a:solidFill>
+                        <a:schemeClr val="tx1">
+                          <a:lumMod val="75000"/>
+                          <a:lumOff val="25000"/>
+                        </a:schemeClr>
+                      </a:solidFill>
+                      <a:prstDash val="solid"/>
+                      <a:round/>
+                      <a:headEnd type="none" w="med" len="med"/>
+                      <a:tailEnd type="none" w="med" len="med"/>
+                    </a:lnL>
+                    <a:lnR w="12700" cap="flat" cmpd="sng" algn="ctr">
+                      <a:solidFill>
+                        <a:schemeClr val="tx1">
+                          <a:lumMod val="75000"/>
+                          <a:lumOff val="25000"/>
+                        </a:schemeClr>
+                      </a:solidFill>
+                      <a:prstDash val="solid"/>
+                      <a:round/>
+                      <a:headEnd type="none" w="med" len="med"/>
+                      <a:tailEnd type="none" w="med" len="med"/>
+                    </a:lnR>
+                    <a:lnT w="12700" cap="flat" cmpd="sng" algn="ctr">
+                      <a:solidFill>
+                        <a:schemeClr val="tx1">
+                          <a:lumMod val="75000"/>
+                          <a:lumOff val="25000"/>
+                        </a:schemeClr>
+                      </a:solidFill>
+                      <a:prstDash val="solid"/>
+                      <a:round/>
+                      <a:headEnd type="none" w="med" len="med"/>
+                      <a:tailEnd type="none" w="med" len="med"/>
+                    </a:lnT>
+                    <a:lnB w="12700" cap="flat" cmpd="sng" algn="ctr">
+                      <a:solidFill>
+                        <a:schemeClr val="tx1">
+                          <a:lumMod val="75000"/>
+                          <a:lumOff val="25000"/>
+                        </a:schemeClr>
+                      </a:solidFill>
+                      <a:prstDash val="solid"/>
+                      <a:round/>
+                      <a:headEnd type="none" w="med" len="med"/>
+                      <a:tailEnd type="none" w="med" len="med"/>
+                    </a:lnB>
+                    <a:noFill/>
+                  </a:tcPr>
+                </a:tc>
+                <a:tc>
+                  <a:txBody>
+                    <a:bodyPr/>
+                    <a:lstStyle/>
+                    <a:p>
+                      <a:pPr marL="0" marR="0" lvl="0" indent="0" algn="ctr" defTabSz="914400" rtl="0" eaLnBrk="1" fontAlgn="auto" latinLnBrk="0" hangingPunct="1">
+                        <a:lnSpc>
+                          <a:spcPct val="100000"/>
+                        </a:lnSpc>
+                        <a:spcBef>
+                          <a:spcPts val="0"/>
+                        </a:spcBef>
+                        <a:spcAft>
+                          <a:spcPts val="0"/>
+                        </a:spcAft>
+                        <a:buClrTx/>
+                        <a:buSzTx/>
+                        <a:buFontTx/>
+                        <a:buNone/>
+                        <a:tabLst/>
+                        <a:defRPr/>
+                      </a:pPr>
+                      <a:r>
+                        <a:rPr kumimoji="0" lang="en-US" sz="1800" b="0" i="0" u="none" strike="noStrike" kern="1200" cap="none" spc="0" normalizeH="0" baseline="0" noProof="0" dirty="0">
+                          <a:ln>
+                            <a:noFill/>
+                          </a:ln>
+                          <a:solidFill>
+                            <a:srgbClr val="000000">
+                              <a:lumMod val="75000"/>
+                              <a:lumOff val="25000"/>
+                            </a:srgbClr>
+                          </a:solidFill>
+                          <a:effectLst/>
+                          <a:uLnTx/>
+                          <a:uFillTx/>
+                          <a:latin typeface="Optima" panose="02000503060000020004" pitchFamily="2" charset="0"/>
+                          <a:ea typeface="+mn-ea"/>
+                          <a:cs typeface="+mn-cs"/>
+                        </a:rPr>
+                        <a:t>.04</a:t>
                       </a:r>
                     </a:p>
                   </a:txBody>
@@ -15539,7 +15401,7 @@
                           <a:ea typeface="+mn-ea"/>
                           <a:cs typeface="+mn-cs"/>
                         </a:rPr>
-                        <a:t>.02</a:t>
+                        <a:t>.04</a:t>
                       </a:r>
                     </a:p>
                   </a:txBody>
@@ -15618,7 +15480,7 @@
                         <a:defRPr/>
                       </a:pPr>
                       <a:r>
-                        <a:rPr kumimoji="0" lang="en-US" sz="1800" b="0" i="0" u="none" strike="noStrike" kern="1200" cap="none" spc="0" normalizeH="0" baseline="0" noProof="0">
+                        <a:rPr kumimoji="0" lang="en-US" sz="1800" b="0" i="0" u="none" strike="noStrike" kern="1200" cap="none" spc="0" normalizeH="0" baseline="0" noProof="0" dirty="0">
                           <a:ln>
                             <a:noFill/>
                           </a:ln>
@@ -15635,28 +15497,11 @@
                           <a:ea typeface="+mn-ea"/>
                           <a:cs typeface="+mn-cs"/>
                         </a:rPr>
-                        <a:t>?</a:t>
+                        <a:t>.045</a:t>
                       </a:r>
-                      <a:endParaRPr kumimoji="0" lang="en-US" sz="1800" b="0" i="0" u="none" strike="noStrike" kern="1200" cap="none" spc="0" normalizeH="0" baseline="0" noProof="0" dirty="0">
-                        <a:ln>
-                          <a:noFill/>
-                        </a:ln>
-                        <a:solidFill>
-                          <a:srgbClr val="000000">
-                            <a:lumMod val="75000"/>
-                            <a:lumOff val="25000"/>
-                          </a:srgbClr>
-                        </a:solidFill>
-                        <a:effectLst/>
-                        <a:uLnTx/>
-                        <a:uFillTx/>
-                        <a:latin typeface="Optima" panose="02000503060000020004" pitchFamily="2" charset="0"/>
-                        <a:ea typeface="+mn-ea"/>
-                        <a:cs typeface="+mn-cs"/>
-                      </a:endParaRPr>
                     </a:p>
                   </a:txBody>
-                  <a:tcPr anchor="ctr">
+                  <a:tcPr marL="0" marR="0" marT="0" marB="0" anchor="ctr">
                     <a:lnL w="12700" cap="flat" cmpd="sng" algn="ctr">
                       <a:solidFill>
                         <a:schemeClr val="tx1">
@@ -15738,7 +15583,7 @@
                         <a:defRPr/>
                       </a:pPr>
                       <a:r>
-                        <a:rPr kumimoji="0" lang="en-US" sz="1800" b="0" i="0" u="none" strike="noStrike" kern="1200" cap="none" spc="0" normalizeH="0" baseline="0" noProof="0">
+                        <a:rPr kumimoji="0" lang="en-US" sz="1800" b="0" i="0" u="none" strike="noStrike" kern="1200" cap="none" spc="0" normalizeH="0" baseline="0" noProof="0" dirty="0">
                           <a:ln>
                             <a:noFill/>
                           </a:ln>
@@ -15755,28 +15600,11 @@
                           <a:ea typeface="+mn-ea"/>
                           <a:cs typeface="+mn-cs"/>
                         </a:rPr>
-                        <a:t>?</a:t>
+                        <a:t>.02</a:t>
                       </a:r>
-                      <a:endParaRPr kumimoji="0" lang="en-US" sz="1800" b="0" i="0" u="none" strike="noStrike" kern="1200" cap="none" spc="0" normalizeH="0" baseline="0" noProof="0" dirty="0">
-                        <a:ln>
-                          <a:noFill/>
-                        </a:ln>
-                        <a:solidFill>
-                          <a:srgbClr val="000000">
-                            <a:lumMod val="75000"/>
-                            <a:lumOff val="25000"/>
-                          </a:srgbClr>
-                        </a:solidFill>
-                        <a:effectLst/>
-                        <a:uLnTx/>
-                        <a:uFillTx/>
-                        <a:latin typeface="Optima" panose="02000503060000020004" pitchFamily="2" charset="0"/>
-                        <a:ea typeface="+mn-ea"/>
-                        <a:cs typeface="+mn-cs"/>
-                      </a:endParaRPr>
                     </a:p>
                   </a:txBody>
-                  <a:tcPr anchor="ctr">
+                  <a:tcPr marL="0" marR="0" marT="0" marB="0" anchor="ctr">
                     <a:lnL w="12700" cap="flat" cmpd="sng" algn="ctr">
                       <a:solidFill>
                         <a:schemeClr val="tx1">
@@ -15964,7 +15792,7 @@
                           <a:ea typeface="+mn-ea"/>
                           <a:cs typeface="+mn-cs"/>
                         </a:rPr>
-                        <a:t>.02</a:t>
+                        <a:t>.04</a:t>
                       </a:r>
                     </a:p>
                   </a:txBody>
@@ -16139,7 +15967,7 @@
                         <a:defRPr/>
                       </a:pPr>
                       <a:r>
-                        <a:rPr kumimoji="0" lang="en-US" sz="1800" b="0" i="0" u="none" strike="noStrike" kern="1200" cap="none" spc="0" normalizeH="0" baseline="0" noProof="0">
+                        <a:rPr kumimoji="0" lang="en-US" sz="1800" b="0" i="0" u="none" strike="noStrike" kern="1200" cap="none" spc="0" normalizeH="0" baseline="0" noProof="0" dirty="0">
                           <a:ln>
                             <a:noFill/>
                           </a:ln>
@@ -16156,28 +15984,11 @@
                           <a:ea typeface="+mn-ea"/>
                           <a:cs typeface="+mn-cs"/>
                         </a:rPr>
-                        <a:t>?</a:t>
+                        <a:t>.02</a:t>
                       </a:r>
-                      <a:endParaRPr kumimoji="0" lang="en-US" sz="1800" b="0" i="0" u="none" strike="noStrike" kern="1200" cap="none" spc="0" normalizeH="0" baseline="0" noProof="0" dirty="0">
-                        <a:ln>
-                          <a:noFill/>
-                        </a:ln>
-                        <a:solidFill>
-                          <a:srgbClr val="000000">
-                            <a:lumMod val="75000"/>
-                            <a:lumOff val="25000"/>
-                          </a:srgbClr>
-                        </a:solidFill>
-                        <a:effectLst/>
-                        <a:uLnTx/>
-                        <a:uFillTx/>
-                        <a:latin typeface="Optima" panose="02000503060000020004" pitchFamily="2" charset="0"/>
-                        <a:ea typeface="+mn-ea"/>
-                        <a:cs typeface="+mn-cs"/>
-                      </a:endParaRPr>
                     </a:p>
                   </a:txBody>
-                  <a:tcPr anchor="ctr">
+                  <a:tcPr marL="0" marR="0" marT="0" marB="0" anchor="ctr">
                     <a:lnL w="12700" cap="flat" cmpd="sng" algn="ctr">
                       <a:solidFill>
                         <a:schemeClr val="tx1">
@@ -16276,237 +16087,11 @@
                           <a:ea typeface="+mn-ea"/>
                           <a:cs typeface="+mn-cs"/>
                         </a:rPr>
-                        <a:t>?</a:t>
+                        <a:t>.0025</a:t>
                       </a:r>
                     </a:p>
                   </a:txBody>
-                  <a:tcPr anchor="ctr">
-                    <a:lnL w="12700" cap="flat" cmpd="sng" algn="ctr">
-                      <a:solidFill>
-                        <a:schemeClr val="tx1">
-                          <a:lumMod val="75000"/>
-                          <a:lumOff val="25000"/>
-                        </a:schemeClr>
-                      </a:solidFill>
-                      <a:prstDash val="solid"/>
-                      <a:round/>
-                      <a:headEnd type="none" w="med" len="med"/>
-                      <a:tailEnd type="none" w="med" len="med"/>
-                    </a:lnL>
-                    <a:lnR w="12700" cap="flat" cmpd="sng" algn="ctr">
-                      <a:solidFill>
-                        <a:schemeClr val="tx1">
-                          <a:lumMod val="75000"/>
-                          <a:lumOff val="25000"/>
-                        </a:schemeClr>
-                      </a:solidFill>
-                      <a:prstDash val="solid"/>
-                      <a:round/>
-                      <a:headEnd type="none" w="med" len="med"/>
-                      <a:tailEnd type="none" w="med" len="med"/>
-                    </a:lnR>
-                    <a:lnT w="12700" cap="flat" cmpd="sng" algn="ctr">
-                      <a:solidFill>
-                        <a:schemeClr val="tx1">
-                          <a:lumMod val="75000"/>
-                          <a:lumOff val="25000"/>
-                        </a:schemeClr>
-                      </a:solidFill>
-                      <a:prstDash val="solid"/>
-                      <a:round/>
-                      <a:headEnd type="none" w="med" len="med"/>
-                      <a:tailEnd type="none" w="med" len="med"/>
-                    </a:lnT>
-                    <a:lnB w="12700" cap="flat" cmpd="sng" algn="ctr">
-                      <a:solidFill>
-                        <a:schemeClr val="tx1">
-                          <a:lumMod val="75000"/>
-                          <a:lumOff val="25000"/>
-                        </a:schemeClr>
-                      </a:solidFill>
-                      <a:prstDash val="solid"/>
-                      <a:round/>
-                      <a:headEnd type="none" w="med" len="med"/>
-                      <a:tailEnd type="none" w="med" len="med"/>
-                    </a:lnB>
-                    <a:noFill/>
-                  </a:tcPr>
-                </a:tc>
-                <a:tc>
-                  <a:txBody>
-                    <a:bodyPr/>
-                    <a:lstStyle/>
-                    <a:p>
-                      <a:pPr marL="0" marR="0" lvl="0" indent="0" algn="ctr" defTabSz="914400" rtl="0" eaLnBrk="1" fontAlgn="auto" latinLnBrk="0" hangingPunct="1">
-                        <a:lnSpc>
-                          <a:spcPct val="100000"/>
-                        </a:lnSpc>
-                        <a:spcBef>
-                          <a:spcPts val="0"/>
-                        </a:spcBef>
-                        <a:spcAft>
-                          <a:spcPts val="0"/>
-                        </a:spcAft>
-                        <a:buClrTx/>
-                        <a:buSzTx/>
-                        <a:buFontTx/>
-                        <a:buNone/>
-                        <a:tabLst/>
-                        <a:defRPr/>
-                      </a:pPr>
-                      <a:r>
-                        <a:rPr kumimoji="0" lang="en-US" sz="1800" b="0" i="0" u="none" strike="noStrike" kern="1200" cap="none" spc="0" normalizeH="0" baseline="0" noProof="0">
-                          <a:ln>
-                            <a:noFill/>
-                          </a:ln>
-                          <a:solidFill>
-                            <a:srgbClr val="000000">
-                              <a:lumMod val="75000"/>
-                              <a:lumOff val="25000"/>
-                            </a:srgbClr>
-                          </a:solidFill>
-                          <a:effectLst/>
-                          <a:uLnTx/>
-                          <a:uFillTx/>
-                          <a:latin typeface="Optima" panose="02000503060000020004" pitchFamily="2" charset="0"/>
-                          <a:ea typeface="+mn-ea"/>
-                          <a:cs typeface="+mn-cs"/>
-                        </a:rPr>
-                        <a:t>?</a:t>
-                      </a:r>
-                      <a:endParaRPr kumimoji="0" lang="en-US" sz="1800" b="0" i="0" u="none" strike="noStrike" kern="1200" cap="none" spc="0" normalizeH="0" baseline="0" noProof="0" dirty="0">
-                        <a:ln>
-                          <a:noFill/>
-                        </a:ln>
-                        <a:solidFill>
-                          <a:srgbClr val="000000">
-                            <a:lumMod val="75000"/>
-                            <a:lumOff val="25000"/>
-                          </a:srgbClr>
-                        </a:solidFill>
-                        <a:effectLst/>
-                        <a:uLnTx/>
-                        <a:uFillTx/>
-                        <a:latin typeface="Optima" panose="02000503060000020004" pitchFamily="2" charset="0"/>
-                        <a:ea typeface="+mn-ea"/>
-                        <a:cs typeface="+mn-cs"/>
-                      </a:endParaRPr>
-                    </a:p>
-                  </a:txBody>
-                  <a:tcPr anchor="ctr">
-                    <a:lnL w="12700" cap="flat" cmpd="sng" algn="ctr">
-                      <a:solidFill>
-                        <a:schemeClr val="tx1">
-                          <a:lumMod val="75000"/>
-                          <a:lumOff val="25000"/>
-                        </a:schemeClr>
-                      </a:solidFill>
-                      <a:prstDash val="solid"/>
-                      <a:round/>
-                      <a:headEnd type="none" w="med" len="med"/>
-                      <a:tailEnd type="none" w="med" len="med"/>
-                    </a:lnL>
-                    <a:lnR w="12700" cap="flat" cmpd="sng" algn="ctr">
-                      <a:solidFill>
-                        <a:schemeClr val="tx1">
-                          <a:lumMod val="75000"/>
-                          <a:lumOff val="25000"/>
-                        </a:schemeClr>
-                      </a:solidFill>
-                      <a:prstDash val="solid"/>
-                      <a:round/>
-                      <a:headEnd type="none" w="med" len="med"/>
-                      <a:tailEnd type="none" w="med" len="med"/>
-                    </a:lnR>
-                    <a:lnT w="12700" cap="flat" cmpd="sng" algn="ctr">
-                      <a:solidFill>
-                        <a:schemeClr val="tx1">
-                          <a:lumMod val="75000"/>
-                          <a:lumOff val="25000"/>
-                        </a:schemeClr>
-                      </a:solidFill>
-                      <a:prstDash val="solid"/>
-                      <a:round/>
-                      <a:headEnd type="none" w="med" len="med"/>
-                      <a:tailEnd type="none" w="med" len="med"/>
-                    </a:lnT>
-                    <a:lnB w="12700" cap="flat" cmpd="sng" algn="ctr">
-                      <a:solidFill>
-                        <a:schemeClr val="tx1">
-                          <a:lumMod val="75000"/>
-                          <a:lumOff val="25000"/>
-                        </a:schemeClr>
-                      </a:solidFill>
-                      <a:prstDash val="solid"/>
-                      <a:round/>
-                      <a:headEnd type="none" w="med" len="med"/>
-                      <a:tailEnd type="none" w="med" len="med"/>
-                    </a:lnB>
-                    <a:noFill/>
-                  </a:tcPr>
-                </a:tc>
-                <a:tc>
-                  <a:txBody>
-                    <a:bodyPr/>
-                    <a:lstStyle/>
-                    <a:p>
-                      <a:pPr marL="0" marR="0" lvl="0" indent="0" algn="ctr" defTabSz="914400" rtl="0" eaLnBrk="1" fontAlgn="auto" latinLnBrk="0" hangingPunct="1">
-                        <a:lnSpc>
-                          <a:spcPct val="100000"/>
-                        </a:lnSpc>
-                        <a:spcBef>
-                          <a:spcPts val="0"/>
-                        </a:spcBef>
-                        <a:spcAft>
-                          <a:spcPts val="0"/>
-                        </a:spcAft>
-                        <a:buClrTx/>
-                        <a:buSzTx/>
-                        <a:buFontTx/>
-                        <a:buNone/>
-                        <a:tabLst/>
-                        <a:defRPr/>
-                      </a:pPr>
-                      <a:r>
-                        <a:rPr kumimoji="0" lang="en-US" sz="1800" b="0" i="0" u="none" strike="noStrike" kern="1200" cap="none" spc="0" normalizeH="0" baseline="0" noProof="0">
-                          <a:ln>
-                            <a:noFill/>
-                          </a:ln>
-                          <a:solidFill>
-                            <a:srgbClr val="000000">
-                              <a:lumMod val="75000"/>
-                              <a:lumOff val="25000"/>
-                            </a:srgbClr>
-                          </a:solidFill>
-                          <a:effectLst/>
-                          <a:uLnTx/>
-                          <a:uFillTx/>
-                          <a:latin typeface="Optima" panose="02000503060000020004" pitchFamily="2" charset="0"/>
-                          <a:ea typeface="+mn-ea"/>
-                          <a:cs typeface="+mn-cs"/>
-                        </a:rPr>
-                        <a:t>?</a:t>
-                      </a:r>
-                      <a:endParaRPr kumimoji="0" lang="en-US" sz="1800" b="0" i="0" u="none" strike="noStrike" kern="1200" cap="none" spc="0" normalizeH="0" baseline="0" noProof="0" dirty="0">
-                        <a:ln>
-                          <a:noFill/>
-                        </a:ln>
-                        <a:solidFill>
-                          <a:srgbClr val="000000">
-                            <a:lumMod val="75000"/>
-                            <a:lumOff val="25000"/>
-                          </a:srgbClr>
-                        </a:solidFill>
-                        <a:effectLst/>
-                        <a:uLnTx/>
-                        <a:uFillTx/>
-                        <a:latin typeface="Optima" panose="02000503060000020004" pitchFamily="2" charset="0"/>
-                        <a:ea typeface="+mn-ea"/>
-                        <a:cs typeface="+mn-cs"/>
-                      </a:endParaRPr>
-                    </a:p>
-                  </a:txBody>
-                  <a:tcPr anchor="ctr">
+                  <a:tcPr marL="0" marR="0" marT="0" marB="0" anchor="ctr">
                     <a:lnL w="12700" cap="flat" cmpd="sng" algn="ctr">
                       <a:solidFill>
                         <a:schemeClr val="tx1">
@@ -16598,11 +16183,11 @@
                           <a:ea typeface="+mn-ea"/>
                           <a:cs typeface="+mn-cs"/>
                         </a:rPr>
-                        <a:t>?</a:t>
+                        <a:t>.02</a:t>
                       </a:r>
                     </a:p>
                   </a:txBody>
-                  <a:tcPr anchor="ctr">
+                  <a:tcPr marL="0" marR="0" marT="0" marB="0" anchor="ctr">
                     <a:lnL w="12700" cap="flat" cmpd="sng" algn="ctr">
                       <a:solidFill>
                         <a:schemeClr val="tx1">
@@ -16694,11 +16279,203 @@
                           <a:ea typeface="+mn-ea"/>
                           <a:cs typeface="+mn-cs"/>
                         </a:rPr>
-                        <a:t>?</a:t>
+                        <a:t>.045</a:t>
                       </a:r>
                     </a:p>
                   </a:txBody>
-                  <a:tcPr anchor="ctr">
+                  <a:tcPr marL="0" marR="0" marT="0" marB="0" anchor="ctr">
+                    <a:lnL w="12700" cap="flat" cmpd="sng" algn="ctr">
+                      <a:solidFill>
+                        <a:schemeClr val="tx1">
+                          <a:lumMod val="75000"/>
+                          <a:lumOff val="25000"/>
+                        </a:schemeClr>
+                      </a:solidFill>
+                      <a:prstDash val="solid"/>
+                      <a:round/>
+                      <a:headEnd type="none" w="med" len="med"/>
+                      <a:tailEnd type="none" w="med" len="med"/>
+                    </a:lnL>
+                    <a:lnR w="12700" cap="flat" cmpd="sng" algn="ctr">
+                      <a:solidFill>
+                        <a:schemeClr val="tx1">
+                          <a:lumMod val="75000"/>
+                          <a:lumOff val="25000"/>
+                        </a:schemeClr>
+                      </a:solidFill>
+                      <a:prstDash val="solid"/>
+                      <a:round/>
+                      <a:headEnd type="none" w="med" len="med"/>
+                      <a:tailEnd type="none" w="med" len="med"/>
+                    </a:lnR>
+                    <a:lnT w="12700" cap="flat" cmpd="sng" algn="ctr">
+                      <a:solidFill>
+                        <a:schemeClr val="tx1">
+                          <a:lumMod val="75000"/>
+                          <a:lumOff val="25000"/>
+                        </a:schemeClr>
+                      </a:solidFill>
+                      <a:prstDash val="solid"/>
+                      <a:round/>
+                      <a:headEnd type="none" w="med" len="med"/>
+                      <a:tailEnd type="none" w="med" len="med"/>
+                    </a:lnT>
+                    <a:lnB w="12700" cap="flat" cmpd="sng" algn="ctr">
+                      <a:solidFill>
+                        <a:schemeClr val="tx1">
+                          <a:lumMod val="75000"/>
+                          <a:lumOff val="25000"/>
+                        </a:schemeClr>
+                      </a:solidFill>
+                      <a:prstDash val="solid"/>
+                      <a:round/>
+                      <a:headEnd type="none" w="med" len="med"/>
+                      <a:tailEnd type="none" w="med" len="med"/>
+                    </a:lnB>
+                    <a:noFill/>
+                  </a:tcPr>
+                </a:tc>
+                <a:tc>
+                  <a:txBody>
+                    <a:bodyPr/>
+                    <a:lstStyle/>
+                    <a:p>
+                      <a:pPr marL="0" marR="0" lvl="0" indent="0" algn="ctr" defTabSz="914400" rtl="0" eaLnBrk="1" fontAlgn="auto" latinLnBrk="0" hangingPunct="1">
+                        <a:lnSpc>
+                          <a:spcPct val="100000"/>
+                        </a:lnSpc>
+                        <a:spcBef>
+                          <a:spcPts val="0"/>
+                        </a:spcBef>
+                        <a:spcAft>
+                          <a:spcPts val="0"/>
+                        </a:spcAft>
+                        <a:buClrTx/>
+                        <a:buSzTx/>
+                        <a:buFontTx/>
+                        <a:buNone/>
+                        <a:tabLst/>
+                        <a:defRPr/>
+                      </a:pPr>
+                      <a:r>
+                        <a:rPr kumimoji="0" lang="en-US" sz="1800" b="0" i="0" u="none" strike="noStrike" kern="1200" cap="none" spc="0" normalizeH="0" baseline="0" noProof="0" dirty="0">
+                          <a:ln>
+                            <a:noFill/>
+                          </a:ln>
+                          <a:solidFill>
+                            <a:srgbClr val="000000">
+                              <a:lumMod val="75000"/>
+                              <a:lumOff val="25000"/>
+                            </a:srgbClr>
+                          </a:solidFill>
+                          <a:effectLst/>
+                          <a:uLnTx/>
+                          <a:uFillTx/>
+                          <a:latin typeface="Optima" panose="02000503060000020004" pitchFamily="2" charset="0"/>
+                          <a:ea typeface="+mn-ea"/>
+                          <a:cs typeface="+mn-cs"/>
+                        </a:rPr>
+                        <a:t>.02</a:t>
+                      </a:r>
+                    </a:p>
+                  </a:txBody>
+                  <a:tcPr marL="0" marR="0" marT="0" marB="0" anchor="ctr">
+                    <a:lnL w="12700" cap="flat" cmpd="sng" algn="ctr">
+                      <a:solidFill>
+                        <a:schemeClr val="tx1">
+                          <a:lumMod val="75000"/>
+                          <a:lumOff val="25000"/>
+                        </a:schemeClr>
+                      </a:solidFill>
+                      <a:prstDash val="solid"/>
+                      <a:round/>
+                      <a:headEnd type="none" w="med" len="med"/>
+                      <a:tailEnd type="none" w="med" len="med"/>
+                    </a:lnL>
+                    <a:lnR w="12700" cap="flat" cmpd="sng" algn="ctr">
+                      <a:solidFill>
+                        <a:schemeClr val="tx1">
+                          <a:lumMod val="75000"/>
+                          <a:lumOff val="25000"/>
+                        </a:schemeClr>
+                      </a:solidFill>
+                      <a:prstDash val="solid"/>
+                      <a:round/>
+                      <a:headEnd type="none" w="med" len="med"/>
+                      <a:tailEnd type="none" w="med" len="med"/>
+                    </a:lnR>
+                    <a:lnT w="12700" cap="flat" cmpd="sng" algn="ctr">
+                      <a:solidFill>
+                        <a:schemeClr val="tx1">
+                          <a:lumMod val="75000"/>
+                          <a:lumOff val="25000"/>
+                        </a:schemeClr>
+                      </a:solidFill>
+                      <a:prstDash val="solid"/>
+                      <a:round/>
+                      <a:headEnd type="none" w="med" len="med"/>
+                      <a:tailEnd type="none" w="med" len="med"/>
+                    </a:lnT>
+                    <a:lnB w="12700" cap="flat" cmpd="sng" algn="ctr">
+                      <a:solidFill>
+                        <a:schemeClr val="tx1">
+                          <a:lumMod val="75000"/>
+                          <a:lumOff val="25000"/>
+                        </a:schemeClr>
+                      </a:solidFill>
+                      <a:prstDash val="solid"/>
+                      <a:round/>
+                      <a:headEnd type="none" w="med" len="med"/>
+                      <a:tailEnd type="none" w="med" len="med"/>
+                    </a:lnB>
+                    <a:noFill/>
+                  </a:tcPr>
+                </a:tc>
+                <a:tc>
+                  <a:txBody>
+                    <a:bodyPr/>
+                    <a:lstStyle/>
+                    <a:p>
+                      <a:pPr marL="0" marR="0" lvl="0" indent="0" algn="ctr" defTabSz="914400" rtl="0" eaLnBrk="1" fontAlgn="auto" latinLnBrk="0" hangingPunct="1">
+                        <a:lnSpc>
+                          <a:spcPct val="100000"/>
+                        </a:lnSpc>
+                        <a:spcBef>
+                          <a:spcPts val="0"/>
+                        </a:spcBef>
+                        <a:spcAft>
+                          <a:spcPts val="0"/>
+                        </a:spcAft>
+                        <a:buClrTx/>
+                        <a:buSzTx/>
+                        <a:buFontTx/>
+                        <a:buNone/>
+                        <a:tabLst/>
+                        <a:defRPr/>
+                      </a:pPr>
+                      <a:r>
+                        <a:rPr kumimoji="0" lang="en-US" sz="1800" b="0" i="0" u="none" strike="noStrike" kern="1200" cap="none" spc="0" normalizeH="0" baseline="0" noProof="0" dirty="0">
+                          <a:ln>
+                            <a:noFill/>
+                          </a:ln>
+                          <a:solidFill>
+                            <a:srgbClr val="000000">
+                              <a:lumMod val="75000"/>
+                              <a:lumOff val="25000"/>
+                            </a:srgbClr>
+                          </a:solidFill>
+                          <a:effectLst/>
+                          <a:uLnTx/>
+                          <a:uFillTx/>
+                          <a:latin typeface="Optima" panose="02000503060000020004" pitchFamily="2" charset="0"/>
+                          <a:ea typeface="+mn-ea"/>
+                          <a:cs typeface="+mn-cs"/>
+                        </a:rPr>
+                        <a:t>.0025</a:t>
+                      </a:r>
+                    </a:p>
+                  </a:txBody>
+                  <a:tcPr marL="0" marR="0" marT="0" marB="0" anchor="ctr">
                     <a:lnL w="12700" cap="flat" cmpd="sng" algn="ctr">
                       <a:solidFill>
                         <a:schemeClr val="tx1">

</xml_diff>

<commit_message>
Adding slow diffusion figure
</commit_message>
<xml_diff>
--- a/figures/MMBS Figures.pptx
+++ b/figures/MMBS Figures.pptx
@@ -5,7 +5,7 @@
     <p:sldMasterId id="2147483648" r:id="rId1"/>
   </p:sldMasterIdLst>
   <p:notesMasterIdLst>
-    <p:notesMasterId r:id="rId9"/>
+    <p:notesMasterId r:id="rId10"/>
   </p:notesMasterIdLst>
   <p:sldIdLst>
     <p:sldId id="2644" r:id="rId2"/>
@@ -15,6 +15,7 @@
     <p:sldId id="2648" r:id="rId6"/>
     <p:sldId id="2649" r:id="rId7"/>
     <p:sldId id="2650" r:id="rId8"/>
+    <p:sldId id="2651" r:id="rId9"/>
   </p:sldIdLst>
   <p:sldSz cx="12192000" cy="6858000"/>
   <p:notesSz cx="6858000" cy="9144000"/>
@@ -1134,6 +1135,94 @@
     <p:extLst>
       <p:ext uri="{BB962C8B-B14F-4D97-AF65-F5344CB8AC3E}">
         <p14:creationId xmlns:p14="http://schemas.microsoft.com/office/powerpoint/2010/main" val="3484783609"/>
+      </p:ext>
+    </p:extLst>
+  </p:cSld>
+  <p:clrMapOvr>
+    <a:masterClrMapping/>
+  </p:clrMapOvr>
+</p:notes>
+</file>
+
+<file path=ppt/notesSlides/notesSlide8.xml><?xml version="1.0" encoding="utf-8"?>
+<p:notes xmlns:a="http://schemas.openxmlformats.org/drawingml/2006/main" xmlns:r="http://schemas.openxmlformats.org/officeDocument/2006/relationships" xmlns:p="http://schemas.openxmlformats.org/presentationml/2006/main">
+  <p:cSld>
+    <p:spTree>
+      <p:nvGrpSpPr>
+        <p:cNvPr id="1" name=""/>
+        <p:cNvGrpSpPr/>
+        <p:nvPr/>
+      </p:nvGrpSpPr>
+      <p:grpSpPr>
+        <a:xfrm>
+          <a:off x="0" y="0"/>
+          <a:ext cx="0" cy="0"/>
+          <a:chOff x="0" y="0"/>
+          <a:chExt cx="0" cy="0"/>
+        </a:xfrm>
+      </p:grpSpPr>
+      <p:sp>
+        <p:nvSpPr>
+          <p:cNvPr id="2" name="Slide Image Placeholder 1"/>
+          <p:cNvSpPr>
+            <a:spLocks noGrp="1" noRot="1" noChangeAspect="1"/>
+          </p:cNvSpPr>
+          <p:nvPr>
+            <p:ph type="sldImg"/>
+          </p:nvPr>
+        </p:nvSpPr>
+        <p:spPr/>
+      </p:sp>
+      <p:sp>
+        <p:nvSpPr>
+          <p:cNvPr id="3" name="Notes Placeholder 2"/>
+          <p:cNvSpPr>
+            <a:spLocks noGrp="1"/>
+          </p:cNvSpPr>
+          <p:nvPr>
+            <p:ph type="body" idx="1"/>
+          </p:nvPr>
+        </p:nvSpPr>
+        <p:spPr/>
+        <p:txBody>
+          <a:bodyPr/>
+          <a:lstStyle/>
+          <a:p>
+            <a:r>
+              <a:rPr lang="en-US" dirty="0" err="1"/>
+              <a:t>A_concentration_slower_diffusion</a:t>
+            </a:r>
+            <a:endParaRPr lang="en-US" dirty="0"/>
+          </a:p>
+        </p:txBody>
+      </p:sp>
+      <p:sp>
+        <p:nvSpPr>
+          <p:cNvPr id="4" name="Slide Number Placeholder 3"/>
+          <p:cNvSpPr>
+            <a:spLocks noGrp="1"/>
+          </p:cNvSpPr>
+          <p:nvPr>
+            <p:ph type="sldNum" sz="quarter" idx="5"/>
+          </p:nvPr>
+        </p:nvSpPr>
+        <p:spPr/>
+        <p:txBody>
+          <a:bodyPr/>
+          <a:lstStyle/>
+          <a:p>
+            <a:fld id="{1FA7716F-88A2-8E4E-B694-34C10F2D9928}" type="slidenum">
+              <a:rPr lang="en-US" smtClean="0"/>
+              <a:t>8</a:t>
+            </a:fld>
+            <a:endParaRPr lang="en-US"/>
+          </a:p>
+        </p:txBody>
+      </p:sp>
+    </p:spTree>
+    <p:extLst>
+      <p:ext uri="{BB962C8B-B14F-4D97-AF65-F5344CB8AC3E}">
+        <p14:creationId xmlns:p14="http://schemas.microsoft.com/office/powerpoint/2010/main" val="1041636323"/>
       </p:ext>
     </p:extLst>
   </p:cSld>
@@ -16550,6 +16639,2797 @@
 </p:sld>
 </file>
 
+<file path=ppt/slides/slide8.xml><?xml version="1.0" encoding="utf-8"?>
+<p:sld xmlns:a="http://schemas.openxmlformats.org/drawingml/2006/main" xmlns:r="http://schemas.openxmlformats.org/officeDocument/2006/relationships" xmlns:p="http://schemas.openxmlformats.org/presentationml/2006/main">
+  <p:cSld>
+    <p:spTree>
+      <p:nvGrpSpPr>
+        <p:cNvPr id="1" name=""/>
+        <p:cNvGrpSpPr/>
+        <p:nvPr/>
+      </p:nvGrpSpPr>
+      <p:grpSpPr>
+        <a:xfrm>
+          <a:off x="0" y="0"/>
+          <a:ext cx="0" cy="0"/>
+          <a:chOff x="0" y="0"/>
+          <a:chExt cx="0" cy="0"/>
+        </a:xfrm>
+      </p:grpSpPr>
+      <p:graphicFrame>
+        <p:nvGraphicFramePr>
+          <p:cNvPr id="4" name="Table 4">
+            <a:extLst>
+              <a:ext uri="{FF2B5EF4-FFF2-40B4-BE49-F238E27FC236}">
+                <a16:creationId xmlns:a16="http://schemas.microsoft.com/office/drawing/2014/main" id="{F991F809-7408-BF46-846B-D45336779E73}"/>
+              </a:ext>
+            </a:extLst>
+          </p:cNvPr>
+          <p:cNvGraphicFramePr>
+            <a:graphicFrameLocks noGrp="1"/>
+          </p:cNvGraphicFramePr>
+          <p:nvPr>
+            <p:extLst>
+              <p:ext uri="{D42A27DB-BD31-4B8C-83A1-F6EECF244321}">
+                <p14:modId xmlns:p14="http://schemas.microsoft.com/office/powerpoint/2010/main" val="3154805550"/>
+              </p:ext>
+            </p:extLst>
+          </p:nvPr>
+        </p:nvGraphicFramePr>
+        <p:xfrm>
+          <a:off x="2032000" y="719666"/>
+          <a:ext cx="3657600" cy="3657600"/>
+        </p:xfrm>
+        <a:graphic>
+          <a:graphicData uri="http://schemas.openxmlformats.org/drawingml/2006/table">
+            <a:tbl>
+              <a:tblPr firstRow="1" bandRow="1">
+                <a:tableStyleId>{5C22544A-7EE6-4342-B048-85BDC9FD1C3A}</a:tableStyleId>
+              </a:tblPr>
+              <a:tblGrid>
+                <a:gridCol w="731520">
+                  <a:extLst>
+                    <a:ext uri="{9D8B030D-6E8A-4147-A177-3AD203B41FA5}">
+                      <a16:colId xmlns:a16="http://schemas.microsoft.com/office/drawing/2014/main" val="64487363"/>
+                    </a:ext>
+                  </a:extLst>
+                </a:gridCol>
+                <a:gridCol w="731520">
+                  <a:extLst>
+                    <a:ext uri="{9D8B030D-6E8A-4147-A177-3AD203B41FA5}">
+                      <a16:colId xmlns:a16="http://schemas.microsoft.com/office/drawing/2014/main" val="1494506360"/>
+                    </a:ext>
+                  </a:extLst>
+                </a:gridCol>
+                <a:gridCol w="731520">
+                  <a:extLst>
+                    <a:ext uri="{9D8B030D-6E8A-4147-A177-3AD203B41FA5}">
+                      <a16:colId xmlns:a16="http://schemas.microsoft.com/office/drawing/2014/main" val="1972404400"/>
+                    </a:ext>
+                  </a:extLst>
+                </a:gridCol>
+                <a:gridCol w="731520">
+                  <a:extLst>
+                    <a:ext uri="{9D8B030D-6E8A-4147-A177-3AD203B41FA5}">
+                      <a16:colId xmlns:a16="http://schemas.microsoft.com/office/drawing/2014/main" val="2274171207"/>
+                    </a:ext>
+                  </a:extLst>
+                </a:gridCol>
+                <a:gridCol w="731520">
+                  <a:extLst>
+                    <a:ext uri="{9D8B030D-6E8A-4147-A177-3AD203B41FA5}">
+                      <a16:colId xmlns:a16="http://schemas.microsoft.com/office/drawing/2014/main" val="1580668807"/>
+                    </a:ext>
+                  </a:extLst>
+                </a:gridCol>
+              </a:tblGrid>
+              <a:tr h="731520">
+                <a:tc>
+                  <a:txBody>
+                    <a:bodyPr/>
+                    <a:lstStyle/>
+                    <a:p>
+                      <a:pPr marL="0" marR="0" lvl="0" indent="0" algn="ctr" defTabSz="914400" rtl="0" eaLnBrk="1" fontAlgn="auto" latinLnBrk="0" hangingPunct="1">
+                        <a:lnSpc>
+                          <a:spcPct val="100000"/>
+                        </a:lnSpc>
+                        <a:spcBef>
+                          <a:spcPts val="0"/>
+                        </a:spcBef>
+                        <a:spcAft>
+                          <a:spcPts val="0"/>
+                        </a:spcAft>
+                        <a:buClrTx/>
+                        <a:buSzTx/>
+                        <a:buFontTx/>
+                        <a:buNone/>
+                        <a:tabLst/>
+                        <a:defRPr/>
+                      </a:pPr>
+                      <a:r>
+                        <a:rPr kumimoji="0" lang="en-US" sz="1800" b="0" i="0" u="none" strike="noStrike" kern="1200" cap="none" spc="0" normalizeH="0" baseline="0" noProof="0">
+                          <a:ln>
+                            <a:noFill/>
+                          </a:ln>
+                          <a:solidFill>
+                            <a:srgbClr val="000000">
+                              <a:lumMod val="75000"/>
+                              <a:lumOff val="25000"/>
+                            </a:srgbClr>
+                          </a:solidFill>
+                          <a:effectLst/>
+                          <a:uLnTx/>
+                          <a:uFillTx/>
+                          <a:latin typeface="Optima" panose="02000503060000020004" pitchFamily="2" charset="0"/>
+                          <a:ea typeface="+mn-ea"/>
+                          <a:cs typeface="+mn-cs"/>
+                        </a:rPr>
+                        <a:t>0</a:t>
+                      </a:r>
+                      <a:endParaRPr kumimoji="0" lang="en-US" sz="1800" b="0" i="0" u="none" strike="noStrike" kern="1200" cap="none" spc="0" normalizeH="0" baseline="0" noProof="0" dirty="0">
+                        <a:ln>
+                          <a:noFill/>
+                        </a:ln>
+                        <a:solidFill>
+                          <a:srgbClr val="000000">
+                            <a:lumMod val="75000"/>
+                            <a:lumOff val="25000"/>
+                          </a:srgbClr>
+                        </a:solidFill>
+                        <a:effectLst/>
+                        <a:uLnTx/>
+                        <a:uFillTx/>
+                        <a:latin typeface="Optima" panose="02000503060000020004" pitchFamily="2" charset="0"/>
+                        <a:ea typeface="+mn-ea"/>
+                        <a:cs typeface="+mn-cs"/>
+                      </a:endParaRPr>
+                    </a:p>
+                  </a:txBody>
+                  <a:tcPr anchor="ctr">
+                    <a:lnL w="12700" cap="flat" cmpd="sng" algn="ctr">
+                      <a:solidFill>
+                        <a:schemeClr val="tx1">
+                          <a:lumMod val="75000"/>
+                          <a:lumOff val="25000"/>
+                        </a:schemeClr>
+                      </a:solidFill>
+                      <a:prstDash val="solid"/>
+                      <a:round/>
+                      <a:headEnd type="none" w="med" len="med"/>
+                      <a:tailEnd type="none" w="med" len="med"/>
+                    </a:lnL>
+                    <a:lnR w="12700" cap="flat" cmpd="sng" algn="ctr">
+                      <a:solidFill>
+                        <a:schemeClr val="tx1">
+                          <a:lumMod val="75000"/>
+                          <a:lumOff val="25000"/>
+                        </a:schemeClr>
+                      </a:solidFill>
+                      <a:prstDash val="solid"/>
+                      <a:round/>
+                      <a:headEnd type="none" w="med" len="med"/>
+                      <a:tailEnd type="none" w="med" len="med"/>
+                    </a:lnR>
+                    <a:lnT w="12700" cap="flat" cmpd="sng" algn="ctr">
+                      <a:solidFill>
+                        <a:schemeClr val="tx1">
+                          <a:lumMod val="75000"/>
+                          <a:lumOff val="25000"/>
+                        </a:schemeClr>
+                      </a:solidFill>
+                      <a:prstDash val="solid"/>
+                      <a:round/>
+                      <a:headEnd type="none" w="med" len="med"/>
+                      <a:tailEnd type="none" w="med" len="med"/>
+                    </a:lnT>
+                    <a:lnB w="12700" cap="flat" cmpd="sng" algn="ctr">
+                      <a:solidFill>
+                        <a:schemeClr val="tx1">
+                          <a:lumMod val="75000"/>
+                          <a:lumOff val="25000"/>
+                        </a:schemeClr>
+                      </a:solidFill>
+                      <a:prstDash val="solid"/>
+                      <a:round/>
+                      <a:headEnd type="none" w="med" len="med"/>
+                      <a:tailEnd type="none" w="med" len="med"/>
+                    </a:lnB>
+                    <a:noFill/>
+                  </a:tcPr>
+                </a:tc>
+                <a:tc>
+                  <a:txBody>
+                    <a:bodyPr/>
+                    <a:lstStyle/>
+                    <a:p>
+                      <a:pPr marL="0" marR="0" lvl="0" indent="0" algn="ctr" defTabSz="914400" rtl="0" eaLnBrk="1" fontAlgn="auto" latinLnBrk="0" hangingPunct="1">
+                        <a:lnSpc>
+                          <a:spcPct val="100000"/>
+                        </a:lnSpc>
+                        <a:spcBef>
+                          <a:spcPts val="0"/>
+                        </a:spcBef>
+                        <a:spcAft>
+                          <a:spcPts val="0"/>
+                        </a:spcAft>
+                        <a:buClrTx/>
+                        <a:buSzTx/>
+                        <a:buFontTx/>
+                        <a:buNone/>
+                        <a:tabLst/>
+                        <a:defRPr/>
+                      </a:pPr>
+                      <a:r>
+                        <a:rPr kumimoji="0" lang="en-US" sz="1800" b="0" i="0" u="none" strike="noStrike" kern="1200" cap="none" spc="0" normalizeH="0" baseline="0" noProof="0">
+                          <a:ln>
+                            <a:noFill/>
+                          </a:ln>
+                          <a:solidFill>
+                            <a:srgbClr val="000000">
+                              <a:lumMod val="75000"/>
+                              <a:lumOff val="25000"/>
+                            </a:srgbClr>
+                          </a:solidFill>
+                          <a:effectLst/>
+                          <a:uLnTx/>
+                          <a:uFillTx/>
+                          <a:latin typeface="Optima" panose="02000503060000020004" pitchFamily="2" charset="0"/>
+                          <a:ea typeface="+mn-ea"/>
+                          <a:cs typeface="+mn-cs"/>
+                        </a:rPr>
+                        <a:t>0</a:t>
+                      </a:r>
+                      <a:endParaRPr kumimoji="0" lang="en-US" sz="1800" b="0" i="0" u="none" strike="noStrike" kern="1200" cap="none" spc="0" normalizeH="0" baseline="0" noProof="0" dirty="0">
+                        <a:ln>
+                          <a:noFill/>
+                        </a:ln>
+                        <a:solidFill>
+                          <a:srgbClr val="000000">
+                            <a:lumMod val="75000"/>
+                            <a:lumOff val="25000"/>
+                          </a:srgbClr>
+                        </a:solidFill>
+                        <a:effectLst/>
+                        <a:uLnTx/>
+                        <a:uFillTx/>
+                        <a:latin typeface="Optima" panose="02000503060000020004" pitchFamily="2" charset="0"/>
+                        <a:ea typeface="+mn-ea"/>
+                        <a:cs typeface="+mn-cs"/>
+                      </a:endParaRPr>
+                    </a:p>
+                  </a:txBody>
+                  <a:tcPr anchor="ctr">
+                    <a:lnL w="12700" cap="flat" cmpd="sng" algn="ctr">
+                      <a:solidFill>
+                        <a:schemeClr val="tx1">
+                          <a:lumMod val="75000"/>
+                          <a:lumOff val="25000"/>
+                        </a:schemeClr>
+                      </a:solidFill>
+                      <a:prstDash val="solid"/>
+                      <a:round/>
+                      <a:headEnd type="none" w="med" len="med"/>
+                      <a:tailEnd type="none" w="med" len="med"/>
+                    </a:lnL>
+                    <a:lnR w="12700" cap="flat" cmpd="sng" algn="ctr">
+                      <a:solidFill>
+                        <a:schemeClr val="tx1">
+                          <a:lumMod val="75000"/>
+                          <a:lumOff val="25000"/>
+                        </a:schemeClr>
+                      </a:solidFill>
+                      <a:prstDash val="solid"/>
+                      <a:round/>
+                      <a:headEnd type="none" w="med" len="med"/>
+                      <a:tailEnd type="none" w="med" len="med"/>
+                    </a:lnR>
+                    <a:lnT w="12700" cap="flat" cmpd="sng" algn="ctr">
+                      <a:solidFill>
+                        <a:schemeClr val="tx1">
+                          <a:lumMod val="75000"/>
+                          <a:lumOff val="25000"/>
+                        </a:schemeClr>
+                      </a:solidFill>
+                      <a:prstDash val="solid"/>
+                      <a:round/>
+                      <a:headEnd type="none" w="med" len="med"/>
+                      <a:tailEnd type="none" w="med" len="med"/>
+                    </a:lnT>
+                    <a:lnB w="12700" cap="flat" cmpd="sng" algn="ctr">
+                      <a:solidFill>
+                        <a:schemeClr val="tx1">
+                          <a:lumMod val="75000"/>
+                          <a:lumOff val="25000"/>
+                        </a:schemeClr>
+                      </a:solidFill>
+                      <a:prstDash val="solid"/>
+                      <a:round/>
+                      <a:headEnd type="none" w="med" len="med"/>
+                      <a:tailEnd type="none" w="med" len="med"/>
+                    </a:lnB>
+                    <a:noFill/>
+                  </a:tcPr>
+                </a:tc>
+                <a:tc>
+                  <a:txBody>
+                    <a:bodyPr/>
+                    <a:lstStyle/>
+                    <a:p>
+                      <a:pPr marL="0" marR="0" lvl="0" indent="0" algn="ctr" defTabSz="914400" rtl="0" eaLnBrk="1" fontAlgn="auto" latinLnBrk="0" hangingPunct="1">
+                        <a:lnSpc>
+                          <a:spcPct val="100000"/>
+                        </a:lnSpc>
+                        <a:spcBef>
+                          <a:spcPts val="0"/>
+                        </a:spcBef>
+                        <a:spcAft>
+                          <a:spcPts val="0"/>
+                        </a:spcAft>
+                        <a:buClrTx/>
+                        <a:buSzTx/>
+                        <a:buFontTx/>
+                        <a:buNone/>
+                        <a:tabLst/>
+                        <a:defRPr/>
+                      </a:pPr>
+                      <a:r>
+                        <a:rPr kumimoji="0" lang="en-US" sz="1800" b="0" i="0" u="none" strike="noStrike" kern="1200" cap="none" spc="0" normalizeH="0" baseline="0" noProof="0">
+                          <a:ln>
+                            <a:noFill/>
+                          </a:ln>
+                          <a:solidFill>
+                            <a:srgbClr val="000000">
+                              <a:lumMod val="75000"/>
+                              <a:lumOff val="25000"/>
+                            </a:srgbClr>
+                          </a:solidFill>
+                          <a:effectLst/>
+                          <a:uLnTx/>
+                          <a:uFillTx/>
+                          <a:latin typeface="Optima" panose="02000503060000020004" pitchFamily="2" charset="0"/>
+                          <a:ea typeface="+mn-ea"/>
+                          <a:cs typeface="+mn-cs"/>
+                        </a:rPr>
+                        <a:t>0</a:t>
+                      </a:r>
+                      <a:endParaRPr kumimoji="0" lang="en-US" sz="1800" b="0" i="0" u="none" strike="noStrike" kern="1200" cap="none" spc="0" normalizeH="0" baseline="0" noProof="0" dirty="0">
+                        <a:ln>
+                          <a:noFill/>
+                        </a:ln>
+                        <a:solidFill>
+                          <a:srgbClr val="000000">
+                            <a:lumMod val="75000"/>
+                            <a:lumOff val="25000"/>
+                          </a:srgbClr>
+                        </a:solidFill>
+                        <a:effectLst/>
+                        <a:uLnTx/>
+                        <a:uFillTx/>
+                        <a:latin typeface="Optima" panose="02000503060000020004" pitchFamily="2" charset="0"/>
+                        <a:ea typeface="+mn-ea"/>
+                        <a:cs typeface="+mn-cs"/>
+                      </a:endParaRPr>
+                    </a:p>
+                  </a:txBody>
+                  <a:tcPr anchor="ctr">
+                    <a:lnL w="12700" cap="flat" cmpd="sng" algn="ctr">
+                      <a:solidFill>
+                        <a:schemeClr val="tx1">
+                          <a:lumMod val="75000"/>
+                          <a:lumOff val="25000"/>
+                        </a:schemeClr>
+                      </a:solidFill>
+                      <a:prstDash val="solid"/>
+                      <a:round/>
+                      <a:headEnd type="none" w="med" len="med"/>
+                      <a:tailEnd type="none" w="med" len="med"/>
+                    </a:lnL>
+                    <a:lnR w="12700" cap="flat" cmpd="sng" algn="ctr">
+                      <a:solidFill>
+                        <a:schemeClr val="tx1">
+                          <a:lumMod val="75000"/>
+                          <a:lumOff val="25000"/>
+                        </a:schemeClr>
+                      </a:solidFill>
+                      <a:prstDash val="solid"/>
+                      <a:round/>
+                      <a:headEnd type="none" w="med" len="med"/>
+                      <a:tailEnd type="none" w="med" len="med"/>
+                    </a:lnR>
+                    <a:lnT w="12700" cap="flat" cmpd="sng" algn="ctr">
+                      <a:solidFill>
+                        <a:schemeClr val="tx1">
+                          <a:lumMod val="75000"/>
+                          <a:lumOff val="25000"/>
+                        </a:schemeClr>
+                      </a:solidFill>
+                      <a:prstDash val="solid"/>
+                      <a:round/>
+                      <a:headEnd type="none" w="med" len="med"/>
+                      <a:tailEnd type="none" w="med" len="med"/>
+                    </a:lnT>
+                    <a:lnB w="12700" cap="flat" cmpd="sng" algn="ctr">
+                      <a:solidFill>
+                        <a:schemeClr val="tx1">
+                          <a:lumMod val="75000"/>
+                          <a:lumOff val="25000"/>
+                        </a:schemeClr>
+                      </a:solidFill>
+                      <a:prstDash val="solid"/>
+                      <a:round/>
+                      <a:headEnd type="none" w="med" len="med"/>
+                      <a:tailEnd type="none" w="med" len="med"/>
+                    </a:lnB>
+                    <a:noFill/>
+                  </a:tcPr>
+                </a:tc>
+                <a:tc>
+                  <a:txBody>
+                    <a:bodyPr/>
+                    <a:lstStyle/>
+                    <a:p>
+                      <a:pPr marL="0" marR="0" lvl="0" indent="0" algn="ctr" defTabSz="914400" rtl="0" eaLnBrk="1" fontAlgn="auto" latinLnBrk="0" hangingPunct="1">
+                        <a:lnSpc>
+                          <a:spcPct val="100000"/>
+                        </a:lnSpc>
+                        <a:spcBef>
+                          <a:spcPts val="0"/>
+                        </a:spcBef>
+                        <a:spcAft>
+                          <a:spcPts val="0"/>
+                        </a:spcAft>
+                        <a:buClrTx/>
+                        <a:buSzTx/>
+                        <a:buFontTx/>
+                        <a:buNone/>
+                        <a:tabLst/>
+                        <a:defRPr/>
+                      </a:pPr>
+                      <a:r>
+                        <a:rPr kumimoji="0" lang="en-US" sz="1800" b="0" i="0" u="none" strike="noStrike" kern="1200" cap="none" spc="0" normalizeH="0" baseline="0" noProof="0">
+                          <a:ln>
+                            <a:noFill/>
+                          </a:ln>
+                          <a:solidFill>
+                            <a:srgbClr val="000000">
+                              <a:lumMod val="75000"/>
+                              <a:lumOff val="25000"/>
+                            </a:srgbClr>
+                          </a:solidFill>
+                          <a:effectLst/>
+                          <a:uLnTx/>
+                          <a:uFillTx/>
+                          <a:latin typeface="Optima" panose="02000503060000020004" pitchFamily="2" charset="0"/>
+                          <a:ea typeface="+mn-ea"/>
+                          <a:cs typeface="+mn-cs"/>
+                        </a:rPr>
+                        <a:t>0</a:t>
+                      </a:r>
+                      <a:endParaRPr kumimoji="0" lang="en-US" sz="1800" b="0" i="0" u="none" strike="noStrike" kern="1200" cap="none" spc="0" normalizeH="0" baseline="0" noProof="0" dirty="0">
+                        <a:ln>
+                          <a:noFill/>
+                        </a:ln>
+                        <a:solidFill>
+                          <a:srgbClr val="000000">
+                            <a:lumMod val="75000"/>
+                            <a:lumOff val="25000"/>
+                          </a:srgbClr>
+                        </a:solidFill>
+                        <a:effectLst/>
+                        <a:uLnTx/>
+                        <a:uFillTx/>
+                        <a:latin typeface="Optima" panose="02000503060000020004" pitchFamily="2" charset="0"/>
+                        <a:ea typeface="+mn-ea"/>
+                        <a:cs typeface="+mn-cs"/>
+                      </a:endParaRPr>
+                    </a:p>
+                  </a:txBody>
+                  <a:tcPr anchor="ctr">
+                    <a:lnL w="12700" cap="flat" cmpd="sng" algn="ctr">
+                      <a:solidFill>
+                        <a:schemeClr val="tx1">
+                          <a:lumMod val="75000"/>
+                          <a:lumOff val="25000"/>
+                        </a:schemeClr>
+                      </a:solidFill>
+                      <a:prstDash val="solid"/>
+                      <a:round/>
+                      <a:headEnd type="none" w="med" len="med"/>
+                      <a:tailEnd type="none" w="med" len="med"/>
+                    </a:lnL>
+                    <a:lnR w="12700" cap="flat" cmpd="sng" algn="ctr">
+                      <a:solidFill>
+                        <a:schemeClr val="tx1">
+                          <a:lumMod val="75000"/>
+                          <a:lumOff val="25000"/>
+                        </a:schemeClr>
+                      </a:solidFill>
+                      <a:prstDash val="solid"/>
+                      <a:round/>
+                      <a:headEnd type="none" w="med" len="med"/>
+                      <a:tailEnd type="none" w="med" len="med"/>
+                    </a:lnR>
+                    <a:lnT w="12700" cap="flat" cmpd="sng" algn="ctr">
+                      <a:solidFill>
+                        <a:schemeClr val="tx1">
+                          <a:lumMod val="75000"/>
+                          <a:lumOff val="25000"/>
+                        </a:schemeClr>
+                      </a:solidFill>
+                      <a:prstDash val="solid"/>
+                      <a:round/>
+                      <a:headEnd type="none" w="med" len="med"/>
+                      <a:tailEnd type="none" w="med" len="med"/>
+                    </a:lnT>
+                    <a:lnB w="12700" cap="flat" cmpd="sng" algn="ctr">
+                      <a:solidFill>
+                        <a:schemeClr val="tx1">
+                          <a:lumMod val="75000"/>
+                          <a:lumOff val="25000"/>
+                        </a:schemeClr>
+                      </a:solidFill>
+                      <a:prstDash val="solid"/>
+                      <a:round/>
+                      <a:headEnd type="none" w="med" len="med"/>
+                      <a:tailEnd type="none" w="med" len="med"/>
+                    </a:lnB>
+                    <a:noFill/>
+                  </a:tcPr>
+                </a:tc>
+                <a:tc>
+                  <a:txBody>
+                    <a:bodyPr/>
+                    <a:lstStyle/>
+                    <a:p>
+                      <a:pPr marL="0" marR="0" lvl="0" indent="0" algn="ctr" defTabSz="914400" rtl="0" eaLnBrk="1" fontAlgn="auto" latinLnBrk="0" hangingPunct="1">
+                        <a:lnSpc>
+                          <a:spcPct val="100000"/>
+                        </a:lnSpc>
+                        <a:spcBef>
+                          <a:spcPts val="0"/>
+                        </a:spcBef>
+                        <a:spcAft>
+                          <a:spcPts val="0"/>
+                        </a:spcAft>
+                        <a:buClrTx/>
+                        <a:buSzTx/>
+                        <a:buFontTx/>
+                        <a:buNone/>
+                        <a:tabLst/>
+                        <a:defRPr/>
+                      </a:pPr>
+                      <a:r>
+                        <a:rPr kumimoji="0" lang="en-US" sz="1800" b="0" i="0" u="none" strike="noStrike" kern="1200" cap="none" spc="0" normalizeH="0" baseline="0" noProof="0">
+                          <a:ln>
+                            <a:noFill/>
+                          </a:ln>
+                          <a:solidFill>
+                            <a:srgbClr val="000000">
+                              <a:lumMod val="75000"/>
+                              <a:lumOff val="25000"/>
+                            </a:srgbClr>
+                          </a:solidFill>
+                          <a:effectLst/>
+                          <a:uLnTx/>
+                          <a:uFillTx/>
+                          <a:latin typeface="Optima" panose="02000503060000020004" pitchFamily="2" charset="0"/>
+                          <a:ea typeface="+mn-ea"/>
+                          <a:cs typeface="+mn-cs"/>
+                        </a:rPr>
+                        <a:t>0</a:t>
+                      </a:r>
+                      <a:endParaRPr kumimoji="0" lang="en-US" sz="1800" b="0" i="0" u="none" strike="noStrike" kern="1200" cap="none" spc="0" normalizeH="0" baseline="0" noProof="0" dirty="0">
+                        <a:ln>
+                          <a:noFill/>
+                        </a:ln>
+                        <a:solidFill>
+                          <a:srgbClr val="000000">
+                            <a:lumMod val="75000"/>
+                            <a:lumOff val="25000"/>
+                          </a:srgbClr>
+                        </a:solidFill>
+                        <a:effectLst/>
+                        <a:uLnTx/>
+                        <a:uFillTx/>
+                        <a:latin typeface="Optima" panose="02000503060000020004" pitchFamily="2" charset="0"/>
+                        <a:ea typeface="+mn-ea"/>
+                        <a:cs typeface="+mn-cs"/>
+                      </a:endParaRPr>
+                    </a:p>
+                  </a:txBody>
+                  <a:tcPr anchor="ctr">
+                    <a:lnL w="12700" cap="flat" cmpd="sng" algn="ctr">
+                      <a:solidFill>
+                        <a:schemeClr val="tx1">
+                          <a:lumMod val="75000"/>
+                          <a:lumOff val="25000"/>
+                        </a:schemeClr>
+                      </a:solidFill>
+                      <a:prstDash val="solid"/>
+                      <a:round/>
+                      <a:headEnd type="none" w="med" len="med"/>
+                      <a:tailEnd type="none" w="med" len="med"/>
+                    </a:lnL>
+                    <a:lnR w="12700" cap="flat" cmpd="sng" algn="ctr">
+                      <a:solidFill>
+                        <a:schemeClr val="tx1">
+                          <a:lumMod val="75000"/>
+                          <a:lumOff val="25000"/>
+                        </a:schemeClr>
+                      </a:solidFill>
+                      <a:prstDash val="solid"/>
+                      <a:round/>
+                      <a:headEnd type="none" w="med" len="med"/>
+                      <a:tailEnd type="none" w="med" len="med"/>
+                    </a:lnR>
+                    <a:lnT w="12700" cap="flat" cmpd="sng" algn="ctr">
+                      <a:solidFill>
+                        <a:schemeClr val="tx1">
+                          <a:lumMod val="75000"/>
+                          <a:lumOff val="25000"/>
+                        </a:schemeClr>
+                      </a:solidFill>
+                      <a:prstDash val="solid"/>
+                      <a:round/>
+                      <a:headEnd type="none" w="med" len="med"/>
+                      <a:tailEnd type="none" w="med" len="med"/>
+                    </a:lnT>
+                    <a:lnB w="12700" cap="flat" cmpd="sng" algn="ctr">
+                      <a:solidFill>
+                        <a:schemeClr val="tx1">
+                          <a:lumMod val="75000"/>
+                          <a:lumOff val="25000"/>
+                        </a:schemeClr>
+                      </a:solidFill>
+                      <a:prstDash val="solid"/>
+                      <a:round/>
+                      <a:headEnd type="none" w="med" len="med"/>
+                      <a:tailEnd type="none" w="med" len="med"/>
+                    </a:lnB>
+                    <a:noFill/>
+                  </a:tcPr>
+                </a:tc>
+                <a:extLst>
+                  <a:ext uri="{0D108BD9-81ED-4DB2-BD59-A6C34878D82A}">
+                    <a16:rowId xmlns:a16="http://schemas.microsoft.com/office/drawing/2014/main" val="1468387550"/>
+                  </a:ext>
+                </a:extLst>
+              </a:tr>
+              <a:tr h="731520">
+                <a:tc>
+                  <a:txBody>
+                    <a:bodyPr/>
+                    <a:lstStyle/>
+                    <a:p>
+                      <a:pPr marL="0" marR="0" lvl="0" indent="0" algn="ctr" defTabSz="914400" rtl="0" eaLnBrk="1" fontAlgn="auto" latinLnBrk="0" hangingPunct="1">
+                        <a:lnSpc>
+                          <a:spcPct val="100000"/>
+                        </a:lnSpc>
+                        <a:spcBef>
+                          <a:spcPts val="0"/>
+                        </a:spcBef>
+                        <a:spcAft>
+                          <a:spcPts val="0"/>
+                        </a:spcAft>
+                        <a:buClrTx/>
+                        <a:buSzTx/>
+                        <a:buFontTx/>
+                        <a:buNone/>
+                        <a:tabLst/>
+                        <a:defRPr/>
+                      </a:pPr>
+                      <a:r>
+                        <a:rPr kumimoji="0" lang="en-US" sz="1800" b="0" i="0" u="none" strike="noStrike" kern="1200" cap="none" spc="0" normalizeH="0" baseline="0" noProof="0">
+                          <a:ln>
+                            <a:noFill/>
+                          </a:ln>
+                          <a:solidFill>
+                            <a:srgbClr val="000000">
+                              <a:lumMod val="75000"/>
+                              <a:lumOff val="25000"/>
+                            </a:srgbClr>
+                          </a:solidFill>
+                          <a:effectLst/>
+                          <a:uLnTx/>
+                          <a:uFillTx/>
+                          <a:latin typeface="Optima" panose="02000503060000020004" pitchFamily="2" charset="0"/>
+                          <a:ea typeface="+mn-ea"/>
+                          <a:cs typeface="+mn-cs"/>
+                        </a:rPr>
+                        <a:t>0</a:t>
+                      </a:r>
+                      <a:endParaRPr kumimoji="0" lang="en-US" sz="1800" b="0" i="0" u="none" strike="noStrike" kern="1200" cap="none" spc="0" normalizeH="0" baseline="0" noProof="0" dirty="0">
+                        <a:ln>
+                          <a:noFill/>
+                        </a:ln>
+                        <a:solidFill>
+                          <a:srgbClr val="000000">
+                            <a:lumMod val="75000"/>
+                            <a:lumOff val="25000"/>
+                          </a:srgbClr>
+                        </a:solidFill>
+                        <a:effectLst/>
+                        <a:uLnTx/>
+                        <a:uFillTx/>
+                        <a:latin typeface="Optima" panose="02000503060000020004" pitchFamily="2" charset="0"/>
+                        <a:ea typeface="+mn-ea"/>
+                        <a:cs typeface="+mn-cs"/>
+                      </a:endParaRPr>
+                    </a:p>
+                  </a:txBody>
+                  <a:tcPr anchor="ctr">
+                    <a:lnL w="12700" cap="flat" cmpd="sng" algn="ctr">
+                      <a:solidFill>
+                        <a:schemeClr val="tx1">
+                          <a:lumMod val="75000"/>
+                          <a:lumOff val="25000"/>
+                        </a:schemeClr>
+                      </a:solidFill>
+                      <a:prstDash val="solid"/>
+                      <a:round/>
+                      <a:headEnd type="none" w="med" len="med"/>
+                      <a:tailEnd type="none" w="med" len="med"/>
+                    </a:lnL>
+                    <a:lnR w="12700" cap="flat" cmpd="sng" algn="ctr">
+                      <a:solidFill>
+                        <a:schemeClr val="tx1">
+                          <a:lumMod val="75000"/>
+                          <a:lumOff val="25000"/>
+                        </a:schemeClr>
+                      </a:solidFill>
+                      <a:prstDash val="solid"/>
+                      <a:round/>
+                      <a:headEnd type="none" w="med" len="med"/>
+                      <a:tailEnd type="none" w="med" len="med"/>
+                    </a:lnR>
+                    <a:lnT w="12700" cap="flat" cmpd="sng" algn="ctr">
+                      <a:solidFill>
+                        <a:schemeClr val="tx1">
+                          <a:lumMod val="75000"/>
+                          <a:lumOff val="25000"/>
+                        </a:schemeClr>
+                      </a:solidFill>
+                      <a:prstDash val="solid"/>
+                      <a:round/>
+                      <a:headEnd type="none" w="med" len="med"/>
+                      <a:tailEnd type="none" w="med" len="med"/>
+                    </a:lnT>
+                    <a:lnB w="12700" cap="flat" cmpd="sng" algn="ctr">
+                      <a:solidFill>
+                        <a:schemeClr val="tx1">
+                          <a:lumMod val="75000"/>
+                          <a:lumOff val="25000"/>
+                        </a:schemeClr>
+                      </a:solidFill>
+                      <a:prstDash val="solid"/>
+                      <a:round/>
+                      <a:headEnd type="none" w="med" len="med"/>
+                      <a:tailEnd type="none" w="med" len="med"/>
+                    </a:lnB>
+                    <a:noFill/>
+                  </a:tcPr>
+                </a:tc>
+                <a:tc>
+                  <a:txBody>
+                    <a:bodyPr/>
+                    <a:lstStyle/>
+                    <a:p>
+                      <a:pPr marL="0" marR="0" lvl="0" indent="0" algn="ctr" defTabSz="914400" rtl="0" eaLnBrk="1" fontAlgn="auto" latinLnBrk="0" hangingPunct="1">
+                        <a:lnSpc>
+                          <a:spcPct val="100000"/>
+                        </a:lnSpc>
+                        <a:spcBef>
+                          <a:spcPts val="0"/>
+                        </a:spcBef>
+                        <a:spcAft>
+                          <a:spcPts val="0"/>
+                        </a:spcAft>
+                        <a:buClrTx/>
+                        <a:buSzTx/>
+                        <a:buFontTx/>
+                        <a:buNone/>
+                        <a:tabLst/>
+                        <a:defRPr/>
+                      </a:pPr>
+                      <a:r>
+                        <a:rPr kumimoji="0" lang="en-US" sz="1800" b="0" i="0" u="none" strike="noStrike" kern="1200" cap="none" spc="0" normalizeH="0" baseline="0" noProof="0" dirty="0">
+                          <a:ln>
+                            <a:noFill/>
+                          </a:ln>
+                          <a:solidFill>
+                            <a:srgbClr val="000000">
+                              <a:lumMod val="75000"/>
+                              <a:lumOff val="25000"/>
+                            </a:srgbClr>
+                          </a:solidFill>
+                          <a:effectLst/>
+                          <a:uLnTx/>
+                          <a:uFillTx/>
+                          <a:latin typeface="Optima" panose="02000503060000020004" pitchFamily="2" charset="0"/>
+                          <a:ea typeface="+mn-ea"/>
+                          <a:cs typeface="+mn-cs"/>
+                        </a:rPr>
+                        <a:t>.01</a:t>
+                      </a:r>
+                    </a:p>
+                  </a:txBody>
+                  <a:tcPr anchor="ctr">
+                    <a:lnL w="12700" cap="flat" cmpd="sng" algn="ctr">
+                      <a:solidFill>
+                        <a:schemeClr val="tx1">
+                          <a:lumMod val="75000"/>
+                          <a:lumOff val="25000"/>
+                        </a:schemeClr>
+                      </a:solidFill>
+                      <a:prstDash val="solid"/>
+                      <a:round/>
+                      <a:headEnd type="none" w="med" len="med"/>
+                      <a:tailEnd type="none" w="med" len="med"/>
+                    </a:lnL>
+                    <a:lnR w="12700" cap="flat" cmpd="sng" algn="ctr">
+                      <a:solidFill>
+                        <a:schemeClr val="tx1">
+                          <a:lumMod val="75000"/>
+                          <a:lumOff val="25000"/>
+                        </a:schemeClr>
+                      </a:solidFill>
+                      <a:prstDash val="solid"/>
+                      <a:round/>
+                      <a:headEnd type="none" w="med" len="med"/>
+                      <a:tailEnd type="none" w="med" len="med"/>
+                    </a:lnR>
+                    <a:lnT w="12700" cap="flat" cmpd="sng" algn="ctr">
+                      <a:solidFill>
+                        <a:schemeClr val="tx1">
+                          <a:lumMod val="75000"/>
+                          <a:lumOff val="25000"/>
+                        </a:schemeClr>
+                      </a:solidFill>
+                      <a:prstDash val="solid"/>
+                      <a:round/>
+                      <a:headEnd type="none" w="med" len="med"/>
+                      <a:tailEnd type="none" w="med" len="med"/>
+                    </a:lnT>
+                    <a:lnB w="12700" cap="flat" cmpd="sng" algn="ctr">
+                      <a:solidFill>
+                        <a:schemeClr val="tx1">
+                          <a:lumMod val="75000"/>
+                          <a:lumOff val="25000"/>
+                        </a:schemeClr>
+                      </a:solidFill>
+                      <a:prstDash val="solid"/>
+                      <a:round/>
+                      <a:headEnd type="none" w="med" len="med"/>
+                      <a:tailEnd type="none" w="med" len="med"/>
+                    </a:lnB>
+                    <a:noFill/>
+                  </a:tcPr>
+                </a:tc>
+                <a:tc>
+                  <a:txBody>
+                    <a:bodyPr/>
+                    <a:lstStyle/>
+                    <a:p>
+                      <a:pPr marL="0" marR="0" lvl="0" indent="0" algn="ctr" defTabSz="914400" rtl="0" eaLnBrk="1" fontAlgn="auto" latinLnBrk="0" hangingPunct="1">
+                        <a:lnSpc>
+                          <a:spcPct val="100000"/>
+                        </a:lnSpc>
+                        <a:spcBef>
+                          <a:spcPts val="0"/>
+                        </a:spcBef>
+                        <a:spcAft>
+                          <a:spcPts val="0"/>
+                        </a:spcAft>
+                        <a:buClrTx/>
+                        <a:buSzTx/>
+                        <a:buFontTx/>
+                        <a:buNone/>
+                        <a:tabLst/>
+                        <a:defRPr/>
+                      </a:pPr>
+                      <a:r>
+                        <a:rPr kumimoji="0" lang="en-US" sz="1800" b="0" i="0" u="none" strike="noStrike" kern="1200" cap="none" spc="0" normalizeH="0" baseline="0" noProof="0" dirty="0">
+                          <a:ln>
+                            <a:noFill/>
+                          </a:ln>
+                          <a:solidFill>
+                            <a:srgbClr val="000000">
+                              <a:lumMod val="75000"/>
+                              <a:lumOff val="25000"/>
+                            </a:srgbClr>
+                          </a:solidFill>
+                          <a:effectLst/>
+                          <a:uLnTx/>
+                          <a:uFillTx/>
+                          <a:latin typeface="Optima" panose="02000503060000020004" pitchFamily="2" charset="0"/>
+                          <a:ea typeface="+mn-ea"/>
+                          <a:cs typeface="+mn-cs"/>
+                        </a:rPr>
+                        <a:t>.04</a:t>
+                      </a:r>
+                    </a:p>
+                  </a:txBody>
+                  <a:tcPr anchor="ctr">
+                    <a:lnL w="12700" cap="flat" cmpd="sng" algn="ctr">
+                      <a:solidFill>
+                        <a:schemeClr val="tx1">
+                          <a:lumMod val="75000"/>
+                          <a:lumOff val="25000"/>
+                        </a:schemeClr>
+                      </a:solidFill>
+                      <a:prstDash val="solid"/>
+                      <a:round/>
+                      <a:headEnd type="none" w="med" len="med"/>
+                      <a:tailEnd type="none" w="med" len="med"/>
+                    </a:lnL>
+                    <a:lnR w="12700" cap="flat" cmpd="sng" algn="ctr">
+                      <a:solidFill>
+                        <a:schemeClr val="tx1">
+                          <a:lumMod val="75000"/>
+                          <a:lumOff val="25000"/>
+                        </a:schemeClr>
+                      </a:solidFill>
+                      <a:prstDash val="solid"/>
+                      <a:round/>
+                      <a:headEnd type="none" w="med" len="med"/>
+                      <a:tailEnd type="none" w="med" len="med"/>
+                    </a:lnR>
+                    <a:lnT w="12700" cap="flat" cmpd="sng" algn="ctr">
+                      <a:solidFill>
+                        <a:schemeClr val="tx1">
+                          <a:lumMod val="75000"/>
+                          <a:lumOff val="25000"/>
+                        </a:schemeClr>
+                      </a:solidFill>
+                      <a:prstDash val="solid"/>
+                      <a:round/>
+                      <a:headEnd type="none" w="med" len="med"/>
+                      <a:tailEnd type="none" w="med" len="med"/>
+                    </a:lnT>
+                    <a:lnB w="12700" cap="flat" cmpd="sng" algn="ctr">
+                      <a:solidFill>
+                        <a:schemeClr val="tx1">
+                          <a:lumMod val="75000"/>
+                          <a:lumOff val="25000"/>
+                        </a:schemeClr>
+                      </a:solidFill>
+                      <a:prstDash val="solid"/>
+                      <a:round/>
+                      <a:headEnd type="none" w="med" len="med"/>
+                      <a:tailEnd type="none" w="med" len="med"/>
+                    </a:lnB>
+                    <a:noFill/>
+                  </a:tcPr>
+                </a:tc>
+                <a:tc>
+                  <a:txBody>
+                    <a:bodyPr/>
+                    <a:lstStyle/>
+                    <a:p>
+                      <a:pPr marL="0" marR="0" lvl="0" indent="0" algn="ctr" defTabSz="914400" rtl="0" eaLnBrk="1" fontAlgn="auto" latinLnBrk="0" hangingPunct="1">
+                        <a:lnSpc>
+                          <a:spcPct val="100000"/>
+                        </a:lnSpc>
+                        <a:spcBef>
+                          <a:spcPts val="0"/>
+                        </a:spcBef>
+                        <a:spcAft>
+                          <a:spcPts val="0"/>
+                        </a:spcAft>
+                        <a:buClrTx/>
+                        <a:buSzTx/>
+                        <a:buFontTx/>
+                        <a:buNone/>
+                        <a:tabLst/>
+                        <a:defRPr/>
+                      </a:pPr>
+                      <a:r>
+                        <a:rPr kumimoji="0" lang="en-US" sz="1800" b="0" i="0" u="none" strike="noStrike" kern="1200" cap="none" spc="0" normalizeH="0" baseline="0" noProof="0" dirty="0">
+                          <a:ln>
+                            <a:noFill/>
+                          </a:ln>
+                          <a:solidFill>
+                            <a:srgbClr val="000000">
+                              <a:lumMod val="75000"/>
+                              <a:lumOff val="25000"/>
+                            </a:srgbClr>
+                          </a:solidFill>
+                          <a:effectLst/>
+                          <a:uLnTx/>
+                          <a:uFillTx/>
+                          <a:latin typeface="Optima" panose="02000503060000020004" pitchFamily="2" charset="0"/>
+                          <a:ea typeface="+mn-ea"/>
+                          <a:cs typeface="+mn-cs"/>
+                        </a:rPr>
+                        <a:t>.01</a:t>
+                      </a:r>
+                    </a:p>
+                  </a:txBody>
+                  <a:tcPr anchor="ctr">
+                    <a:lnL w="12700" cap="flat" cmpd="sng" algn="ctr">
+                      <a:solidFill>
+                        <a:schemeClr val="tx1">
+                          <a:lumMod val="75000"/>
+                          <a:lumOff val="25000"/>
+                        </a:schemeClr>
+                      </a:solidFill>
+                      <a:prstDash val="solid"/>
+                      <a:round/>
+                      <a:headEnd type="none" w="med" len="med"/>
+                      <a:tailEnd type="none" w="med" len="med"/>
+                    </a:lnL>
+                    <a:lnR w="12700" cap="flat" cmpd="sng" algn="ctr">
+                      <a:solidFill>
+                        <a:schemeClr val="tx1">
+                          <a:lumMod val="75000"/>
+                          <a:lumOff val="25000"/>
+                        </a:schemeClr>
+                      </a:solidFill>
+                      <a:prstDash val="solid"/>
+                      <a:round/>
+                      <a:headEnd type="none" w="med" len="med"/>
+                      <a:tailEnd type="none" w="med" len="med"/>
+                    </a:lnR>
+                    <a:lnT w="12700" cap="flat" cmpd="sng" algn="ctr">
+                      <a:solidFill>
+                        <a:schemeClr val="tx1">
+                          <a:lumMod val="75000"/>
+                          <a:lumOff val="25000"/>
+                        </a:schemeClr>
+                      </a:solidFill>
+                      <a:prstDash val="solid"/>
+                      <a:round/>
+                      <a:headEnd type="none" w="med" len="med"/>
+                      <a:tailEnd type="none" w="med" len="med"/>
+                    </a:lnT>
+                    <a:lnB w="12700" cap="flat" cmpd="sng" algn="ctr">
+                      <a:solidFill>
+                        <a:schemeClr val="tx1">
+                          <a:lumMod val="75000"/>
+                          <a:lumOff val="25000"/>
+                        </a:schemeClr>
+                      </a:solidFill>
+                      <a:prstDash val="solid"/>
+                      <a:round/>
+                      <a:headEnd type="none" w="med" len="med"/>
+                      <a:tailEnd type="none" w="med" len="med"/>
+                    </a:lnB>
+                    <a:noFill/>
+                  </a:tcPr>
+                </a:tc>
+                <a:tc>
+                  <a:txBody>
+                    <a:bodyPr/>
+                    <a:lstStyle/>
+                    <a:p>
+                      <a:pPr marL="0" marR="0" lvl="0" indent="0" algn="ctr" defTabSz="914400" rtl="0" eaLnBrk="1" fontAlgn="auto" latinLnBrk="0" hangingPunct="1">
+                        <a:lnSpc>
+                          <a:spcPct val="100000"/>
+                        </a:lnSpc>
+                        <a:spcBef>
+                          <a:spcPts val="0"/>
+                        </a:spcBef>
+                        <a:spcAft>
+                          <a:spcPts val="0"/>
+                        </a:spcAft>
+                        <a:buClrTx/>
+                        <a:buSzTx/>
+                        <a:buFontTx/>
+                        <a:buNone/>
+                        <a:tabLst/>
+                        <a:defRPr/>
+                      </a:pPr>
+                      <a:r>
+                        <a:rPr kumimoji="0" lang="en-US" sz="1800" b="0" i="0" u="none" strike="noStrike" kern="1200" cap="none" spc="0" normalizeH="0" baseline="0" noProof="0">
+                          <a:ln>
+                            <a:noFill/>
+                          </a:ln>
+                          <a:solidFill>
+                            <a:srgbClr val="000000">
+                              <a:lumMod val="75000"/>
+                              <a:lumOff val="25000"/>
+                            </a:srgbClr>
+                          </a:solidFill>
+                          <a:effectLst/>
+                          <a:uLnTx/>
+                          <a:uFillTx/>
+                          <a:latin typeface="Optima" panose="02000503060000020004" pitchFamily="2" charset="0"/>
+                          <a:ea typeface="+mn-ea"/>
+                          <a:cs typeface="+mn-cs"/>
+                        </a:rPr>
+                        <a:t>0</a:t>
+                      </a:r>
+                      <a:endParaRPr kumimoji="0" lang="en-US" sz="1800" b="0" i="0" u="none" strike="noStrike" kern="1200" cap="none" spc="0" normalizeH="0" baseline="0" noProof="0" dirty="0">
+                        <a:ln>
+                          <a:noFill/>
+                        </a:ln>
+                        <a:solidFill>
+                          <a:srgbClr val="000000">
+                            <a:lumMod val="75000"/>
+                            <a:lumOff val="25000"/>
+                          </a:srgbClr>
+                        </a:solidFill>
+                        <a:effectLst/>
+                        <a:uLnTx/>
+                        <a:uFillTx/>
+                        <a:latin typeface="Optima" panose="02000503060000020004" pitchFamily="2" charset="0"/>
+                        <a:ea typeface="+mn-ea"/>
+                        <a:cs typeface="+mn-cs"/>
+                      </a:endParaRPr>
+                    </a:p>
+                  </a:txBody>
+                  <a:tcPr anchor="ctr">
+                    <a:lnL w="12700" cap="flat" cmpd="sng" algn="ctr">
+                      <a:solidFill>
+                        <a:schemeClr val="tx1">
+                          <a:lumMod val="75000"/>
+                          <a:lumOff val="25000"/>
+                        </a:schemeClr>
+                      </a:solidFill>
+                      <a:prstDash val="solid"/>
+                      <a:round/>
+                      <a:headEnd type="none" w="med" len="med"/>
+                      <a:tailEnd type="none" w="med" len="med"/>
+                    </a:lnL>
+                    <a:lnR w="12700" cap="flat" cmpd="sng" algn="ctr">
+                      <a:solidFill>
+                        <a:schemeClr val="tx1">
+                          <a:lumMod val="75000"/>
+                          <a:lumOff val="25000"/>
+                        </a:schemeClr>
+                      </a:solidFill>
+                      <a:prstDash val="solid"/>
+                      <a:round/>
+                      <a:headEnd type="none" w="med" len="med"/>
+                      <a:tailEnd type="none" w="med" len="med"/>
+                    </a:lnR>
+                    <a:lnT w="12700" cap="flat" cmpd="sng" algn="ctr">
+                      <a:solidFill>
+                        <a:schemeClr val="tx1">
+                          <a:lumMod val="75000"/>
+                          <a:lumOff val="25000"/>
+                        </a:schemeClr>
+                      </a:solidFill>
+                      <a:prstDash val="solid"/>
+                      <a:round/>
+                      <a:headEnd type="none" w="med" len="med"/>
+                      <a:tailEnd type="none" w="med" len="med"/>
+                    </a:lnT>
+                    <a:lnB w="12700" cap="flat" cmpd="sng" algn="ctr">
+                      <a:solidFill>
+                        <a:schemeClr val="tx1">
+                          <a:lumMod val="75000"/>
+                          <a:lumOff val="25000"/>
+                        </a:schemeClr>
+                      </a:solidFill>
+                      <a:prstDash val="solid"/>
+                      <a:round/>
+                      <a:headEnd type="none" w="med" len="med"/>
+                      <a:tailEnd type="none" w="med" len="med"/>
+                    </a:lnB>
+                    <a:noFill/>
+                  </a:tcPr>
+                </a:tc>
+                <a:extLst>
+                  <a:ext uri="{0D108BD9-81ED-4DB2-BD59-A6C34878D82A}">
+                    <a16:rowId xmlns:a16="http://schemas.microsoft.com/office/drawing/2014/main" val="689475947"/>
+                  </a:ext>
+                </a:extLst>
+              </a:tr>
+              <a:tr h="731520">
+                <a:tc>
+                  <a:txBody>
+                    <a:bodyPr/>
+                    <a:lstStyle/>
+                    <a:p>
+                      <a:pPr marL="0" marR="0" lvl="0" indent="0" algn="ctr" defTabSz="914400" rtl="0" eaLnBrk="1" fontAlgn="auto" latinLnBrk="0" hangingPunct="1">
+                        <a:lnSpc>
+                          <a:spcPct val="100000"/>
+                        </a:lnSpc>
+                        <a:spcBef>
+                          <a:spcPts val="0"/>
+                        </a:spcBef>
+                        <a:spcAft>
+                          <a:spcPts val="0"/>
+                        </a:spcAft>
+                        <a:buClrTx/>
+                        <a:buSzTx/>
+                        <a:buFontTx/>
+                        <a:buNone/>
+                        <a:tabLst/>
+                        <a:defRPr/>
+                      </a:pPr>
+                      <a:r>
+                        <a:rPr kumimoji="0" lang="en-US" sz="1800" b="0" i="0" u="none" strike="noStrike" kern="1200" cap="none" spc="0" normalizeH="0" baseline="0" noProof="0">
+                          <a:ln>
+                            <a:noFill/>
+                          </a:ln>
+                          <a:solidFill>
+                            <a:srgbClr val="000000">
+                              <a:lumMod val="75000"/>
+                              <a:lumOff val="25000"/>
+                            </a:srgbClr>
+                          </a:solidFill>
+                          <a:effectLst/>
+                          <a:uLnTx/>
+                          <a:uFillTx/>
+                          <a:latin typeface="Optima" panose="02000503060000020004" pitchFamily="2" charset="0"/>
+                          <a:ea typeface="+mn-ea"/>
+                          <a:cs typeface="+mn-cs"/>
+                        </a:rPr>
+                        <a:t>0</a:t>
+                      </a:r>
+                      <a:endParaRPr kumimoji="0" lang="en-US" sz="1800" b="0" i="0" u="none" strike="noStrike" kern="1200" cap="none" spc="0" normalizeH="0" baseline="0" noProof="0" dirty="0">
+                        <a:ln>
+                          <a:noFill/>
+                        </a:ln>
+                        <a:solidFill>
+                          <a:srgbClr val="000000">
+                            <a:lumMod val="75000"/>
+                            <a:lumOff val="25000"/>
+                          </a:srgbClr>
+                        </a:solidFill>
+                        <a:effectLst/>
+                        <a:uLnTx/>
+                        <a:uFillTx/>
+                        <a:latin typeface="Optima" panose="02000503060000020004" pitchFamily="2" charset="0"/>
+                        <a:ea typeface="+mn-ea"/>
+                        <a:cs typeface="+mn-cs"/>
+                      </a:endParaRPr>
+                    </a:p>
+                  </a:txBody>
+                  <a:tcPr anchor="ctr">
+                    <a:lnL w="12700" cap="flat" cmpd="sng" algn="ctr">
+                      <a:solidFill>
+                        <a:schemeClr val="tx1">
+                          <a:lumMod val="75000"/>
+                          <a:lumOff val="25000"/>
+                        </a:schemeClr>
+                      </a:solidFill>
+                      <a:prstDash val="solid"/>
+                      <a:round/>
+                      <a:headEnd type="none" w="med" len="med"/>
+                      <a:tailEnd type="none" w="med" len="med"/>
+                    </a:lnL>
+                    <a:lnR w="12700" cap="flat" cmpd="sng" algn="ctr">
+                      <a:solidFill>
+                        <a:schemeClr val="tx1">
+                          <a:lumMod val="75000"/>
+                          <a:lumOff val="25000"/>
+                        </a:schemeClr>
+                      </a:solidFill>
+                      <a:prstDash val="solid"/>
+                      <a:round/>
+                      <a:headEnd type="none" w="med" len="med"/>
+                      <a:tailEnd type="none" w="med" len="med"/>
+                    </a:lnR>
+                    <a:lnT w="12700" cap="flat" cmpd="sng" algn="ctr">
+                      <a:solidFill>
+                        <a:schemeClr val="tx1">
+                          <a:lumMod val="75000"/>
+                          <a:lumOff val="25000"/>
+                        </a:schemeClr>
+                      </a:solidFill>
+                      <a:prstDash val="solid"/>
+                      <a:round/>
+                      <a:headEnd type="none" w="med" len="med"/>
+                      <a:tailEnd type="none" w="med" len="med"/>
+                    </a:lnT>
+                    <a:lnB w="12700" cap="flat" cmpd="sng" algn="ctr">
+                      <a:solidFill>
+                        <a:schemeClr val="tx1">
+                          <a:lumMod val="75000"/>
+                          <a:lumOff val="25000"/>
+                        </a:schemeClr>
+                      </a:solidFill>
+                      <a:prstDash val="solid"/>
+                      <a:round/>
+                      <a:headEnd type="none" w="med" len="med"/>
+                      <a:tailEnd type="none" w="med" len="med"/>
+                    </a:lnB>
+                    <a:noFill/>
+                  </a:tcPr>
+                </a:tc>
+                <a:tc>
+                  <a:txBody>
+                    <a:bodyPr/>
+                    <a:lstStyle/>
+                    <a:p>
+                      <a:pPr marL="0" marR="0" lvl="0" indent="0" algn="ctr" defTabSz="914400" rtl="0" eaLnBrk="1" fontAlgn="auto" latinLnBrk="0" hangingPunct="1">
+                        <a:lnSpc>
+                          <a:spcPct val="100000"/>
+                        </a:lnSpc>
+                        <a:spcBef>
+                          <a:spcPts val="0"/>
+                        </a:spcBef>
+                        <a:spcAft>
+                          <a:spcPts val="0"/>
+                        </a:spcAft>
+                        <a:buClrTx/>
+                        <a:buSzTx/>
+                        <a:buFontTx/>
+                        <a:buNone/>
+                        <a:tabLst/>
+                        <a:defRPr/>
+                      </a:pPr>
+                      <a:r>
+                        <a:rPr kumimoji="0" lang="en-US" sz="1800" b="0" i="0" u="none" strike="noStrike" kern="1200" cap="none" spc="0" normalizeH="0" baseline="0" noProof="0" dirty="0">
+                          <a:ln>
+                            <a:noFill/>
+                          </a:ln>
+                          <a:solidFill>
+                            <a:srgbClr val="000000">
+                              <a:lumMod val="75000"/>
+                              <a:lumOff val="25000"/>
+                            </a:srgbClr>
+                          </a:solidFill>
+                          <a:effectLst/>
+                          <a:uLnTx/>
+                          <a:uFillTx/>
+                          <a:latin typeface="Optima" panose="02000503060000020004" pitchFamily="2" charset="0"/>
+                          <a:ea typeface="+mn-ea"/>
+                          <a:cs typeface="+mn-cs"/>
+                        </a:rPr>
+                        <a:t>.04</a:t>
+                      </a:r>
+                    </a:p>
+                  </a:txBody>
+                  <a:tcPr anchor="ctr">
+                    <a:lnL w="12700" cap="flat" cmpd="sng" algn="ctr">
+                      <a:solidFill>
+                        <a:schemeClr val="tx1">
+                          <a:lumMod val="75000"/>
+                          <a:lumOff val="25000"/>
+                        </a:schemeClr>
+                      </a:solidFill>
+                      <a:prstDash val="solid"/>
+                      <a:round/>
+                      <a:headEnd type="none" w="med" len="med"/>
+                      <a:tailEnd type="none" w="med" len="med"/>
+                    </a:lnL>
+                    <a:lnR w="12700" cap="flat" cmpd="sng" algn="ctr">
+                      <a:solidFill>
+                        <a:schemeClr val="tx1">
+                          <a:lumMod val="75000"/>
+                          <a:lumOff val="25000"/>
+                        </a:schemeClr>
+                      </a:solidFill>
+                      <a:prstDash val="solid"/>
+                      <a:round/>
+                      <a:headEnd type="none" w="med" len="med"/>
+                      <a:tailEnd type="none" w="med" len="med"/>
+                    </a:lnR>
+                    <a:lnT w="12700" cap="flat" cmpd="sng" algn="ctr">
+                      <a:solidFill>
+                        <a:schemeClr val="tx1">
+                          <a:lumMod val="75000"/>
+                          <a:lumOff val="25000"/>
+                        </a:schemeClr>
+                      </a:solidFill>
+                      <a:prstDash val="solid"/>
+                      <a:round/>
+                      <a:headEnd type="none" w="med" len="med"/>
+                      <a:tailEnd type="none" w="med" len="med"/>
+                    </a:lnT>
+                    <a:lnB w="12700" cap="flat" cmpd="sng" algn="ctr">
+                      <a:solidFill>
+                        <a:schemeClr val="tx1">
+                          <a:lumMod val="75000"/>
+                          <a:lumOff val="25000"/>
+                        </a:schemeClr>
+                      </a:solidFill>
+                      <a:prstDash val="solid"/>
+                      <a:round/>
+                      <a:headEnd type="none" w="med" len="med"/>
+                      <a:tailEnd type="none" w="med" len="med"/>
+                    </a:lnB>
+                    <a:noFill/>
+                  </a:tcPr>
+                </a:tc>
+                <a:tc>
+                  <a:txBody>
+                    <a:bodyPr/>
+                    <a:lstStyle/>
+                    <a:p>
+                      <a:pPr marL="0" marR="0" lvl="0" indent="0" algn="ctr" defTabSz="914400" rtl="0" eaLnBrk="1" fontAlgn="auto" latinLnBrk="0" hangingPunct="1">
+                        <a:lnSpc>
+                          <a:spcPct val="100000"/>
+                        </a:lnSpc>
+                        <a:spcBef>
+                          <a:spcPts val="0"/>
+                        </a:spcBef>
+                        <a:spcAft>
+                          <a:spcPts val="0"/>
+                        </a:spcAft>
+                        <a:buClrTx/>
+                        <a:buSzTx/>
+                        <a:buFontTx/>
+                        <a:buNone/>
+                        <a:tabLst/>
+                        <a:defRPr/>
+                      </a:pPr>
+                      <a:r>
+                        <a:rPr kumimoji="0" lang="en-US" sz="1800" b="0" i="0" u="none" strike="noStrike" kern="1200" cap="none" spc="0" normalizeH="0" baseline="0" noProof="0" dirty="0">
+                          <a:ln>
+                            <a:noFill/>
+                          </a:ln>
+                          <a:solidFill>
+                            <a:srgbClr val="000000">
+                              <a:lumMod val="75000"/>
+                              <a:lumOff val="25000"/>
+                            </a:srgbClr>
+                          </a:solidFill>
+                          <a:effectLst/>
+                          <a:uLnTx/>
+                          <a:uFillTx/>
+                          <a:latin typeface="Optima" panose="02000503060000020004" pitchFamily="2" charset="0"/>
+                          <a:ea typeface="+mn-ea"/>
+                          <a:cs typeface="+mn-cs"/>
+                        </a:rPr>
+                        <a:t>.8</a:t>
+                      </a:r>
+                    </a:p>
+                  </a:txBody>
+                  <a:tcPr anchor="ctr">
+                    <a:lnL w="12700" cap="flat" cmpd="sng" algn="ctr">
+                      <a:solidFill>
+                        <a:schemeClr val="tx1">
+                          <a:lumMod val="75000"/>
+                          <a:lumOff val="25000"/>
+                        </a:schemeClr>
+                      </a:solidFill>
+                      <a:prstDash val="solid"/>
+                      <a:round/>
+                      <a:headEnd type="none" w="med" len="med"/>
+                      <a:tailEnd type="none" w="med" len="med"/>
+                    </a:lnL>
+                    <a:lnR w="12700" cap="flat" cmpd="sng" algn="ctr">
+                      <a:solidFill>
+                        <a:schemeClr val="tx1">
+                          <a:lumMod val="75000"/>
+                          <a:lumOff val="25000"/>
+                        </a:schemeClr>
+                      </a:solidFill>
+                      <a:prstDash val="solid"/>
+                      <a:round/>
+                      <a:headEnd type="none" w="med" len="med"/>
+                      <a:tailEnd type="none" w="med" len="med"/>
+                    </a:lnR>
+                    <a:lnT w="12700" cap="flat" cmpd="sng" algn="ctr">
+                      <a:solidFill>
+                        <a:schemeClr val="tx1">
+                          <a:lumMod val="75000"/>
+                          <a:lumOff val="25000"/>
+                        </a:schemeClr>
+                      </a:solidFill>
+                      <a:prstDash val="solid"/>
+                      <a:round/>
+                      <a:headEnd type="none" w="med" len="med"/>
+                      <a:tailEnd type="none" w="med" len="med"/>
+                    </a:lnT>
+                    <a:lnB w="12700" cap="flat" cmpd="sng" algn="ctr">
+                      <a:solidFill>
+                        <a:schemeClr val="tx1">
+                          <a:lumMod val="75000"/>
+                          <a:lumOff val="25000"/>
+                        </a:schemeClr>
+                      </a:solidFill>
+                      <a:prstDash val="solid"/>
+                      <a:round/>
+                      <a:headEnd type="none" w="med" len="med"/>
+                      <a:tailEnd type="none" w="med" len="med"/>
+                    </a:lnB>
+                    <a:noFill/>
+                  </a:tcPr>
+                </a:tc>
+                <a:tc>
+                  <a:txBody>
+                    <a:bodyPr/>
+                    <a:lstStyle/>
+                    <a:p>
+                      <a:pPr marL="0" marR="0" lvl="0" indent="0" algn="ctr" defTabSz="914400" rtl="0" eaLnBrk="1" fontAlgn="auto" latinLnBrk="0" hangingPunct="1">
+                        <a:lnSpc>
+                          <a:spcPct val="100000"/>
+                        </a:lnSpc>
+                        <a:spcBef>
+                          <a:spcPts val="0"/>
+                        </a:spcBef>
+                        <a:spcAft>
+                          <a:spcPts val="0"/>
+                        </a:spcAft>
+                        <a:buClrTx/>
+                        <a:buSzTx/>
+                        <a:buFontTx/>
+                        <a:buNone/>
+                        <a:tabLst/>
+                        <a:defRPr/>
+                      </a:pPr>
+                      <a:r>
+                        <a:rPr kumimoji="0" lang="en-US" sz="1800" b="0" i="0" u="none" strike="noStrike" kern="1200" cap="none" spc="0" normalizeH="0" baseline="0" noProof="0" dirty="0">
+                          <a:ln>
+                            <a:noFill/>
+                          </a:ln>
+                          <a:solidFill>
+                            <a:srgbClr val="000000">
+                              <a:lumMod val="75000"/>
+                              <a:lumOff val="25000"/>
+                            </a:srgbClr>
+                          </a:solidFill>
+                          <a:effectLst/>
+                          <a:uLnTx/>
+                          <a:uFillTx/>
+                          <a:latin typeface="Optima" panose="02000503060000020004" pitchFamily="2" charset="0"/>
+                          <a:ea typeface="+mn-ea"/>
+                          <a:cs typeface="+mn-cs"/>
+                        </a:rPr>
+                        <a:t>.04</a:t>
+                      </a:r>
+                    </a:p>
+                  </a:txBody>
+                  <a:tcPr anchor="ctr">
+                    <a:lnL w="12700" cap="flat" cmpd="sng" algn="ctr">
+                      <a:solidFill>
+                        <a:schemeClr val="tx1">
+                          <a:lumMod val="75000"/>
+                          <a:lumOff val="25000"/>
+                        </a:schemeClr>
+                      </a:solidFill>
+                      <a:prstDash val="solid"/>
+                      <a:round/>
+                      <a:headEnd type="none" w="med" len="med"/>
+                      <a:tailEnd type="none" w="med" len="med"/>
+                    </a:lnL>
+                    <a:lnR w="12700" cap="flat" cmpd="sng" algn="ctr">
+                      <a:solidFill>
+                        <a:schemeClr val="tx1">
+                          <a:lumMod val="75000"/>
+                          <a:lumOff val="25000"/>
+                        </a:schemeClr>
+                      </a:solidFill>
+                      <a:prstDash val="solid"/>
+                      <a:round/>
+                      <a:headEnd type="none" w="med" len="med"/>
+                      <a:tailEnd type="none" w="med" len="med"/>
+                    </a:lnR>
+                    <a:lnT w="12700" cap="flat" cmpd="sng" algn="ctr">
+                      <a:solidFill>
+                        <a:schemeClr val="tx1">
+                          <a:lumMod val="75000"/>
+                          <a:lumOff val="25000"/>
+                        </a:schemeClr>
+                      </a:solidFill>
+                      <a:prstDash val="solid"/>
+                      <a:round/>
+                      <a:headEnd type="none" w="med" len="med"/>
+                      <a:tailEnd type="none" w="med" len="med"/>
+                    </a:lnT>
+                    <a:lnB w="12700" cap="flat" cmpd="sng" algn="ctr">
+                      <a:solidFill>
+                        <a:schemeClr val="tx1">
+                          <a:lumMod val="75000"/>
+                          <a:lumOff val="25000"/>
+                        </a:schemeClr>
+                      </a:solidFill>
+                      <a:prstDash val="solid"/>
+                      <a:round/>
+                      <a:headEnd type="none" w="med" len="med"/>
+                      <a:tailEnd type="none" w="med" len="med"/>
+                    </a:lnB>
+                    <a:noFill/>
+                  </a:tcPr>
+                </a:tc>
+                <a:tc>
+                  <a:txBody>
+                    <a:bodyPr/>
+                    <a:lstStyle/>
+                    <a:p>
+                      <a:pPr marL="0" marR="0" lvl="0" indent="0" algn="ctr" defTabSz="914400" rtl="0" eaLnBrk="1" fontAlgn="auto" latinLnBrk="0" hangingPunct="1">
+                        <a:lnSpc>
+                          <a:spcPct val="100000"/>
+                        </a:lnSpc>
+                        <a:spcBef>
+                          <a:spcPts val="0"/>
+                        </a:spcBef>
+                        <a:spcAft>
+                          <a:spcPts val="0"/>
+                        </a:spcAft>
+                        <a:buClrTx/>
+                        <a:buSzTx/>
+                        <a:buFontTx/>
+                        <a:buNone/>
+                        <a:tabLst/>
+                        <a:defRPr/>
+                      </a:pPr>
+                      <a:r>
+                        <a:rPr kumimoji="0" lang="en-US" sz="1800" b="0" i="0" u="none" strike="noStrike" kern="1200" cap="none" spc="0" normalizeH="0" baseline="0" noProof="0">
+                          <a:ln>
+                            <a:noFill/>
+                          </a:ln>
+                          <a:solidFill>
+                            <a:srgbClr val="000000">
+                              <a:lumMod val="75000"/>
+                              <a:lumOff val="25000"/>
+                            </a:srgbClr>
+                          </a:solidFill>
+                          <a:effectLst/>
+                          <a:uLnTx/>
+                          <a:uFillTx/>
+                          <a:latin typeface="Optima" panose="02000503060000020004" pitchFamily="2" charset="0"/>
+                          <a:ea typeface="+mn-ea"/>
+                          <a:cs typeface="+mn-cs"/>
+                        </a:rPr>
+                        <a:t>0</a:t>
+                      </a:r>
+                      <a:endParaRPr kumimoji="0" lang="en-US" sz="1800" b="0" i="0" u="none" strike="noStrike" kern="1200" cap="none" spc="0" normalizeH="0" baseline="0" noProof="0" dirty="0">
+                        <a:ln>
+                          <a:noFill/>
+                        </a:ln>
+                        <a:solidFill>
+                          <a:srgbClr val="000000">
+                            <a:lumMod val="75000"/>
+                            <a:lumOff val="25000"/>
+                          </a:srgbClr>
+                        </a:solidFill>
+                        <a:effectLst/>
+                        <a:uLnTx/>
+                        <a:uFillTx/>
+                        <a:latin typeface="Optima" panose="02000503060000020004" pitchFamily="2" charset="0"/>
+                        <a:ea typeface="+mn-ea"/>
+                        <a:cs typeface="+mn-cs"/>
+                      </a:endParaRPr>
+                    </a:p>
+                  </a:txBody>
+                  <a:tcPr anchor="ctr">
+                    <a:lnL w="12700" cap="flat" cmpd="sng" algn="ctr">
+                      <a:solidFill>
+                        <a:schemeClr val="tx1">
+                          <a:lumMod val="75000"/>
+                          <a:lumOff val="25000"/>
+                        </a:schemeClr>
+                      </a:solidFill>
+                      <a:prstDash val="solid"/>
+                      <a:round/>
+                      <a:headEnd type="none" w="med" len="med"/>
+                      <a:tailEnd type="none" w="med" len="med"/>
+                    </a:lnL>
+                    <a:lnR w="12700" cap="flat" cmpd="sng" algn="ctr">
+                      <a:solidFill>
+                        <a:schemeClr val="tx1">
+                          <a:lumMod val="75000"/>
+                          <a:lumOff val="25000"/>
+                        </a:schemeClr>
+                      </a:solidFill>
+                      <a:prstDash val="solid"/>
+                      <a:round/>
+                      <a:headEnd type="none" w="med" len="med"/>
+                      <a:tailEnd type="none" w="med" len="med"/>
+                    </a:lnR>
+                    <a:lnT w="12700" cap="flat" cmpd="sng" algn="ctr">
+                      <a:solidFill>
+                        <a:schemeClr val="tx1">
+                          <a:lumMod val="75000"/>
+                          <a:lumOff val="25000"/>
+                        </a:schemeClr>
+                      </a:solidFill>
+                      <a:prstDash val="solid"/>
+                      <a:round/>
+                      <a:headEnd type="none" w="med" len="med"/>
+                      <a:tailEnd type="none" w="med" len="med"/>
+                    </a:lnT>
+                    <a:lnB w="12700" cap="flat" cmpd="sng" algn="ctr">
+                      <a:solidFill>
+                        <a:schemeClr val="tx1">
+                          <a:lumMod val="75000"/>
+                          <a:lumOff val="25000"/>
+                        </a:schemeClr>
+                      </a:solidFill>
+                      <a:prstDash val="solid"/>
+                      <a:round/>
+                      <a:headEnd type="none" w="med" len="med"/>
+                      <a:tailEnd type="none" w="med" len="med"/>
+                    </a:lnB>
+                    <a:noFill/>
+                  </a:tcPr>
+                </a:tc>
+                <a:extLst>
+                  <a:ext uri="{0D108BD9-81ED-4DB2-BD59-A6C34878D82A}">
+                    <a16:rowId xmlns:a16="http://schemas.microsoft.com/office/drawing/2014/main" val="4161892362"/>
+                  </a:ext>
+                </a:extLst>
+              </a:tr>
+              <a:tr h="731520">
+                <a:tc>
+                  <a:txBody>
+                    <a:bodyPr/>
+                    <a:lstStyle/>
+                    <a:p>
+                      <a:pPr marL="0" marR="0" lvl="0" indent="0" algn="ctr" defTabSz="914400" rtl="0" eaLnBrk="1" fontAlgn="auto" latinLnBrk="0" hangingPunct="1">
+                        <a:lnSpc>
+                          <a:spcPct val="100000"/>
+                        </a:lnSpc>
+                        <a:spcBef>
+                          <a:spcPts val="0"/>
+                        </a:spcBef>
+                        <a:spcAft>
+                          <a:spcPts val="0"/>
+                        </a:spcAft>
+                        <a:buClrTx/>
+                        <a:buSzTx/>
+                        <a:buFontTx/>
+                        <a:buNone/>
+                        <a:tabLst/>
+                        <a:defRPr/>
+                      </a:pPr>
+                      <a:r>
+                        <a:rPr kumimoji="0" lang="en-US" sz="1800" b="0" i="0" u="none" strike="noStrike" kern="1200" cap="none" spc="0" normalizeH="0" baseline="0" noProof="0">
+                          <a:ln>
+                            <a:noFill/>
+                          </a:ln>
+                          <a:solidFill>
+                            <a:srgbClr val="000000">
+                              <a:lumMod val="75000"/>
+                              <a:lumOff val="25000"/>
+                            </a:srgbClr>
+                          </a:solidFill>
+                          <a:effectLst/>
+                          <a:uLnTx/>
+                          <a:uFillTx/>
+                          <a:latin typeface="Optima" panose="02000503060000020004" pitchFamily="2" charset="0"/>
+                          <a:ea typeface="+mn-ea"/>
+                          <a:cs typeface="+mn-cs"/>
+                        </a:rPr>
+                        <a:t>0</a:t>
+                      </a:r>
+                      <a:endParaRPr kumimoji="0" lang="en-US" sz="1800" b="0" i="0" u="none" strike="noStrike" kern="1200" cap="none" spc="0" normalizeH="0" baseline="0" noProof="0" dirty="0">
+                        <a:ln>
+                          <a:noFill/>
+                        </a:ln>
+                        <a:solidFill>
+                          <a:srgbClr val="000000">
+                            <a:lumMod val="75000"/>
+                            <a:lumOff val="25000"/>
+                          </a:srgbClr>
+                        </a:solidFill>
+                        <a:effectLst/>
+                        <a:uLnTx/>
+                        <a:uFillTx/>
+                        <a:latin typeface="Optima" panose="02000503060000020004" pitchFamily="2" charset="0"/>
+                        <a:ea typeface="+mn-ea"/>
+                        <a:cs typeface="+mn-cs"/>
+                      </a:endParaRPr>
+                    </a:p>
+                  </a:txBody>
+                  <a:tcPr anchor="ctr">
+                    <a:lnL w="12700" cap="flat" cmpd="sng" algn="ctr">
+                      <a:solidFill>
+                        <a:schemeClr val="tx1">
+                          <a:lumMod val="75000"/>
+                          <a:lumOff val="25000"/>
+                        </a:schemeClr>
+                      </a:solidFill>
+                      <a:prstDash val="solid"/>
+                      <a:round/>
+                      <a:headEnd type="none" w="med" len="med"/>
+                      <a:tailEnd type="none" w="med" len="med"/>
+                    </a:lnL>
+                    <a:lnR w="12700" cap="flat" cmpd="sng" algn="ctr">
+                      <a:solidFill>
+                        <a:schemeClr val="tx1">
+                          <a:lumMod val="75000"/>
+                          <a:lumOff val="25000"/>
+                        </a:schemeClr>
+                      </a:solidFill>
+                      <a:prstDash val="solid"/>
+                      <a:round/>
+                      <a:headEnd type="none" w="med" len="med"/>
+                      <a:tailEnd type="none" w="med" len="med"/>
+                    </a:lnR>
+                    <a:lnT w="12700" cap="flat" cmpd="sng" algn="ctr">
+                      <a:solidFill>
+                        <a:schemeClr val="tx1">
+                          <a:lumMod val="75000"/>
+                          <a:lumOff val="25000"/>
+                        </a:schemeClr>
+                      </a:solidFill>
+                      <a:prstDash val="solid"/>
+                      <a:round/>
+                      <a:headEnd type="none" w="med" len="med"/>
+                      <a:tailEnd type="none" w="med" len="med"/>
+                    </a:lnT>
+                    <a:lnB w="12700" cap="flat" cmpd="sng" algn="ctr">
+                      <a:solidFill>
+                        <a:schemeClr val="tx1">
+                          <a:lumMod val="75000"/>
+                          <a:lumOff val="25000"/>
+                        </a:schemeClr>
+                      </a:solidFill>
+                      <a:prstDash val="solid"/>
+                      <a:round/>
+                      <a:headEnd type="none" w="med" len="med"/>
+                      <a:tailEnd type="none" w="med" len="med"/>
+                    </a:lnB>
+                    <a:noFill/>
+                  </a:tcPr>
+                </a:tc>
+                <a:tc>
+                  <a:txBody>
+                    <a:bodyPr/>
+                    <a:lstStyle/>
+                    <a:p>
+                      <a:pPr marL="0" marR="0" lvl="0" indent="0" algn="ctr" defTabSz="914400" rtl="0" eaLnBrk="1" fontAlgn="auto" latinLnBrk="0" hangingPunct="1">
+                        <a:lnSpc>
+                          <a:spcPct val="100000"/>
+                        </a:lnSpc>
+                        <a:spcBef>
+                          <a:spcPts val="0"/>
+                        </a:spcBef>
+                        <a:spcAft>
+                          <a:spcPts val="0"/>
+                        </a:spcAft>
+                        <a:buClrTx/>
+                        <a:buSzTx/>
+                        <a:buFontTx/>
+                        <a:buNone/>
+                        <a:tabLst/>
+                        <a:defRPr/>
+                      </a:pPr>
+                      <a:r>
+                        <a:rPr kumimoji="0" lang="en-US" sz="1800" b="0" i="0" u="none" strike="noStrike" kern="1200" cap="none" spc="0" normalizeH="0" baseline="0" noProof="0" dirty="0">
+                          <a:ln>
+                            <a:noFill/>
+                          </a:ln>
+                          <a:solidFill>
+                            <a:srgbClr val="000000">
+                              <a:lumMod val="75000"/>
+                              <a:lumOff val="25000"/>
+                            </a:srgbClr>
+                          </a:solidFill>
+                          <a:effectLst/>
+                          <a:uLnTx/>
+                          <a:uFillTx/>
+                          <a:latin typeface="Optima" panose="02000503060000020004" pitchFamily="2" charset="0"/>
+                          <a:ea typeface="+mn-ea"/>
+                          <a:cs typeface="+mn-cs"/>
+                        </a:rPr>
+                        <a:t>.01</a:t>
+                      </a:r>
+                    </a:p>
+                  </a:txBody>
+                  <a:tcPr anchor="ctr">
+                    <a:lnL w="12700" cap="flat" cmpd="sng" algn="ctr">
+                      <a:solidFill>
+                        <a:schemeClr val="tx1">
+                          <a:lumMod val="75000"/>
+                          <a:lumOff val="25000"/>
+                        </a:schemeClr>
+                      </a:solidFill>
+                      <a:prstDash val="solid"/>
+                      <a:round/>
+                      <a:headEnd type="none" w="med" len="med"/>
+                      <a:tailEnd type="none" w="med" len="med"/>
+                    </a:lnL>
+                    <a:lnR w="12700" cap="flat" cmpd="sng" algn="ctr">
+                      <a:solidFill>
+                        <a:schemeClr val="tx1">
+                          <a:lumMod val="75000"/>
+                          <a:lumOff val="25000"/>
+                        </a:schemeClr>
+                      </a:solidFill>
+                      <a:prstDash val="solid"/>
+                      <a:round/>
+                      <a:headEnd type="none" w="med" len="med"/>
+                      <a:tailEnd type="none" w="med" len="med"/>
+                    </a:lnR>
+                    <a:lnT w="12700" cap="flat" cmpd="sng" algn="ctr">
+                      <a:solidFill>
+                        <a:schemeClr val="tx1">
+                          <a:lumMod val="75000"/>
+                          <a:lumOff val="25000"/>
+                        </a:schemeClr>
+                      </a:solidFill>
+                      <a:prstDash val="solid"/>
+                      <a:round/>
+                      <a:headEnd type="none" w="med" len="med"/>
+                      <a:tailEnd type="none" w="med" len="med"/>
+                    </a:lnT>
+                    <a:lnB w="12700" cap="flat" cmpd="sng" algn="ctr">
+                      <a:solidFill>
+                        <a:schemeClr val="tx1">
+                          <a:lumMod val="75000"/>
+                          <a:lumOff val="25000"/>
+                        </a:schemeClr>
+                      </a:solidFill>
+                      <a:prstDash val="solid"/>
+                      <a:round/>
+                      <a:headEnd type="none" w="med" len="med"/>
+                      <a:tailEnd type="none" w="med" len="med"/>
+                    </a:lnB>
+                    <a:noFill/>
+                  </a:tcPr>
+                </a:tc>
+                <a:tc>
+                  <a:txBody>
+                    <a:bodyPr/>
+                    <a:lstStyle/>
+                    <a:p>
+                      <a:pPr marL="0" marR="0" lvl="0" indent="0" algn="ctr" defTabSz="914400" rtl="0" eaLnBrk="1" fontAlgn="auto" latinLnBrk="0" hangingPunct="1">
+                        <a:lnSpc>
+                          <a:spcPct val="100000"/>
+                        </a:lnSpc>
+                        <a:spcBef>
+                          <a:spcPts val="0"/>
+                        </a:spcBef>
+                        <a:spcAft>
+                          <a:spcPts val="0"/>
+                        </a:spcAft>
+                        <a:buClrTx/>
+                        <a:buSzTx/>
+                        <a:buFontTx/>
+                        <a:buNone/>
+                        <a:tabLst/>
+                        <a:defRPr/>
+                      </a:pPr>
+                      <a:r>
+                        <a:rPr kumimoji="0" lang="en-US" sz="1800" b="0" i="0" u="none" strike="noStrike" kern="1200" cap="none" spc="0" normalizeH="0" baseline="0" noProof="0" dirty="0">
+                          <a:ln>
+                            <a:noFill/>
+                          </a:ln>
+                          <a:solidFill>
+                            <a:srgbClr val="000000">
+                              <a:lumMod val="75000"/>
+                              <a:lumOff val="25000"/>
+                            </a:srgbClr>
+                          </a:solidFill>
+                          <a:effectLst/>
+                          <a:uLnTx/>
+                          <a:uFillTx/>
+                          <a:latin typeface="Optima" panose="02000503060000020004" pitchFamily="2" charset="0"/>
+                          <a:ea typeface="+mn-ea"/>
+                          <a:cs typeface="+mn-cs"/>
+                        </a:rPr>
+                        <a:t>.04</a:t>
+                      </a:r>
+                    </a:p>
+                  </a:txBody>
+                  <a:tcPr anchor="ctr">
+                    <a:lnL w="12700" cap="flat" cmpd="sng" algn="ctr">
+                      <a:solidFill>
+                        <a:schemeClr val="tx1">
+                          <a:lumMod val="75000"/>
+                          <a:lumOff val="25000"/>
+                        </a:schemeClr>
+                      </a:solidFill>
+                      <a:prstDash val="solid"/>
+                      <a:round/>
+                      <a:headEnd type="none" w="med" len="med"/>
+                      <a:tailEnd type="none" w="med" len="med"/>
+                    </a:lnL>
+                    <a:lnR w="12700" cap="flat" cmpd="sng" algn="ctr">
+                      <a:solidFill>
+                        <a:schemeClr val="tx1">
+                          <a:lumMod val="75000"/>
+                          <a:lumOff val="25000"/>
+                        </a:schemeClr>
+                      </a:solidFill>
+                      <a:prstDash val="solid"/>
+                      <a:round/>
+                      <a:headEnd type="none" w="med" len="med"/>
+                      <a:tailEnd type="none" w="med" len="med"/>
+                    </a:lnR>
+                    <a:lnT w="12700" cap="flat" cmpd="sng" algn="ctr">
+                      <a:solidFill>
+                        <a:schemeClr val="tx1">
+                          <a:lumMod val="75000"/>
+                          <a:lumOff val="25000"/>
+                        </a:schemeClr>
+                      </a:solidFill>
+                      <a:prstDash val="solid"/>
+                      <a:round/>
+                      <a:headEnd type="none" w="med" len="med"/>
+                      <a:tailEnd type="none" w="med" len="med"/>
+                    </a:lnT>
+                    <a:lnB w="12700" cap="flat" cmpd="sng" algn="ctr">
+                      <a:solidFill>
+                        <a:schemeClr val="tx1">
+                          <a:lumMod val="75000"/>
+                          <a:lumOff val="25000"/>
+                        </a:schemeClr>
+                      </a:solidFill>
+                      <a:prstDash val="solid"/>
+                      <a:round/>
+                      <a:headEnd type="none" w="med" len="med"/>
+                      <a:tailEnd type="none" w="med" len="med"/>
+                    </a:lnB>
+                    <a:noFill/>
+                  </a:tcPr>
+                </a:tc>
+                <a:tc>
+                  <a:txBody>
+                    <a:bodyPr/>
+                    <a:lstStyle/>
+                    <a:p>
+                      <a:pPr marL="0" marR="0" lvl="0" indent="0" algn="ctr" defTabSz="914400" rtl="0" eaLnBrk="1" fontAlgn="auto" latinLnBrk="0" hangingPunct="1">
+                        <a:lnSpc>
+                          <a:spcPct val="100000"/>
+                        </a:lnSpc>
+                        <a:spcBef>
+                          <a:spcPts val="0"/>
+                        </a:spcBef>
+                        <a:spcAft>
+                          <a:spcPts val="0"/>
+                        </a:spcAft>
+                        <a:buClrTx/>
+                        <a:buSzTx/>
+                        <a:buFontTx/>
+                        <a:buNone/>
+                        <a:tabLst/>
+                        <a:defRPr/>
+                      </a:pPr>
+                      <a:r>
+                        <a:rPr kumimoji="0" lang="en-US" sz="1800" b="0" i="0" u="none" strike="noStrike" kern="1200" cap="none" spc="0" normalizeH="0" baseline="0" noProof="0" dirty="0">
+                          <a:ln>
+                            <a:noFill/>
+                          </a:ln>
+                          <a:solidFill>
+                            <a:srgbClr val="000000">
+                              <a:lumMod val="75000"/>
+                              <a:lumOff val="25000"/>
+                            </a:srgbClr>
+                          </a:solidFill>
+                          <a:effectLst/>
+                          <a:uLnTx/>
+                          <a:uFillTx/>
+                          <a:latin typeface="Optima" panose="02000503060000020004" pitchFamily="2" charset="0"/>
+                          <a:ea typeface="+mn-ea"/>
+                          <a:cs typeface="+mn-cs"/>
+                        </a:rPr>
+                        <a:t>.01</a:t>
+                      </a:r>
+                    </a:p>
+                  </a:txBody>
+                  <a:tcPr anchor="ctr">
+                    <a:lnL w="12700" cap="flat" cmpd="sng" algn="ctr">
+                      <a:solidFill>
+                        <a:schemeClr val="tx1">
+                          <a:lumMod val="75000"/>
+                          <a:lumOff val="25000"/>
+                        </a:schemeClr>
+                      </a:solidFill>
+                      <a:prstDash val="solid"/>
+                      <a:round/>
+                      <a:headEnd type="none" w="med" len="med"/>
+                      <a:tailEnd type="none" w="med" len="med"/>
+                    </a:lnL>
+                    <a:lnR w="12700" cap="flat" cmpd="sng" algn="ctr">
+                      <a:solidFill>
+                        <a:schemeClr val="tx1">
+                          <a:lumMod val="75000"/>
+                          <a:lumOff val="25000"/>
+                        </a:schemeClr>
+                      </a:solidFill>
+                      <a:prstDash val="solid"/>
+                      <a:round/>
+                      <a:headEnd type="none" w="med" len="med"/>
+                      <a:tailEnd type="none" w="med" len="med"/>
+                    </a:lnR>
+                    <a:lnT w="12700" cap="flat" cmpd="sng" algn="ctr">
+                      <a:solidFill>
+                        <a:schemeClr val="tx1">
+                          <a:lumMod val="75000"/>
+                          <a:lumOff val="25000"/>
+                        </a:schemeClr>
+                      </a:solidFill>
+                      <a:prstDash val="solid"/>
+                      <a:round/>
+                      <a:headEnd type="none" w="med" len="med"/>
+                      <a:tailEnd type="none" w="med" len="med"/>
+                    </a:lnT>
+                    <a:lnB w="12700" cap="flat" cmpd="sng" algn="ctr">
+                      <a:solidFill>
+                        <a:schemeClr val="tx1">
+                          <a:lumMod val="75000"/>
+                          <a:lumOff val="25000"/>
+                        </a:schemeClr>
+                      </a:solidFill>
+                      <a:prstDash val="solid"/>
+                      <a:round/>
+                      <a:headEnd type="none" w="med" len="med"/>
+                      <a:tailEnd type="none" w="med" len="med"/>
+                    </a:lnB>
+                    <a:noFill/>
+                  </a:tcPr>
+                </a:tc>
+                <a:tc>
+                  <a:txBody>
+                    <a:bodyPr/>
+                    <a:lstStyle/>
+                    <a:p>
+                      <a:pPr marL="0" marR="0" lvl="0" indent="0" algn="ctr" defTabSz="914400" rtl="0" eaLnBrk="1" fontAlgn="auto" latinLnBrk="0" hangingPunct="1">
+                        <a:lnSpc>
+                          <a:spcPct val="100000"/>
+                        </a:lnSpc>
+                        <a:spcBef>
+                          <a:spcPts val="0"/>
+                        </a:spcBef>
+                        <a:spcAft>
+                          <a:spcPts val="0"/>
+                        </a:spcAft>
+                        <a:buClrTx/>
+                        <a:buSzTx/>
+                        <a:buFontTx/>
+                        <a:buNone/>
+                        <a:tabLst/>
+                        <a:defRPr/>
+                      </a:pPr>
+                      <a:r>
+                        <a:rPr kumimoji="0" lang="en-US" sz="1800" b="0" i="0" u="none" strike="noStrike" kern="1200" cap="none" spc="0" normalizeH="0" baseline="0" noProof="0">
+                          <a:ln>
+                            <a:noFill/>
+                          </a:ln>
+                          <a:solidFill>
+                            <a:srgbClr val="000000">
+                              <a:lumMod val="75000"/>
+                              <a:lumOff val="25000"/>
+                            </a:srgbClr>
+                          </a:solidFill>
+                          <a:effectLst/>
+                          <a:uLnTx/>
+                          <a:uFillTx/>
+                          <a:latin typeface="Optima" panose="02000503060000020004" pitchFamily="2" charset="0"/>
+                          <a:ea typeface="+mn-ea"/>
+                          <a:cs typeface="+mn-cs"/>
+                        </a:rPr>
+                        <a:t>0</a:t>
+                      </a:r>
+                      <a:endParaRPr kumimoji="0" lang="en-US" sz="1800" b="0" i="0" u="none" strike="noStrike" kern="1200" cap="none" spc="0" normalizeH="0" baseline="0" noProof="0" dirty="0">
+                        <a:ln>
+                          <a:noFill/>
+                        </a:ln>
+                        <a:solidFill>
+                          <a:srgbClr val="000000">
+                            <a:lumMod val="75000"/>
+                            <a:lumOff val="25000"/>
+                          </a:srgbClr>
+                        </a:solidFill>
+                        <a:effectLst/>
+                        <a:uLnTx/>
+                        <a:uFillTx/>
+                        <a:latin typeface="Optima" panose="02000503060000020004" pitchFamily="2" charset="0"/>
+                        <a:ea typeface="+mn-ea"/>
+                        <a:cs typeface="+mn-cs"/>
+                      </a:endParaRPr>
+                    </a:p>
+                  </a:txBody>
+                  <a:tcPr anchor="ctr">
+                    <a:lnL w="12700" cap="flat" cmpd="sng" algn="ctr">
+                      <a:solidFill>
+                        <a:schemeClr val="tx1">
+                          <a:lumMod val="75000"/>
+                          <a:lumOff val="25000"/>
+                        </a:schemeClr>
+                      </a:solidFill>
+                      <a:prstDash val="solid"/>
+                      <a:round/>
+                      <a:headEnd type="none" w="med" len="med"/>
+                      <a:tailEnd type="none" w="med" len="med"/>
+                    </a:lnL>
+                    <a:lnR w="12700" cap="flat" cmpd="sng" algn="ctr">
+                      <a:solidFill>
+                        <a:schemeClr val="tx1">
+                          <a:lumMod val="75000"/>
+                          <a:lumOff val="25000"/>
+                        </a:schemeClr>
+                      </a:solidFill>
+                      <a:prstDash val="solid"/>
+                      <a:round/>
+                      <a:headEnd type="none" w="med" len="med"/>
+                      <a:tailEnd type="none" w="med" len="med"/>
+                    </a:lnR>
+                    <a:lnT w="12700" cap="flat" cmpd="sng" algn="ctr">
+                      <a:solidFill>
+                        <a:schemeClr val="tx1">
+                          <a:lumMod val="75000"/>
+                          <a:lumOff val="25000"/>
+                        </a:schemeClr>
+                      </a:solidFill>
+                      <a:prstDash val="solid"/>
+                      <a:round/>
+                      <a:headEnd type="none" w="med" len="med"/>
+                      <a:tailEnd type="none" w="med" len="med"/>
+                    </a:lnT>
+                    <a:lnB w="12700" cap="flat" cmpd="sng" algn="ctr">
+                      <a:solidFill>
+                        <a:schemeClr val="tx1">
+                          <a:lumMod val="75000"/>
+                          <a:lumOff val="25000"/>
+                        </a:schemeClr>
+                      </a:solidFill>
+                      <a:prstDash val="solid"/>
+                      <a:round/>
+                      <a:headEnd type="none" w="med" len="med"/>
+                      <a:tailEnd type="none" w="med" len="med"/>
+                    </a:lnB>
+                    <a:noFill/>
+                  </a:tcPr>
+                </a:tc>
+                <a:extLst>
+                  <a:ext uri="{0D108BD9-81ED-4DB2-BD59-A6C34878D82A}">
+                    <a16:rowId xmlns:a16="http://schemas.microsoft.com/office/drawing/2014/main" val="1662239566"/>
+                  </a:ext>
+                </a:extLst>
+              </a:tr>
+              <a:tr h="731520">
+                <a:tc>
+                  <a:txBody>
+                    <a:bodyPr/>
+                    <a:lstStyle/>
+                    <a:p>
+                      <a:pPr marL="0" marR="0" lvl="0" indent="0" algn="ctr" defTabSz="914400" rtl="0" eaLnBrk="1" fontAlgn="auto" latinLnBrk="0" hangingPunct="1">
+                        <a:lnSpc>
+                          <a:spcPct val="100000"/>
+                        </a:lnSpc>
+                        <a:spcBef>
+                          <a:spcPts val="0"/>
+                        </a:spcBef>
+                        <a:spcAft>
+                          <a:spcPts val="0"/>
+                        </a:spcAft>
+                        <a:buClrTx/>
+                        <a:buSzTx/>
+                        <a:buFontTx/>
+                        <a:buNone/>
+                        <a:tabLst/>
+                        <a:defRPr/>
+                      </a:pPr>
+                      <a:r>
+                        <a:rPr kumimoji="0" lang="en-US" sz="1800" b="0" i="0" u="none" strike="noStrike" kern="1200" cap="none" spc="0" normalizeH="0" baseline="0" noProof="0">
+                          <a:ln>
+                            <a:noFill/>
+                          </a:ln>
+                          <a:solidFill>
+                            <a:srgbClr val="000000">
+                              <a:lumMod val="75000"/>
+                              <a:lumOff val="25000"/>
+                            </a:srgbClr>
+                          </a:solidFill>
+                          <a:effectLst/>
+                          <a:uLnTx/>
+                          <a:uFillTx/>
+                          <a:latin typeface="Optima" panose="02000503060000020004" pitchFamily="2" charset="0"/>
+                          <a:ea typeface="+mn-ea"/>
+                          <a:cs typeface="+mn-cs"/>
+                        </a:rPr>
+                        <a:t>0</a:t>
+                      </a:r>
+                      <a:endParaRPr kumimoji="0" lang="en-US" sz="1800" b="0" i="0" u="none" strike="noStrike" kern="1200" cap="none" spc="0" normalizeH="0" baseline="0" noProof="0" dirty="0">
+                        <a:ln>
+                          <a:noFill/>
+                        </a:ln>
+                        <a:solidFill>
+                          <a:srgbClr val="000000">
+                            <a:lumMod val="75000"/>
+                            <a:lumOff val="25000"/>
+                          </a:srgbClr>
+                        </a:solidFill>
+                        <a:effectLst/>
+                        <a:uLnTx/>
+                        <a:uFillTx/>
+                        <a:latin typeface="Optima" panose="02000503060000020004" pitchFamily="2" charset="0"/>
+                        <a:ea typeface="+mn-ea"/>
+                        <a:cs typeface="+mn-cs"/>
+                      </a:endParaRPr>
+                    </a:p>
+                  </a:txBody>
+                  <a:tcPr anchor="ctr">
+                    <a:lnL w="12700" cap="flat" cmpd="sng" algn="ctr">
+                      <a:solidFill>
+                        <a:schemeClr val="tx1">
+                          <a:lumMod val="75000"/>
+                          <a:lumOff val="25000"/>
+                        </a:schemeClr>
+                      </a:solidFill>
+                      <a:prstDash val="solid"/>
+                      <a:round/>
+                      <a:headEnd type="none" w="med" len="med"/>
+                      <a:tailEnd type="none" w="med" len="med"/>
+                    </a:lnL>
+                    <a:lnR w="12700" cap="flat" cmpd="sng" algn="ctr">
+                      <a:solidFill>
+                        <a:schemeClr val="tx1">
+                          <a:lumMod val="75000"/>
+                          <a:lumOff val="25000"/>
+                        </a:schemeClr>
+                      </a:solidFill>
+                      <a:prstDash val="solid"/>
+                      <a:round/>
+                      <a:headEnd type="none" w="med" len="med"/>
+                      <a:tailEnd type="none" w="med" len="med"/>
+                    </a:lnR>
+                    <a:lnT w="12700" cap="flat" cmpd="sng" algn="ctr">
+                      <a:solidFill>
+                        <a:schemeClr val="tx1">
+                          <a:lumMod val="75000"/>
+                          <a:lumOff val="25000"/>
+                        </a:schemeClr>
+                      </a:solidFill>
+                      <a:prstDash val="solid"/>
+                      <a:round/>
+                      <a:headEnd type="none" w="med" len="med"/>
+                      <a:tailEnd type="none" w="med" len="med"/>
+                    </a:lnT>
+                    <a:lnB w="12700" cap="flat" cmpd="sng" algn="ctr">
+                      <a:solidFill>
+                        <a:schemeClr val="tx1">
+                          <a:lumMod val="75000"/>
+                          <a:lumOff val="25000"/>
+                        </a:schemeClr>
+                      </a:solidFill>
+                      <a:prstDash val="solid"/>
+                      <a:round/>
+                      <a:headEnd type="none" w="med" len="med"/>
+                      <a:tailEnd type="none" w="med" len="med"/>
+                    </a:lnB>
+                    <a:noFill/>
+                  </a:tcPr>
+                </a:tc>
+                <a:tc>
+                  <a:txBody>
+                    <a:bodyPr/>
+                    <a:lstStyle/>
+                    <a:p>
+                      <a:pPr marL="0" marR="0" lvl="0" indent="0" algn="ctr" defTabSz="914400" rtl="0" eaLnBrk="1" fontAlgn="auto" latinLnBrk="0" hangingPunct="1">
+                        <a:lnSpc>
+                          <a:spcPct val="100000"/>
+                        </a:lnSpc>
+                        <a:spcBef>
+                          <a:spcPts val="0"/>
+                        </a:spcBef>
+                        <a:spcAft>
+                          <a:spcPts val="0"/>
+                        </a:spcAft>
+                        <a:buClrTx/>
+                        <a:buSzTx/>
+                        <a:buFontTx/>
+                        <a:buNone/>
+                        <a:tabLst/>
+                        <a:defRPr/>
+                      </a:pPr>
+                      <a:r>
+                        <a:rPr kumimoji="0" lang="en-US" sz="1800" b="0" i="0" u="none" strike="noStrike" kern="1200" cap="none" spc="0" normalizeH="0" baseline="0" noProof="0">
+                          <a:ln>
+                            <a:noFill/>
+                          </a:ln>
+                          <a:solidFill>
+                            <a:srgbClr val="000000">
+                              <a:lumMod val="75000"/>
+                              <a:lumOff val="25000"/>
+                            </a:srgbClr>
+                          </a:solidFill>
+                          <a:effectLst/>
+                          <a:uLnTx/>
+                          <a:uFillTx/>
+                          <a:latin typeface="Optima" panose="02000503060000020004" pitchFamily="2" charset="0"/>
+                          <a:ea typeface="+mn-ea"/>
+                          <a:cs typeface="+mn-cs"/>
+                        </a:rPr>
+                        <a:t>0</a:t>
+                      </a:r>
+                      <a:endParaRPr kumimoji="0" lang="en-US" sz="1800" b="0" i="0" u="none" strike="noStrike" kern="1200" cap="none" spc="0" normalizeH="0" baseline="0" noProof="0" dirty="0">
+                        <a:ln>
+                          <a:noFill/>
+                        </a:ln>
+                        <a:solidFill>
+                          <a:srgbClr val="000000">
+                            <a:lumMod val="75000"/>
+                            <a:lumOff val="25000"/>
+                          </a:srgbClr>
+                        </a:solidFill>
+                        <a:effectLst/>
+                        <a:uLnTx/>
+                        <a:uFillTx/>
+                        <a:latin typeface="Optima" panose="02000503060000020004" pitchFamily="2" charset="0"/>
+                        <a:ea typeface="+mn-ea"/>
+                        <a:cs typeface="+mn-cs"/>
+                      </a:endParaRPr>
+                    </a:p>
+                  </a:txBody>
+                  <a:tcPr anchor="ctr">
+                    <a:lnL w="12700" cap="flat" cmpd="sng" algn="ctr">
+                      <a:solidFill>
+                        <a:schemeClr val="tx1">
+                          <a:lumMod val="75000"/>
+                          <a:lumOff val="25000"/>
+                        </a:schemeClr>
+                      </a:solidFill>
+                      <a:prstDash val="solid"/>
+                      <a:round/>
+                      <a:headEnd type="none" w="med" len="med"/>
+                      <a:tailEnd type="none" w="med" len="med"/>
+                    </a:lnL>
+                    <a:lnR w="12700" cap="flat" cmpd="sng" algn="ctr">
+                      <a:solidFill>
+                        <a:schemeClr val="tx1">
+                          <a:lumMod val="75000"/>
+                          <a:lumOff val="25000"/>
+                        </a:schemeClr>
+                      </a:solidFill>
+                      <a:prstDash val="solid"/>
+                      <a:round/>
+                      <a:headEnd type="none" w="med" len="med"/>
+                      <a:tailEnd type="none" w="med" len="med"/>
+                    </a:lnR>
+                    <a:lnT w="12700" cap="flat" cmpd="sng" algn="ctr">
+                      <a:solidFill>
+                        <a:schemeClr val="tx1">
+                          <a:lumMod val="75000"/>
+                          <a:lumOff val="25000"/>
+                        </a:schemeClr>
+                      </a:solidFill>
+                      <a:prstDash val="solid"/>
+                      <a:round/>
+                      <a:headEnd type="none" w="med" len="med"/>
+                      <a:tailEnd type="none" w="med" len="med"/>
+                    </a:lnT>
+                    <a:lnB w="12700" cap="flat" cmpd="sng" algn="ctr">
+                      <a:solidFill>
+                        <a:schemeClr val="tx1">
+                          <a:lumMod val="75000"/>
+                          <a:lumOff val="25000"/>
+                        </a:schemeClr>
+                      </a:solidFill>
+                      <a:prstDash val="solid"/>
+                      <a:round/>
+                      <a:headEnd type="none" w="med" len="med"/>
+                      <a:tailEnd type="none" w="med" len="med"/>
+                    </a:lnB>
+                    <a:noFill/>
+                  </a:tcPr>
+                </a:tc>
+                <a:tc>
+                  <a:txBody>
+                    <a:bodyPr/>
+                    <a:lstStyle/>
+                    <a:p>
+                      <a:pPr marL="0" marR="0" lvl="0" indent="0" algn="ctr" defTabSz="914400" rtl="0" eaLnBrk="1" fontAlgn="auto" latinLnBrk="0" hangingPunct="1">
+                        <a:lnSpc>
+                          <a:spcPct val="100000"/>
+                        </a:lnSpc>
+                        <a:spcBef>
+                          <a:spcPts val="0"/>
+                        </a:spcBef>
+                        <a:spcAft>
+                          <a:spcPts val="0"/>
+                        </a:spcAft>
+                        <a:buClrTx/>
+                        <a:buSzTx/>
+                        <a:buFontTx/>
+                        <a:buNone/>
+                        <a:tabLst/>
+                        <a:defRPr/>
+                      </a:pPr>
+                      <a:r>
+                        <a:rPr kumimoji="0" lang="en-US" sz="1800" b="0" i="0" u="none" strike="noStrike" kern="1200" cap="none" spc="0" normalizeH="0" baseline="0" noProof="0">
+                          <a:ln>
+                            <a:noFill/>
+                          </a:ln>
+                          <a:solidFill>
+                            <a:srgbClr val="000000">
+                              <a:lumMod val="75000"/>
+                              <a:lumOff val="25000"/>
+                            </a:srgbClr>
+                          </a:solidFill>
+                          <a:effectLst/>
+                          <a:uLnTx/>
+                          <a:uFillTx/>
+                          <a:latin typeface="Optima" panose="02000503060000020004" pitchFamily="2" charset="0"/>
+                          <a:ea typeface="+mn-ea"/>
+                          <a:cs typeface="+mn-cs"/>
+                        </a:rPr>
+                        <a:t>0</a:t>
+                      </a:r>
+                      <a:endParaRPr kumimoji="0" lang="en-US" sz="1800" b="0" i="0" u="none" strike="noStrike" kern="1200" cap="none" spc="0" normalizeH="0" baseline="0" noProof="0" dirty="0">
+                        <a:ln>
+                          <a:noFill/>
+                        </a:ln>
+                        <a:solidFill>
+                          <a:srgbClr val="000000">
+                            <a:lumMod val="75000"/>
+                            <a:lumOff val="25000"/>
+                          </a:srgbClr>
+                        </a:solidFill>
+                        <a:effectLst/>
+                        <a:uLnTx/>
+                        <a:uFillTx/>
+                        <a:latin typeface="Optima" panose="02000503060000020004" pitchFamily="2" charset="0"/>
+                        <a:ea typeface="+mn-ea"/>
+                        <a:cs typeface="+mn-cs"/>
+                      </a:endParaRPr>
+                    </a:p>
+                  </a:txBody>
+                  <a:tcPr anchor="ctr">
+                    <a:lnL w="12700" cap="flat" cmpd="sng" algn="ctr">
+                      <a:solidFill>
+                        <a:schemeClr val="tx1">
+                          <a:lumMod val="75000"/>
+                          <a:lumOff val="25000"/>
+                        </a:schemeClr>
+                      </a:solidFill>
+                      <a:prstDash val="solid"/>
+                      <a:round/>
+                      <a:headEnd type="none" w="med" len="med"/>
+                      <a:tailEnd type="none" w="med" len="med"/>
+                    </a:lnL>
+                    <a:lnR w="12700" cap="flat" cmpd="sng" algn="ctr">
+                      <a:solidFill>
+                        <a:schemeClr val="tx1">
+                          <a:lumMod val="75000"/>
+                          <a:lumOff val="25000"/>
+                        </a:schemeClr>
+                      </a:solidFill>
+                      <a:prstDash val="solid"/>
+                      <a:round/>
+                      <a:headEnd type="none" w="med" len="med"/>
+                      <a:tailEnd type="none" w="med" len="med"/>
+                    </a:lnR>
+                    <a:lnT w="12700" cap="flat" cmpd="sng" algn="ctr">
+                      <a:solidFill>
+                        <a:schemeClr val="tx1">
+                          <a:lumMod val="75000"/>
+                          <a:lumOff val="25000"/>
+                        </a:schemeClr>
+                      </a:solidFill>
+                      <a:prstDash val="solid"/>
+                      <a:round/>
+                      <a:headEnd type="none" w="med" len="med"/>
+                      <a:tailEnd type="none" w="med" len="med"/>
+                    </a:lnT>
+                    <a:lnB w="12700" cap="flat" cmpd="sng" algn="ctr">
+                      <a:solidFill>
+                        <a:schemeClr val="tx1">
+                          <a:lumMod val="75000"/>
+                          <a:lumOff val="25000"/>
+                        </a:schemeClr>
+                      </a:solidFill>
+                      <a:prstDash val="solid"/>
+                      <a:round/>
+                      <a:headEnd type="none" w="med" len="med"/>
+                      <a:tailEnd type="none" w="med" len="med"/>
+                    </a:lnB>
+                    <a:noFill/>
+                  </a:tcPr>
+                </a:tc>
+                <a:tc>
+                  <a:txBody>
+                    <a:bodyPr/>
+                    <a:lstStyle/>
+                    <a:p>
+                      <a:pPr marL="0" marR="0" lvl="0" indent="0" algn="ctr" defTabSz="914400" rtl="0" eaLnBrk="1" fontAlgn="auto" latinLnBrk="0" hangingPunct="1">
+                        <a:lnSpc>
+                          <a:spcPct val="100000"/>
+                        </a:lnSpc>
+                        <a:spcBef>
+                          <a:spcPts val="0"/>
+                        </a:spcBef>
+                        <a:spcAft>
+                          <a:spcPts val="0"/>
+                        </a:spcAft>
+                        <a:buClrTx/>
+                        <a:buSzTx/>
+                        <a:buFontTx/>
+                        <a:buNone/>
+                        <a:tabLst/>
+                        <a:defRPr/>
+                      </a:pPr>
+                      <a:r>
+                        <a:rPr kumimoji="0" lang="en-US" sz="1800" b="0" i="0" u="none" strike="noStrike" kern="1200" cap="none" spc="0" normalizeH="0" baseline="0" noProof="0">
+                          <a:ln>
+                            <a:noFill/>
+                          </a:ln>
+                          <a:solidFill>
+                            <a:srgbClr val="000000">
+                              <a:lumMod val="75000"/>
+                              <a:lumOff val="25000"/>
+                            </a:srgbClr>
+                          </a:solidFill>
+                          <a:effectLst/>
+                          <a:uLnTx/>
+                          <a:uFillTx/>
+                          <a:latin typeface="Optima" panose="02000503060000020004" pitchFamily="2" charset="0"/>
+                          <a:ea typeface="+mn-ea"/>
+                          <a:cs typeface="+mn-cs"/>
+                        </a:rPr>
+                        <a:t>0</a:t>
+                      </a:r>
+                      <a:endParaRPr kumimoji="0" lang="en-US" sz="1800" b="0" i="0" u="none" strike="noStrike" kern="1200" cap="none" spc="0" normalizeH="0" baseline="0" noProof="0" dirty="0">
+                        <a:ln>
+                          <a:noFill/>
+                        </a:ln>
+                        <a:solidFill>
+                          <a:srgbClr val="000000">
+                            <a:lumMod val="75000"/>
+                            <a:lumOff val="25000"/>
+                          </a:srgbClr>
+                        </a:solidFill>
+                        <a:effectLst/>
+                        <a:uLnTx/>
+                        <a:uFillTx/>
+                        <a:latin typeface="Optima" panose="02000503060000020004" pitchFamily="2" charset="0"/>
+                        <a:ea typeface="+mn-ea"/>
+                        <a:cs typeface="+mn-cs"/>
+                      </a:endParaRPr>
+                    </a:p>
+                  </a:txBody>
+                  <a:tcPr anchor="ctr">
+                    <a:lnL w="12700" cap="flat" cmpd="sng" algn="ctr">
+                      <a:solidFill>
+                        <a:schemeClr val="tx1">
+                          <a:lumMod val="75000"/>
+                          <a:lumOff val="25000"/>
+                        </a:schemeClr>
+                      </a:solidFill>
+                      <a:prstDash val="solid"/>
+                      <a:round/>
+                      <a:headEnd type="none" w="med" len="med"/>
+                      <a:tailEnd type="none" w="med" len="med"/>
+                    </a:lnL>
+                    <a:lnR w="12700" cap="flat" cmpd="sng" algn="ctr">
+                      <a:solidFill>
+                        <a:schemeClr val="tx1">
+                          <a:lumMod val="75000"/>
+                          <a:lumOff val="25000"/>
+                        </a:schemeClr>
+                      </a:solidFill>
+                      <a:prstDash val="solid"/>
+                      <a:round/>
+                      <a:headEnd type="none" w="med" len="med"/>
+                      <a:tailEnd type="none" w="med" len="med"/>
+                    </a:lnR>
+                    <a:lnT w="12700" cap="flat" cmpd="sng" algn="ctr">
+                      <a:solidFill>
+                        <a:schemeClr val="tx1">
+                          <a:lumMod val="75000"/>
+                          <a:lumOff val="25000"/>
+                        </a:schemeClr>
+                      </a:solidFill>
+                      <a:prstDash val="solid"/>
+                      <a:round/>
+                      <a:headEnd type="none" w="med" len="med"/>
+                      <a:tailEnd type="none" w="med" len="med"/>
+                    </a:lnT>
+                    <a:lnB w="12700" cap="flat" cmpd="sng" algn="ctr">
+                      <a:solidFill>
+                        <a:schemeClr val="tx1">
+                          <a:lumMod val="75000"/>
+                          <a:lumOff val="25000"/>
+                        </a:schemeClr>
+                      </a:solidFill>
+                      <a:prstDash val="solid"/>
+                      <a:round/>
+                      <a:headEnd type="none" w="med" len="med"/>
+                      <a:tailEnd type="none" w="med" len="med"/>
+                    </a:lnB>
+                    <a:noFill/>
+                  </a:tcPr>
+                </a:tc>
+                <a:tc>
+                  <a:txBody>
+                    <a:bodyPr/>
+                    <a:lstStyle/>
+                    <a:p>
+                      <a:pPr marL="0" marR="0" lvl="0" indent="0" algn="ctr" defTabSz="914400" rtl="0" eaLnBrk="1" fontAlgn="auto" latinLnBrk="0" hangingPunct="1">
+                        <a:lnSpc>
+                          <a:spcPct val="100000"/>
+                        </a:lnSpc>
+                        <a:spcBef>
+                          <a:spcPts val="0"/>
+                        </a:spcBef>
+                        <a:spcAft>
+                          <a:spcPts val="0"/>
+                        </a:spcAft>
+                        <a:buClrTx/>
+                        <a:buSzTx/>
+                        <a:buFontTx/>
+                        <a:buNone/>
+                        <a:tabLst/>
+                        <a:defRPr/>
+                      </a:pPr>
+                      <a:r>
+                        <a:rPr kumimoji="0" lang="en-US" sz="1800" b="0" i="0" u="none" strike="noStrike" kern="1200" cap="none" spc="0" normalizeH="0" baseline="0" noProof="0" dirty="0">
+                          <a:ln>
+                            <a:noFill/>
+                          </a:ln>
+                          <a:solidFill>
+                            <a:srgbClr val="000000">
+                              <a:lumMod val="75000"/>
+                              <a:lumOff val="25000"/>
+                            </a:srgbClr>
+                          </a:solidFill>
+                          <a:effectLst/>
+                          <a:uLnTx/>
+                          <a:uFillTx/>
+                          <a:latin typeface="Optima" panose="02000503060000020004" pitchFamily="2" charset="0"/>
+                          <a:ea typeface="+mn-ea"/>
+                          <a:cs typeface="+mn-cs"/>
+                        </a:rPr>
+                        <a:t>0</a:t>
+                      </a:r>
+                    </a:p>
+                  </a:txBody>
+                  <a:tcPr anchor="ctr">
+                    <a:lnL w="12700" cap="flat" cmpd="sng" algn="ctr">
+                      <a:solidFill>
+                        <a:schemeClr val="tx1">
+                          <a:lumMod val="75000"/>
+                          <a:lumOff val="25000"/>
+                        </a:schemeClr>
+                      </a:solidFill>
+                      <a:prstDash val="solid"/>
+                      <a:round/>
+                      <a:headEnd type="none" w="med" len="med"/>
+                      <a:tailEnd type="none" w="med" len="med"/>
+                    </a:lnL>
+                    <a:lnR w="12700" cap="flat" cmpd="sng" algn="ctr">
+                      <a:solidFill>
+                        <a:schemeClr val="tx1">
+                          <a:lumMod val="75000"/>
+                          <a:lumOff val="25000"/>
+                        </a:schemeClr>
+                      </a:solidFill>
+                      <a:prstDash val="solid"/>
+                      <a:round/>
+                      <a:headEnd type="none" w="med" len="med"/>
+                      <a:tailEnd type="none" w="med" len="med"/>
+                    </a:lnR>
+                    <a:lnT w="12700" cap="flat" cmpd="sng" algn="ctr">
+                      <a:solidFill>
+                        <a:schemeClr val="tx1">
+                          <a:lumMod val="75000"/>
+                          <a:lumOff val="25000"/>
+                        </a:schemeClr>
+                      </a:solidFill>
+                      <a:prstDash val="solid"/>
+                      <a:round/>
+                      <a:headEnd type="none" w="med" len="med"/>
+                      <a:tailEnd type="none" w="med" len="med"/>
+                    </a:lnT>
+                    <a:lnB w="12700" cap="flat" cmpd="sng" algn="ctr">
+                      <a:solidFill>
+                        <a:schemeClr val="tx1">
+                          <a:lumMod val="75000"/>
+                          <a:lumOff val="25000"/>
+                        </a:schemeClr>
+                      </a:solidFill>
+                      <a:prstDash val="solid"/>
+                      <a:round/>
+                      <a:headEnd type="none" w="med" len="med"/>
+                      <a:tailEnd type="none" w="med" len="med"/>
+                    </a:lnB>
+                    <a:noFill/>
+                  </a:tcPr>
+                </a:tc>
+                <a:extLst>
+                  <a:ext uri="{0D108BD9-81ED-4DB2-BD59-A6C34878D82A}">
+                    <a16:rowId xmlns:a16="http://schemas.microsoft.com/office/drawing/2014/main" val="4189107174"/>
+                  </a:ext>
+                </a:extLst>
+              </a:tr>
+            </a:tbl>
+          </a:graphicData>
+        </a:graphic>
+      </p:graphicFrame>
+    </p:spTree>
+    <p:extLst>
+      <p:ext uri="{BB962C8B-B14F-4D97-AF65-F5344CB8AC3E}">
+        <p14:creationId xmlns:p14="http://schemas.microsoft.com/office/powerpoint/2010/main" val="110284585"/>
+      </p:ext>
+    </p:extLst>
+  </p:cSld>
+  <p:clrMapOvr>
+    <a:masterClrMapping/>
+  </p:clrMapOvr>
+</p:sld>
+</file>
+
 <file path=ppt/theme/theme1.xml><?xml version="1.0" encoding="utf-8"?>
 <a:theme xmlns:a="http://schemas.openxmlformats.org/drawingml/2006/main" name="Office Theme">
   <a:themeElements>

</xml_diff>